<commit_message>
First draft of tests
</commit_message>
<xml_diff>
--- a/materials/images_hochformat.pptx
+++ b/materials/images_hochformat.pptx
@@ -6042,20 +6042,12 @@
           <a:p>
             <a:pPr algn="ctr"/>
             <a:r>
-              <a:rPr lang="en-US" sz="4274">
-                <a:solidFill>
-                  <a:schemeClr val="tx1"/>
-                </a:solidFill>
-              </a:rPr>
-              <a:t>Creation of Synthetic </a:t>
-            </a:r>
-            <a:r>
               <a:rPr lang="en-US" sz="4274" dirty="0">
                 <a:solidFill>
                   <a:schemeClr val="tx1"/>
                 </a:solidFill>
               </a:rPr>
-              <a:t>Cases</a:t>
+              <a:t>Creation of Synthetic Cases</a:t>
             </a:r>
           </a:p>
         </p:txBody>

</xml_diff>

<commit_message>
Version 0.3.1 before updating the documentation
</commit_message>
<xml_diff>
--- a/materials/images_hochformat.pptx
+++ b/materials/images_hochformat.pptx
@@ -8,6 +8,7 @@
     <p:sldId id="256" r:id="rId2"/>
     <p:sldId id="257" r:id="rId3"/>
     <p:sldId id="258" r:id="rId4"/>
+    <p:sldId id="259" r:id="rId5"/>
   </p:sldIdLst>
   <p:sldSz cx="27000200" cy="34199513"/>
   <p:notesSz cx="6858000" cy="9144000"/>
@@ -245,7 +246,7 @@
           <a:p>
             <a:fld id="{F39F49B5-785A-44C4-99F0-898FF83CD003}" type="datetimeFigureOut">
               <a:rPr lang="de-DE" smtClean="0"/>
-              <a:t>26.05.2023</a:t>
+              <a:t>22.11.2023</a:t>
             </a:fld>
             <a:endParaRPr lang="de-DE"/>
           </a:p>
@@ -415,7 +416,7 @@
           <a:p>
             <a:fld id="{F39F49B5-785A-44C4-99F0-898FF83CD003}" type="datetimeFigureOut">
               <a:rPr lang="de-DE" smtClean="0"/>
-              <a:t>26.05.2023</a:t>
+              <a:t>22.11.2023</a:t>
             </a:fld>
             <a:endParaRPr lang="de-DE"/>
           </a:p>
@@ -595,7 +596,7 @@
           <a:p>
             <a:fld id="{F39F49B5-785A-44C4-99F0-898FF83CD003}" type="datetimeFigureOut">
               <a:rPr lang="de-DE" smtClean="0"/>
-              <a:t>26.05.2023</a:t>
+              <a:t>22.11.2023</a:t>
             </a:fld>
             <a:endParaRPr lang="de-DE"/>
           </a:p>
@@ -765,7 +766,7 @@
           <a:p>
             <a:fld id="{F39F49B5-785A-44C4-99F0-898FF83CD003}" type="datetimeFigureOut">
               <a:rPr lang="de-DE" smtClean="0"/>
-              <a:t>26.05.2023</a:t>
+              <a:t>22.11.2023</a:t>
             </a:fld>
             <a:endParaRPr lang="de-DE"/>
           </a:p>
@@ -1009,7 +1010,7 @@
           <a:p>
             <a:fld id="{F39F49B5-785A-44C4-99F0-898FF83CD003}" type="datetimeFigureOut">
               <a:rPr lang="de-DE" smtClean="0"/>
-              <a:t>26.05.2023</a:t>
+              <a:t>22.11.2023</a:t>
             </a:fld>
             <a:endParaRPr lang="de-DE"/>
           </a:p>
@@ -1241,7 +1242,7 @@
           <a:p>
             <a:fld id="{F39F49B5-785A-44C4-99F0-898FF83CD003}" type="datetimeFigureOut">
               <a:rPr lang="de-DE" smtClean="0"/>
-              <a:t>26.05.2023</a:t>
+              <a:t>22.11.2023</a:t>
             </a:fld>
             <a:endParaRPr lang="de-DE"/>
           </a:p>
@@ -1608,7 +1609,7 @@
           <a:p>
             <a:fld id="{F39F49B5-785A-44C4-99F0-898FF83CD003}" type="datetimeFigureOut">
               <a:rPr lang="de-DE" smtClean="0"/>
-              <a:t>26.05.2023</a:t>
+              <a:t>22.11.2023</a:t>
             </a:fld>
             <a:endParaRPr lang="de-DE"/>
           </a:p>
@@ -1726,7 +1727,7 @@
           <a:p>
             <a:fld id="{F39F49B5-785A-44C4-99F0-898FF83CD003}" type="datetimeFigureOut">
               <a:rPr lang="de-DE" smtClean="0"/>
-              <a:t>26.05.2023</a:t>
+              <a:t>22.11.2023</a:t>
             </a:fld>
             <a:endParaRPr lang="de-DE"/>
           </a:p>
@@ -1821,7 +1822,7 @@
           <a:p>
             <a:fld id="{F39F49B5-785A-44C4-99F0-898FF83CD003}" type="datetimeFigureOut">
               <a:rPr lang="de-DE" smtClean="0"/>
-              <a:t>26.05.2023</a:t>
+              <a:t>22.11.2023</a:t>
             </a:fld>
             <a:endParaRPr lang="de-DE"/>
           </a:p>
@@ -2098,7 +2099,7 @@
           <a:p>
             <a:fld id="{F39F49B5-785A-44C4-99F0-898FF83CD003}" type="datetimeFigureOut">
               <a:rPr lang="de-DE" smtClean="0"/>
-              <a:t>26.05.2023</a:t>
+              <a:t>22.11.2023</a:t>
             </a:fld>
             <a:endParaRPr lang="de-DE"/>
           </a:p>
@@ -2355,7 +2356,7 @@
           <a:p>
             <a:fld id="{F39F49B5-785A-44C4-99F0-898FF83CD003}" type="datetimeFigureOut">
               <a:rPr lang="de-DE" smtClean="0"/>
-              <a:t>26.05.2023</a:t>
+              <a:t>22.11.2023</a:t>
             </a:fld>
             <a:endParaRPr lang="de-DE"/>
           </a:p>
@@ -2568,7 +2569,7 @@
           <a:p>
             <a:fld id="{F39F49B5-785A-44C4-99F0-898FF83CD003}" type="datetimeFigureOut">
               <a:rPr lang="de-DE" smtClean="0"/>
-              <a:t>26.05.2023</a:t>
+              <a:t>22.11.2023</a:t>
             </a:fld>
             <a:endParaRPr lang="de-DE"/>
           </a:p>
@@ -8981,6 +8982,2484 @@
 </p:sld>
 </file>
 
+<file path=ppt/slides/slide4.xml><?xml version="1.0" encoding="utf-8"?>
+<p:sld xmlns:a="http://schemas.openxmlformats.org/drawingml/2006/main" xmlns:r="http://schemas.openxmlformats.org/officeDocument/2006/relationships" xmlns:p="http://schemas.openxmlformats.org/presentationml/2006/main">
+  <p:cSld>
+    <p:spTree>
+      <p:nvGrpSpPr>
+        <p:cNvPr id="1" name=""/>
+        <p:cNvGrpSpPr/>
+        <p:nvPr/>
+      </p:nvGrpSpPr>
+      <p:grpSpPr>
+        <a:xfrm>
+          <a:off x="0" y="0"/>
+          <a:ext cx="0" cy="0"/>
+          <a:chOff x="0" y="0"/>
+          <a:chExt cx="0" cy="0"/>
+        </a:xfrm>
+      </p:grpSpPr>
+      <p:sp>
+        <p:nvSpPr>
+          <p:cNvPr id="53" name="Rechteck 52">
+            <a:extLst>
+              <a:ext uri="{FF2B5EF4-FFF2-40B4-BE49-F238E27FC236}">
+                <a16:creationId xmlns:a16="http://schemas.microsoft.com/office/drawing/2014/main" id="{3A7216FE-B741-4409-8377-911FFD29F3F9}"/>
+              </a:ext>
+            </a:extLst>
+          </p:cNvPr>
+          <p:cNvSpPr/>
+          <p:nvPr/>
+        </p:nvSpPr>
+        <p:spPr>
+          <a:xfrm>
+            <a:off x="4848896" y="11029872"/>
+            <a:ext cx="9501077" cy="773893"/>
+          </a:xfrm>
+          <a:prstGeom prst="rect">
+            <a:avLst/>
+          </a:prstGeom>
+          <a:noFill/>
+          <a:ln>
+            <a:solidFill>
+              <a:schemeClr val="tx1"/>
+            </a:solidFill>
+          </a:ln>
+        </p:spPr>
+        <p:style>
+          <a:lnRef idx="2">
+            <a:schemeClr val="accent1">
+              <a:shade val="50000"/>
+            </a:schemeClr>
+          </a:lnRef>
+          <a:fillRef idx="1">
+            <a:schemeClr val="accent1"/>
+          </a:fillRef>
+          <a:effectRef idx="0">
+            <a:schemeClr val="accent1"/>
+          </a:effectRef>
+          <a:fontRef idx="minor">
+            <a:schemeClr val="lt1"/>
+          </a:fontRef>
+        </p:style>
+        <p:txBody>
+          <a:bodyPr rtlCol="0" anchor="ctr"/>
+          <a:lstStyle/>
+          <a:p>
+            <a:pPr algn="ctr"/>
+            <a:r>
+              <a:rPr lang="en-US" sz="5400" dirty="0">
+                <a:solidFill>
+                  <a:schemeClr val="tx1"/>
+                </a:solidFill>
+              </a:rPr>
+              <a:t>Bi-Directional Recurrent Layer</a:t>
+            </a:r>
+          </a:p>
+        </p:txBody>
+      </p:sp>
+      <p:sp>
+        <p:nvSpPr>
+          <p:cNvPr id="36" name="Rechteck 35">
+            <a:extLst>
+              <a:ext uri="{FF2B5EF4-FFF2-40B4-BE49-F238E27FC236}">
+                <a16:creationId xmlns:a16="http://schemas.microsoft.com/office/drawing/2014/main" id="{D61D6A3C-ADC9-4018-BF52-F2E5B2171604}"/>
+              </a:ext>
+            </a:extLst>
+          </p:cNvPr>
+          <p:cNvSpPr/>
+          <p:nvPr/>
+        </p:nvSpPr>
+        <p:spPr>
+          <a:xfrm>
+            <a:off x="4848902" y="2278547"/>
+            <a:ext cx="9501077" cy="773893"/>
+          </a:xfrm>
+          <a:prstGeom prst="rect">
+            <a:avLst/>
+          </a:prstGeom>
+          <a:noFill/>
+          <a:ln>
+            <a:solidFill>
+              <a:schemeClr val="tx1"/>
+            </a:solidFill>
+          </a:ln>
+        </p:spPr>
+        <p:style>
+          <a:lnRef idx="2">
+            <a:schemeClr val="accent1">
+              <a:shade val="50000"/>
+            </a:schemeClr>
+          </a:lnRef>
+          <a:fillRef idx="1">
+            <a:schemeClr val="accent1"/>
+          </a:fillRef>
+          <a:effectRef idx="0">
+            <a:schemeClr val="accent1"/>
+          </a:effectRef>
+          <a:fontRef idx="minor">
+            <a:schemeClr val="lt1"/>
+          </a:fontRef>
+        </p:style>
+        <p:txBody>
+          <a:bodyPr rtlCol="0" anchor="ctr"/>
+          <a:lstStyle/>
+          <a:p>
+            <a:pPr algn="ctr"/>
+            <a:r>
+              <a:rPr lang="en-US" sz="5400" dirty="0">
+                <a:solidFill>
+                  <a:schemeClr val="tx1"/>
+                </a:solidFill>
+              </a:rPr>
+              <a:t>Positional Embedding</a:t>
+            </a:r>
+          </a:p>
+        </p:txBody>
+      </p:sp>
+      <p:sp>
+        <p:nvSpPr>
+          <p:cNvPr id="7" name="Rechteck 6">
+            <a:extLst>
+              <a:ext uri="{FF2B5EF4-FFF2-40B4-BE49-F238E27FC236}">
+                <a16:creationId xmlns:a16="http://schemas.microsoft.com/office/drawing/2014/main" id="{6B8B916E-4C03-4E8C-96B8-03272AC55527}"/>
+              </a:ext>
+            </a:extLst>
+          </p:cNvPr>
+          <p:cNvSpPr/>
+          <p:nvPr/>
+        </p:nvSpPr>
+        <p:spPr>
+          <a:xfrm>
+            <a:off x="4848903" y="571185"/>
+            <a:ext cx="9501077" cy="670512"/>
+          </a:xfrm>
+          <a:prstGeom prst="rect">
+            <a:avLst/>
+          </a:prstGeom>
+          <a:noFill/>
+          <a:ln>
+            <a:noFill/>
+          </a:ln>
+        </p:spPr>
+        <p:style>
+          <a:lnRef idx="2">
+            <a:schemeClr val="accent1">
+              <a:shade val="50000"/>
+            </a:schemeClr>
+          </a:lnRef>
+          <a:fillRef idx="1">
+            <a:schemeClr val="accent1"/>
+          </a:fillRef>
+          <a:effectRef idx="0">
+            <a:schemeClr val="accent1"/>
+          </a:effectRef>
+          <a:fontRef idx="minor">
+            <a:schemeClr val="lt1"/>
+          </a:fontRef>
+        </p:style>
+        <p:txBody>
+          <a:bodyPr rtlCol="0" anchor="ctr"/>
+          <a:lstStyle/>
+          <a:p>
+            <a:pPr algn="ctr"/>
+            <a:r>
+              <a:rPr lang="en-US" sz="5400" dirty="0">
+                <a:solidFill>
+                  <a:schemeClr val="tx1"/>
+                </a:solidFill>
+              </a:rPr>
+              <a:t>Input</a:t>
+            </a:r>
+          </a:p>
+        </p:txBody>
+      </p:sp>
+      <p:sp>
+        <p:nvSpPr>
+          <p:cNvPr id="8" name="Rechteck 7">
+            <a:extLst>
+              <a:ext uri="{FF2B5EF4-FFF2-40B4-BE49-F238E27FC236}">
+                <a16:creationId xmlns:a16="http://schemas.microsoft.com/office/drawing/2014/main" id="{BEAF1DFA-F6EF-446A-8C48-3B4888F66800}"/>
+              </a:ext>
+            </a:extLst>
+          </p:cNvPr>
+          <p:cNvSpPr/>
+          <p:nvPr/>
+        </p:nvSpPr>
+        <p:spPr>
+          <a:xfrm>
+            <a:off x="4848897" y="9808165"/>
+            <a:ext cx="9501077" cy="773893"/>
+          </a:xfrm>
+          <a:prstGeom prst="rect">
+            <a:avLst/>
+          </a:prstGeom>
+          <a:noFill/>
+          <a:ln>
+            <a:solidFill>
+              <a:schemeClr val="tx1"/>
+            </a:solidFill>
+          </a:ln>
+        </p:spPr>
+        <p:style>
+          <a:lnRef idx="2">
+            <a:schemeClr val="accent1">
+              <a:shade val="50000"/>
+            </a:schemeClr>
+          </a:lnRef>
+          <a:fillRef idx="1">
+            <a:schemeClr val="accent1"/>
+          </a:fillRef>
+          <a:effectRef idx="0">
+            <a:schemeClr val="accent1"/>
+          </a:effectRef>
+          <a:fontRef idx="minor">
+            <a:schemeClr val="lt1"/>
+          </a:fontRef>
+        </p:style>
+        <p:txBody>
+          <a:bodyPr rtlCol="0" anchor="ctr"/>
+          <a:lstStyle/>
+          <a:p>
+            <a:pPr algn="ctr"/>
+            <a:r>
+              <a:rPr lang="en-US" sz="5400" dirty="0">
+                <a:solidFill>
+                  <a:schemeClr val="tx1"/>
+                </a:solidFill>
+              </a:rPr>
+              <a:t>…</a:t>
+            </a:r>
+          </a:p>
+        </p:txBody>
+      </p:sp>
+      <p:sp>
+        <p:nvSpPr>
+          <p:cNvPr id="9" name="Rechteck 8">
+            <a:extLst>
+              <a:ext uri="{FF2B5EF4-FFF2-40B4-BE49-F238E27FC236}">
+                <a16:creationId xmlns:a16="http://schemas.microsoft.com/office/drawing/2014/main" id="{0BB7C456-5096-4743-9861-70261BD6F4D6}"/>
+              </a:ext>
+            </a:extLst>
+          </p:cNvPr>
+          <p:cNvSpPr/>
+          <p:nvPr/>
+        </p:nvSpPr>
+        <p:spPr>
+          <a:xfrm>
+            <a:off x="4848901" y="7356537"/>
+            <a:ext cx="9501077" cy="773893"/>
+          </a:xfrm>
+          <a:prstGeom prst="rect">
+            <a:avLst/>
+          </a:prstGeom>
+          <a:noFill/>
+          <a:ln>
+            <a:solidFill>
+              <a:schemeClr val="tx1"/>
+            </a:solidFill>
+          </a:ln>
+        </p:spPr>
+        <p:style>
+          <a:lnRef idx="2">
+            <a:schemeClr val="accent1">
+              <a:shade val="50000"/>
+            </a:schemeClr>
+          </a:lnRef>
+          <a:fillRef idx="1">
+            <a:schemeClr val="accent1"/>
+          </a:fillRef>
+          <a:effectRef idx="0">
+            <a:schemeClr val="accent1"/>
+          </a:effectRef>
+          <a:fontRef idx="minor">
+            <a:schemeClr val="lt1"/>
+          </a:fontRef>
+        </p:style>
+        <p:txBody>
+          <a:bodyPr rtlCol="0" anchor="ctr"/>
+          <a:lstStyle/>
+          <a:p>
+            <a:pPr algn="ctr"/>
+            <a:r>
+              <a:rPr lang="en-US" sz="5400" dirty="0">
+                <a:solidFill>
+                  <a:schemeClr val="tx1"/>
+                </a:solidFill>
+              </a:rPr>
+              <a:t>Bi-Directional Recurrent Layer</a:t>
+            </a:r>
+          </a:p>
+        </p:txBody>
+      </p:sp>
+      <p:sp>
+        <p:nvSpPr>
+          <p:cNvPr id="16" name="Rechteck 15">
+            <a:extLst>
+              <a:ext uri="{FF2B5EF4-FFF2-40B4-BE49-F238E27FC236}">
+                <a16:creationId xmlns:a16="http://schemas.microsoft.com/office/drawing/2014/main" id="{D279CCA7-158C-4ABE-AC75-B8F8EDAFF10F}"/>
+              </a:ext>
+            </a:extLst>
+          </p:cNvPr>
+          <p:cNvSpPr/>
+          <p:nvPr/>
+        </p:nvSpPr>
+        <p:spPr>
+          <a:xfrm>
+            <a:off x="4874305" y="20071592"/>
+            <a:ext cx="9501077" cy="1503276"/>
+          </a:xfrm>
+          <a:prstGeom prst="rect">
+            <a:avLst/>
+          </a:prstGeom>
+          <a:noFill/>
+          <a:ln>
+            <a:solidFill>
+              <a:schemeClr val="tx1"/>
+            </a:solidFill>
+          </a:ln>
+        </p:spPr>
+        <p:style>
+          <a:lnRef idx="2">
+            <a:schemeClr val="accent1">
+              <a:shade val="50000"/>
+            </a:schemeClr>
+          </a:lnRef>
+          <a:fillRef idx="1">
+            <a:schemeClr val="accent1"/>
+          </a:fillRef>
+          <a:effectRef idx="0">
+            <a:schemeClr val="accent1"/>
+          </a:effectRef>
+          <a:fontRef idx="minor">
+            <a:schemeClr val="lt1"/>
+          </a:fontRef>
+        </p:style>
+        <p:txBody>
+          <a:bodyPr rtlCol="0" anchor="ctr"/>
+          <a:lstStyle/>
+          <a:p>
+            <a:pPr algn="ctr"/>
+            <a:r>
+              <a:rPr lang="en-US" sz="5400" dirty="0">
+                <a:solidFill>
+                  <a:schemeClr val="tx1"/>
+                </a:solidFill>
+              </a:rPr>
+              <a:t>Output Layer</a:t>
+            </a:r>
+          </a:p>
+        </p:txBody>
+      </p:sp>
+      <p:sp>
+        <p:nvSpPr>
+          <p:cNvPr id="20" name="Geschweifte Klammer rechts 19">
+            <a:extLst>
+              <a:ext uri="{FF2B5EF4-FFF2-40B4-BE49-F238E27FC236}">
+                <a16:creationId xmlns:a16="http://schemas.microsoft.com/office/drawing/2014/main" id="{8B2EEDE5-FB9E-467D-9DA0-637109260C98}"/>
+              </a:ext>
+            </a:extLst>
+          </p:cNvPr>
+          <p:cNvSpPr/>
+          <p:nvPr/>
+        </p:nvSpPr>
+        <p:spPr>
+          <a:xfrm>
+            <a:off x="14375383" y="7356537"/>
+            <a:ext cx="1418702" cy="4447228"/>
+          </a:xfrm>
+          <a:prstGeom prst="rightBrace">
+            <a:avLst/>
+          </a:prstGeom>
+          <a:ln w="57150">
+            <a:solidFill>
+              <a:schemeClr val="tx1"/>
+            </a:solidFill>
+          </a:ln>
+        </p:spPr>
+        <p:style>
+          <a:lnRef idx="1">
+            <a:schemeClr val="accent1"/>
+          </a:lnRef>
+          <a:fillRef idx="0">
+            <a:schemeClr val="accent1"/>
+          </a:fillRef>
+          <a:effectRef idx="0">
+            <a:schemeClr val="accent1"/>
+          </a:effectRef>
+          <a:fontRef idx="minor">
+            <a:schemeClr val="tx1"/>
+          </a:fontRef>
+        </p:style>
+        <p:txBody>
+          <a:bodyPr rtlCol="0" anchor="ctr"/>
+          <a:lstStyle/>
+          <a:p>
+            <a:pPr algn="ctr"/>
+            <a:endParaRPr lang="de-DE"/>
+          </a:p>
+        </p:txBody>
+      </p:sp>
+      <p:sp>
+        <p:nvSpPr>
+          <p:cNvPr id="21" name="Textfeld 20">
+            <a:extLst>
+              <a:ext uri="{FF2B5EF4-FFF2-40B4-BE49-F238E27FC236}">
+                <a16:creationId xmlns:a16="http://schemas.microsoft.com/office/drawing/2014/main" id="{68444309-94C9-4EF8-9AE6-F9DAFD73C057}"/>
+              </a:ext>
+            </a:extLst>
+          </p:cNvPr>
+          <p:cNvSpPr txBox="1"/>
+          <p:nvPr/>
+        </p:nvSpPr>
+        <p:spPr>
+          <a:xfrm>
+            <a:off x="16217900" y="7354312"/>
+            <a:ext cx="10782300" cy="5509200"/>
+          </a:xfrm>
+          <a:prstGeom prst="rect">
+            <a:avLst/>
+          </a:prstGeom>
+          <a:noFill/>
+        </p:spPr>
+        <p:txBody>
+          <a:bodyPr wrap="square" rtlCol="0">
+            <a:spAutoFit/>
+          </a:bodyPr>
+          <a:lstStyle/>
+          <a:p>
+            <a:r>
+              <a:rPr lang="en-US" sz="4400" b="1" i="1" dirty="0"/>
+              <a:t>Parameter</a:t>
+            </a:r>
+            <a:r>
+              <a:rPr lang="en-US" sz="4400" b="1" dirty="0"/>
+              <a:t> rec</a:t>
+            </a:r>
+          </a:p>
+          <a:p>
+            <a:r>
+              <a:rPr lang="en-US" sz="4400" dirty="0"/>
+              <a:t>Number of layers: Vector length </a:t>
+            </a:r>
+          </a:p>
+          <a:p>
+            <a:r>
+              <a:rPr lang="en-US" sz="4400" dirty="0"/>
+              <a:t>Number of neurons:  Vector elements</a:t>
+            </a:r>
+          </a:p>
+          <a:p>
+            <a:r>
+              <a:rPr lang="en-US" sz="4400" dirty="0"/>
+              <a:t>Times: automatic</a:t>
+            </a:r>
+          </a:p>
+          <a:p>
+            <a:r>
+              <a:rPr lang="en-US" sz="4400" dirty="0"/>
+              <a:t>Features: automatic</a:t>
+            </a:r>
+          </a:p>
+          <a:p>
+            <a:r>
+              <a:rPr lang="en-US" sz="4400" b="1" i="1" dirty="0"/>
+              <a:t>Parameter</a:t>
+            </a:r>
+            <a:r>
+              <a:rPr lang="en-US" sz="4400" b="1" dirty="0"/>
+              <a:t> </a:t>
+            </a:r>
+            <a:r>
+              <a:rPr lang="en-US" sz="4400" b="1" dirty="0" err="1"/>
+              <a:t>rec_dropout</a:t>
+            </a:r>
+            <a:endParaRPr lang="en-US" sz="4400" b="1" dirty="0"/>
+          </a:p>
+          <a:p>
+            <a:r>
+              <a:rPr lang="en-US" sz="4400" b="1" i="1" dirty="0"/>
+              <a:t>Parameter</a:t>
+            </a:r>
+            <a:r>
+              <a:rPr lang="en-US" sz="4400" b="1" dirty="0"/>
+              <a:t> </a:t>
+            </a:r>
+            <a:r>
+              <a:rPr lang="en-US" sz="4400" b="1" dirty="0" err="1"/>
+              <a:t>recurrent_dropout</a:t>
+            </a:r>
+            <a:r>
+              <a:rPr lang="en-US" sz="4400" b="1" dirty="0"/>
+              <a:t> </a:t>
+            </a:r>
+            <a:r>
+              <a:rPr lang="en-US" sz="4400" dirty="0"/>
+              <a:t>(</a:t>
+            </a:r>
+            <a:r>
+              <a:rPr lang="en-US" sz="4400" dirty="0" err="1"/>
+              <a:t>keras</a:t>
+            </a:r>
+            <a:r>
+              <a:rPr lang="en-US" sz="4400" dirty="0"/>
+              <a:t> only)</a:t>
+            </a:r>
+          </a:p>
+          <a:p>
+            <a:endParaRPr lang="en-US" sz="4400" dirty="0"/>
+          </a:p>
+        </p:txBody>
+      </p:sp>
+      <p:sp>
+        <p:nvSpPr>
+          <p:cNvPr id="22" name="Geschweifte Klammer rechts 21">
+            <a:extLst>
+              <a:ext uri="{FF2B5EF4-FFF2-40B4-BE49-F238E27FC236}">
+                <a16:creationId xmlns:a16="http://schemas.microsoft.com/office/drawing/2014/main" id="{B15D5E2C-13A0-4DD3-AAA8-6DA910900DA5}"/>
+              </a:ext>
+            </a:extLst>
+          </p:cNvPr>
+          <p:cNvSpPr/>
+          <p:nvPr/>
+        </p:nvSpPr>
+        <p:spPr>
+          <a:xfrm>
+            <a:off x="14548741" y="3579390"/>
+            <a:ext cx="1245344" cy="3087223"/>
+          </a:xfrm>
+          <a:prstGeom prst="rightBrace">
+            <a:avLst/>
+          </a:prstGeom>
+          <a:ln w="57150">
+            <a:solidFill>
+              <a:schemeClr val="tx1"/>
+            </a:solidFill>
+          </a:ln>
+        </p:spPr>
+        <p:style>
+          <a:lnRef idx="1">
+            <a:schemeClr val="accent1"/>
+          </a:lnRef>
+          <a:fillRef idx="0">
+            <a:schemeClr val="accent1"/>
+          </a:fillRef>
+          <a:effectRef idx="0">
+            <a:schemeClr val="accent1"/>
+          </a:effectRef>
+          <a:fontRef idx="minor">
+            <a:schemeClr val="tx1"/>
+          </a:fontRef>
+        </p:style>
+        <p:txBody>
+          <a:bodyPr rtlCol="0" anchor="ctr"/>
+          <a:lstStyle/>
+          <a:p>
+            <a:pPr algn="ctr"/>
+            <a:endParaRPr lang="de-DE"/>
+          </a:p>
+        </p:txBody>
+      </p:sp>
+      <p:sp>
+        <p:nvSpPr>
+          <p:cNvPr id="23" name="Textfeld 22">
+            <a:extLst>
+              <a:ext uri="{FF2B5EF4-FFF2-40B4-BE49-F238E27FC236}">
+                <a16:creationId xmlns:a16="http://schemas.microsoft.com/office/drawing/2014/main" id="{9F0E207E-D67C-4A90-B554-01CEC959B9A9}"/>
+              </a:ext>
+            </a:extLst>
+          </p:cNvPr>
+          <p:cNvSpPr txBox="1"/>
+          <p:nvPr/>
+        </p:nvSpPr>
+        <p:spPr>
+          <a:xfrm>
+            <a:off x="16217900" y="3381838"/>
+            <a:ext cx="10782300" cy="3477875"/>
+          </a:xfrm>
+          <a:prstGeom prst="rect">
+            <a:avLst/>
+          </a:prstGeom>
+          <a:noFill/>
+        </p:spPr>
+        <p:txBody>
+          <a:bodyPr wrap="square" rtlCol="0">
+            <a:spAutoFit/>
+          </a:bodyPr>
+          <a:lstStyle/>
+          <a:p>
+            <a:r>
+              <a:rPr lang="en-US" sz="4400" b="1" i="1" dirty="0"/>
+              <a:t>Parameter </a:t>
+            </a:r>
+            <a:r>
+              <a:rPr lang="en-US" sz="4400" b="1" i="1" dirty="0" err="1"/>
+              <a:t>attention_type</a:t>
+            </a:r>
+            <a:endParaRPr lang="en-US" sz="4400" b="1" i="1" dirty="0"/>
+          </a:p>
+          <a:p>
+            <a:r>
+              <a:rPr lang="en-US" sz="4400" b="1" i="1" dirty="0"/>
+              <a:t>Parameter</a:t>
+            </a:r>
+            <a:r>
+              <a:rPr lang="en-US" sz="4400" b="1" dirty="0"/>
+              <a:t> </a:t>
+            </a:r>
+            <a:r>
+              <a:rPr lang="en-US" sz="4400" b="1" dirty="0" err="1"/>
+              <a:t>self_attention_heads</a:t>
+            </a:r>
+            <a:endParaRPr lang="en-US" sz="4400" b="1" dirty="0"/>
+          </a:p>
+          <a:p>
+            <a:r>
+              <a:rPr lang="en-US" sz="4400" dirty="0"/>
+              <a:t>Number of heads for type “</a:t>
+            </a:r>
+            <a:r>
+              <a:rPr lang="en-US" sz="4400" dirty="0" err="1"/>
+              <a:t>multihead</a:t>
+            </a:r>
+            <a:r>
+              <a:rPr lang="en-US" sz="4400" dirty="0"/>
+              <a:t>”</a:t>
+            </a:r>
+          </a:p>
+          <a:p>
+            <a:r>
+              <a:rPr lang="en-US" sz="4400" b="1" i="1" dirty="0"/>
+              <a:t>Parameter</a:t>
+            </a:r>
+            <a:r>
+              <a:rPr lang="en-US" sz="4400" b="1" dirty="0"/>
+              <a:t> </a:t>
+            </a:r>
+            <a:r>
+              <a:rPr lang="en-US" sz="4400" b="1" dirty="0" err="1"/>
+              <a:t>encoder_dropout</a:t>
+            </a:r>
+            <a:endParaRPr lang="en-US" sz="4400" b="1" dirty="0"/>
+          </a:p>
+          <a:p>
+            <a:r>
+              <a:rPr lang="en-US" sz="4400" b="1" i="1" dirty="0"/>
+              <a:t>Parameter</a:t>
+            </a:r>
+            <a:r>
+              <a:rPr lang="en-US" sz="4400" b="1" dirty="0"/>
+              <a:t> repeat encoder</a:t>
+            </a:r>
+          </a:p>
+        </p:txBody>
+      </p:sp>
+      <p:sp>
+        <p:nvSpPr>
+          <p:cNvPr id="24" name="Textfeld 23">
+            <a:extLst>
+              <a:ext uri="{FF2B5EF4-FFF2-40B4-BE49-F238E27FC236}">
+                <a16:creationId xmlns:a16="http://schemas.microsoft.com/office/drawing/2014/main" id="{206DE3D7-B726-4358-8BF1-625EC4DF0B4B}"/>
+              </a:ext>
+            </a:extLst>
+          </p:cNvPr>
+          <p:cNvSpPr txBox="1"/>
+          <p:nvPr/>
+        </p:nvSpPr>
+        <p:spPr>
+          <a:xfrm>
+            <a:off x="16014716" y="14615336"/>
+            <a:ext cx="10782300" cy="2800767"/>
+          </a:xfrm>
+          <a:prstGeom prst="rect">
+            <a:avLst/>
+          </a:prstGeom>
+          <a:noFill/>
+        </p:spPr>
+        <p:txBody>
+          <a:bodyPr wrap="square" rtlCol="0">
+            <a:spAutoFit/>
+          </a:bodyPr>
+          <a:lstStyle/>
+          <a:p>
+            <a:r>
+              <a:rPr lang="en-US" sz="4400" b="1" i="1" dirty="0"/>
+              <a:t>Parameter</a:t>
+            </a:r>
+            <a:r>
+              <a:rPr lang="en-US" sz="4400" b="1" dirty="0"/>
+              <a:t> hidden</a:t>
+            </a:r>
+          </a:p>
+          <a:p>
+            <a:r>
+              <a:rPr lang="en-US" sz="4400" dirty="0"/>
+              <a:t>Number of layers: Vector length</a:t>
+            </a:r>
+          </a:p>
+          <a:p>
+            <a:r>
+              <a:rPr lang="en-US" sz="4400" dirty="0"/>
+              <a:t>Number of neurons:  Vector elements</a:t>
+            </a:r>
+            <a:br>
+              <a:rPr lang="en-US" sz="4400" dirty="0"/>
+            </a:br>
+            <a:r>
+              <a:rPr lang="en-US" sz="4400" b="1" i="1" dirty="0"/>
+              <a:t>Parameter</a:t>
+            </a:r>
+            <a:r>
+              <a:rPr lang="en-US" sz="4400" b="1" dirty="0"/>
+              <a:t> </a:t>
+            </a:r>
+            <a:r>
+              <a:rPr lang="en-US" sz="4400" b="1" dirty="0" err="1"/>
+              <a:t>dense_dropout</a:t>
+            </a:r>
+            <a:endParaRPr lang="en-US" sz="4400" b="1" dirty="0"/>
+          </a:p>
+        </p:txBody>
+      </p:sp>
+      <p:sp>
+        <p:nvSpPr>
+          <p:cNvPr id="25" name="Geschweifte Klammer rechts 24">
+            <a:extLst>
+              <a:ext uri="{FF2B5EF4-FFF2-40B4-BE49-F238E27FC236}">
+                <a16:creationId xmlns:a16="http://schemas.microsoft.com/office/drawing/2014/main" id="{2B474CBA-746C-4A40-B3DC-AB7ECFABCD94}"/>
+              </a:ext>
+            </a:extLst>
+          </p:cNvPr>
+          <p:cNvSpPr/>
+          <p:nvPr/>
+        </p:nvSpPr>
+        <p:spPr>
+          <a:xfrm>
+            <a:off x="14392892" y="14637761"/>
+            <a:ext cx="1401188" cy="4427028"/>
+          </a:xfrm>
+          <a:prstGeom prst="rightBrace">
+            <a:avLst>
+              <a:gd name="adj1" fmla="val 8333"/>
+              <a:gd name="adj2" fmla="val 47335"/>
+            </a:avLst>
+          </a:prstGeom>
+          <a:ln w="57150">
+            <a:solidFill>
+              <a:schemeClr val="tx1"/>
+            </a:solidFill>
+          </a:ln>
+        </p:spPr>
+        <p:style>
+          <a:lnRef idx="1">
+            <a:schemeClr val="accent1"/>
+          </a:lnRef>
+          <a:fillRef idx="0">
+            <a:schemeClr val="accent1"/>
+          </a:fillRef>
+          <a:effectRef idx="0">
+            <a:schemeClr val="accent1"/>
+          </a:effectRef>
+          <a:fontRef idx="minor">
+            <a:schemeClr val="tx1"/>
+          </a:fontRef>
+        </p:style>
+        <p:txBody>
+          <a:bodyPr rtlCol="0" anchor="ctr"/>
+          <a:lstStyle/>
+          <a:p>
+            <a:pPr algn="ctr"/>
+            <a:endParaRPr lang="de-DE"/>
+          </a:p>
+        </p:txBody>
+      </p:sp>
+      <p:sp>
+        <p:nvSpPr>
+          <p:cNvPr id="26" name="Textfeld 25">
+            <a:extLst>
+              <a:ext uri="{FF2B5EF4-FFF2-40B4-BE49-F238E27FC236}">
+                <a16:creationId xmlns:a16="http://schemas.microsoft.com/office/drawing/2014/main" id="{B2697EB0-26B5-4482-86DA-5F49F49FE17F}"/>
+              </a:ext>
+            </a:extLst>
+          </p:cNvPr>
+          <p:cNvSpPr txBox="1"/>
+          <p:nvPr/>
+        </p:nvSpPr>
+        <p:spPr>
+          <a:xfrm>
+            <a:off x="16014716" y="20436284"/>
+            <a:ext cx="10782300" cy="769441"/>
+          </a:xfrm>
+          <a:prstGeom prst="rect">
+            <a:avLst/>
+          </a:prstGeom>
+          <a:noFill/>
+        </p:spPr>
+        <p:txBody>
+          <a:bodyPr wrap="square" rtlCol="0">
+            <a:spAutoFit/>
+          </a:bodyPr>
+          <a:lstStyle/>
+          <a:p>
+            <a:r>
+              <a:rPr lang="en-US" sz="4400" b="1" dirty="0"/>
+              <a:t>automatic</a:t>
+            </a:r>
+          </a:p>
+        </p:txBody>
+      </p:sp>
+      <p:cxnSp>
+        <p:nvCxnSpPr>
+          <p:cNvPr id="39" name="Gerade Verbindung mit Pfeil 38">
+            <a:extLst>
+              <a:ext uri="{FF2B5EF4-FFF2-40B4-BE49-F238E27FC236}">
+                <a16:creationId xmlns:a16="http://schemas.microsoft.com/office/drawing/2014/main" id="{DD3C21BD-DC7A-4EEA-826D-CBED0557DA57}"/>
+              </a:ext>
+            </a:extLst>
+          </p:cNvPr>
+          <p:cNvCxnSpPr>
+            <a:cxnSpLocks/>
+            <a:stCxn id="9" idx="2"/>
+            <a:endCxn id="46" idx="0"/>
+          </p:cNvCxnSpPr>
+          <p:nvPr/>
+        </p:nvCxnSpPr>
+        <p:spPr>
+          <a:xfrm flipH="1">
+            <a:off x="9599437" y="8130430"/>
+            <a:ext cx="3" cy="456028"/>
+          </a:xfrm>
+          <a:prstGeom prst="straightConnector1">
+            <a:avLst/>
+          </a:prstGeom>
+          <a:ln w="57150">
+            <a:solidFill>
+              <a:schemeClr val="tx1"/>
+            </a:solidFill>
+            <a:tailEnd type="triangle"/>
+          </a:ln>
+        </p:spPr>
+        <p:style>
+          <a:lnRef idx="1">
+            <a:schemeClr val="accent1"/>
+          </a:lnRef>
+          <a:fillRef idx="0">
+            <a:schemeClr val="accent1"/>
+          </a:fillRef>
+          <a:effectRef idx="0">
+            <a:schemeClr val="accent1"/>
+          </a:effectRef>
+          <a:fontRef idx="minor">
+            <a:schemeClr val="tx1"/>
+          </a:fontRef>
+        </p:style>
+      </p:cxnSp>
+      <p:cxnSp>
+        <p:nvCxnSpPr>
+          <p:cNvPr id="51" name="Gerade Verbindung mit Pfeil 50">
+            <a:extLst>
+              <a:ext uri="{FF2B5EF4-FFF2-40B4-BE49-F238E27FC236}">
+                <a16:creationId xmlns:a16="http://schemas.microsoft.com/office/drawing/2014/main" id="{2D4080D6-E53E-4979-B8E0-BBDE91EBDCD6}"/>
+              </a:ext>
+            </a:extLst>
+          </p:cNvPr>
+          <p:cNvCxnSpPr>
+            <a:cxnSpLocks/>
+            <a:endCxn id="16" idx="0"/>
+          </p:cNvCxnSpPr>
+          <p:nvPr/>
+        </p:nvCxnSpPr>
+        <p:spPr>
+          <a:xfrm>
+            <a:off x="9624844" y="19148526"/>
+            <a:ext cx="0" cy="923066"/>
+          </a:xfrm>
+          <a:prstGeom prst="straightConnector1">
+            <a:avLst/>
+          </a:prstGeom>
+          <a:ln w="57150">
+            <a:solidFill>
+              <a:schemeClr val="tx1"/>
+            </a:solidFill>
+            <a:tailEnd type="triangle"/>
+          </a:ln>
+        </p:spPr>
+        <p:style>
+          <a:lnRef idx="1">
+            <a:schemeClr val="accent1"/>
+          </a:lnRef>
+          <a:fillRef idx="0">
+            <a:schemeClr val="accent1"/>
+          </a:fillRef>
+          <a:effectRef idx="0">
+            <a:schemeClr val="accent1"/>
+          </a:effectRef>
+          <a:fontRef idx="minor">
+            <a:schemeClr val="tx1"/>
+          </a:fontRef>
+        </p:style>
+      </p:cxnSp>
+      <p:sp>
+        <p:nvSpPr>
+          <p:cNvPr id="44" name="Rechteck 43">
+            <a:extLst>
+              <a:ext uri="{FF2B5EF4-FFF2-40B4-BE49-F238E27FC236}">
+                <a16:creationId xmlns:a16="http://schemas.microsoft.com/office/drawing/2014/main" id="{07C8F606-3C61-445C-91EF-A53CE8FB867A}"/>
+              </a:ext>
+            </a:extLst>
+          </p:cNvPr>
+          <p:cNvSpPr/>
+          <p:nvPr/>
+        </p:nvSpPr>
+        <p:spPr>
+          <a:xfrm>
+            <a:off x="4848901" y="3538112"/>
+            <a:ext cx="9501077" cy="773893"/>
+          </a:xfrm>
+          <a:prstGeom prst="rect">
+            <a:avLst/>
+          </a:prstGeom>
+          <a:noFill/>
+          <a:ln>
+            <a:solidFill>
+              <a:schemeClr val="tx1"/>
+            </a:solidFill>
+          </a:ln>
+        </p:spPr>
+        <p:style>
+          <a:lnRef idx="2">
+            <a:schemeClr val="accent1">
+              <a:shade val="50000"/>
+            </a:schemeClr>
+          </a:lnRef>
+          <a:fillRef idx="1">
+            <a:schemeClr val="accent1"/>
+          </a:fillRef>
+          <a:effectRef idx="0">
+            <a:schemeClr val="accent1"/>
+          </a:effectRef>
+          <a:fontRef idx="minor">
+            <a:schemeClr val="lt1"/>
+          </a:fontRef>
+        </p:style>
+        <p:txBody>
+          <a:bodyPr rtlCol="0" anchor="ctr"/>
+          <a:lstStyle/>
+          <a:p>
+            <a:pPr algn="ctr"/>
+            <a:r>
+              <a:rPr lang="en-US" sz="5400" dirty="0">
+                <a:solidFill>
+                  <a:schemeClr val="tx1"/>
+                </a:solidFill>
+              </a:rPr>
+              <a:t>Transformer Encoder Layer</a:t>
+            </a:r>
+          </a:p>
+        </p:txBody>
+      </p:sp>
+      <p:sp>
+        <p:nvSpPr>
+          <p:cNvPr id="46" name="Rechteck 45">
+            <a:extLst>
+              <a:ext uri="{FF2B5EF4-FFF2-40B4-BE49-F238E27FC236}">
+                <a16:creationId xmlns:a16="http://schemas.microsoft.com/office/drawing/2014/main" id="{503D268E-4602-4506-8D4F-C7E318AB2DAB}"/>
+              </a:ext>
+            </a:extLst>
+          </p:cNvPr>
+          <p:cNvSpPr/>
+          <p:nvPr/>
+        </p:nvSpPr>
+        <p:spPr>
+          <a:xfrm>
+            <a:off x="4848898" y="8586458"/>
+            <a:ext cx="9501077" cy="773893"/>
+          </a:xfrm>
+          <a:prstGeom prst="rect">
+            <a:avLst/>
+          </a:prstGeom>
+          <a:noFill/>
+          <a:ln>
+            <a:solidFill>
+              <a:schemeClr val="tx1"/>
+            </a:solidFill>
+          </a:ln>
+        </p:spPr>
+        <p:style>
+          <a:lnRef idx="2">
+            <a:schemeClr val="accent1">
+              <a:shade val="50000"/>
+            </a:schemeClr>
+          </a:lnRef>
+          <a:fillRef idx="1">
+            <a:schemeClr val="accent1"/>
+          </a:fillRef>
+          <a:effectRef idx="0">
+            <a:schemeClr val="accent1"/>
+          </a:effectRef>
+          <a:fontRef idx="minor">
+            <a:schemeClr val="lt1"/>
+          </a:fontRef>
+        </p:style>
+        <p:txBody>
+          <a:bodyPr rtlCol="0" anchor="ctr"/>
+          <a:lstStyle/>
+          <a:p>
+            <a:pPr algn="ctr"/>
+            <a:r>
+              <a:rPr lang="en-US" sz="5400" dirty="0">
+                <a:solidFill>
+                  <a:schemeClr val="tx1"/>
+                </a:solidFill>
+              </a:rPr>
+              <a:t>Dropout Layer</a:t>
+            </a:r>
+          </a:p>
+        </p:txBody>
+      </p:sp>
+      <p:cxnSp>
+        <p:nvCxnSpPr>
+          <p:cNvPr id="50" name="Gerade Verbindung mit Pfeil 49">
+            <a:extLst>
+              <a:ext uri="{FF2B5EF4-FFF2-40B4-BE49-F238E27FC236}">
+                <a16:creationId xmlns:a16="http://schemas.microsoft.com/office/drawing/2014/main" id="{7E5935AA-3A35-4C6D-AD53-2B2ED08F5F6F}"/>
+              </a:ext>
+            </a:extLst>
+          </p:cNvPr>
+          <p:cNvCxnSpPr>
+            <a:cxnSpLocks/>
+            <a:stCxn id="46" idx="2"/>
+            <a:endCxn id="8" idx="0"/>
+          </p:cNvCxnSpPr>
+          <p:nvPr/>
+        </p:nvCxnSpPr>
+        <p:spPr>
+          <a:xfrm flipH="1">
+            <a:off x="9599436" y="9360351"/>
+            <a:ext cx="1" cy="447814"/>
+          </a:xfrm>
+          <a:prstGeom prst="straightConnector1">
+            <a:avLst/>
+          </a:prstGeom>
+          <a:ln w="57150">
+            <a:solidFill>
+              <a:schemeClr val="tx1"/>
+            </a:solidFill>
+            <a:tailEnd type="triangle"/>
+          </a:ln>
+        </p:spPr>
+        <p:style>
+          <a:lnRef idx="1">
+            <a:schemeClr val="accent1"/>
+          </a:lnRef>
+          <a:fillRef idx="0">
+            <a:schemeClr val="accent1"/>
+          </a:fillRef>
+          <a:effectRef idx="0">
+            <a:schemeClr val="accent1"/>
+          </a:effectRef>
+          <a:fontRef idx="minor">
+            <a:schemeClr val="tx1"/>
+          </a:fontRef>
+        </p:style>
+      </p:cxnSp>
+      <p:cxnSp>
+        <p:nvCxnSpPr>
+          <p:cNvPr id="54" name="Gerade Verbindung mit Pfeil 53">
+            <a:extLst>
+              <a:ext uri="{FF2B5EF4-FFF2-40B4-BE49-F238E27FC236}">
+                <a16:creationId xmlns:a16="http://schemas.microsoft.com/office/drawing/2014/main" id="{3E1026C0-5AE6-4EA6-82A9-B84455D67E67}"/>
+              </a:ext>
+            </a:extLst>
+          </p:cNvPr>
+          <p:cNvCxnSpPr>
+            <a:cxnSpLocks/>
+            <a:stCxn id="8" idx="2"/>
+            <a:endCxn id="53" idx="0"/>
+          </p:cNvCxnSpPr>
+          <p:nvPr/>
+        </p:nvCxnSpPr>
+        <p:spPr>
+          <a:xfrm flipH="1">
+            <a:off x="9599435" y="10582058"/>
+            <a:ext cx="1" cy="447814"/>
+          </a:xfrm>
+          <a:prstGeom prst="straightConnector1">
+            <a:avLst/>
+          </a:prstGeom>
+          <a:ln w="57150">
+            <a:solidFill>
+              <a:schemeClr val="tx1"/>
+            </a:solidFill>
+            <a:tailEnd type="triangle"/>
+          </a:ln>
+        </p:spPr>
+        <p:style>
+          <a:lnRef idx="1">
+            <a:schemeClr val="accent1"/>
+          </a:lnRef>
+          <a:fillRef idx="0">
+            <a:schemeClr val="accent1"/>
+          </a:fillRef>
+          <a:effectRef idx="0">
+            <a:schemeClr val="accent1"/>
+          </a:effectRef>
+          <a:fontRef idx="minor">
+            <a:schemeClr val="tx1"/>
+          </a:fontRef>
+        </p:style>
+      </p:cxnSp>
+      <p:sp>
+        <p:nvSpPr>
+          <p:cNvPr id="61" name="Rechteck 60">
+            <a:extLst>
+              <a:ext uri="{FF2B5EF4-FFF2-40B4-BE49-F238E27FC236}">
+                <a16:creationId xmlns:a16="http://schemas.microsoft.com/office/drawing/2014/main" id="{709F2D4D-3F71-4955-8F78-873149B66B48}"/>
+              </a:ext>
+            </a:extLst>
+          </p:cNvPr>
+          <p:cNvSpPr/>
+          <p:nvPr/>
+        </p:nvSpPr>
+        <p:spPr>
+          <a:xfrm>
+            <a:off x="4848895" y="12430659"/>
+            <a:ext cx="9501077" cy="1503276"/>
+          </a:xfrm>
+          <a:prstGeom prst="rect">
+            <a:avLst/>
+          </a:prstGeom>
+          <a:noFill/>
+          <a:ln>
+            <a:solidFill>
+              <a:schemeClr val="tx1"/>
+            </a:solidFill>
+          </a:ln>
+        </p:spPr>
+        <p:style>
+          <a:lnRef idx="2">
+            <a:schemeClr val="accent1">
+              <a:shade val="50000"/>
+            </a:schemeClr>
+          </a:lnRef>
+          <a:fillRef idx="1">
+            <a:schemeClr val="accent1"/>
+          </a:fillRef>
+          <a:effectRef idx="0">
+            <a:schemeClr val="accent1"/>
+          </a:effectRef>
+          <a:fontRef idx="minor">
+            <a:schemeClr val="lt1"/>
+          </a:fontRef>
+        </p:style>
+        <p:txBody>
+          <a:bodyPr rtlCol="0" anchor="ctr"/>
+          <a:lstStyle/>
+          <a:p>
+            <a:pPr algn="ctr"/>
+            <a:r>
+              <a:rPr lang="en-US" sz="5400" dirty="0">
+                <a:solidFill>
+                  <a:schemeClr val="tx1"/>
+                </a:solidFill>
+              </a:rPr>
+              <a:t>Global Average Pooling</a:t>
+            </a:r>
+          </a:p>
+        </p:txBody>
+      </p:sp>
+      <p:cxnSp>
+        <p:nvCxnSpPr>
+          <p:cNvPr id="66" name="Gerade Verbindung mit Pfeil 65">
+            <a:extLst>
+              <a:ext uri="{FF2B5EF4-FFF2-40B4-BE49-F238E27FC236}">
+                <a16:creationId xmlns:a16="http://schemas.microsoft.com/office/drawing/2014/main" id="{F37C4DEC-A186-403E-A5DF-220779B77095}"/>
+              </a:ext>
+            </a:extLst>
+          </p:cNvPr>
+          <p:cNvCxnSpPr>
+            <a:cxnSpLocks/>
+            <a:stCxn id="36" idx="2"/>
+            <a:endCxn id="44" idx="0"/>
+          </p:cNvCxnSpPr>
+          <p:nvPr/>
+        </p:nvCxnSpPr>
+        <p:spPr>
+          <a:xfrm flipH="1">
+            <a:off x="9599440" y="3052440"/>
+            <a:ext cx="1" cy="485672"/>
+          </a:xfrm>
+          <a:prstGeom prst="straightConnector1">
+            <a:avLst/>
+          </a:prstGeom>
+          <a:ln w="57150">
+            <a:solidFill>
+              <a:schemeClr val="tx1"/>
+            </a:solidFill>
+            <a:tailEnd type="triangle"/>
+          </a:ln>
+        </p:spPr>
+        <p:style>
+          <a:lnRef idx="1">
+            <a:schemeClr val="accent1"/>
+          </a:lnRef>
+          <a:fillRef idx="0">
+            <a:schemeClr val="accent1"/>
+          </a:fillRef>
+          <a:effectRef idx="0">
+            <a:schemeClr val="accent1"/>
+          </a:effectRef>
+          <a:fontRef idx="minor">
+            <a:schemeClr val="tx1"/>
+          </a:fontRef>
+        </p:style>
+      </p:cxnSp>
+      <p:sp>
+        <p:nvSpPr>
+          <p:cNvPr id="73" name="Rechteck 72">
+            <a:extLst>
+              <a:ext uri="{FF2B5EF4-FFF2-40B4-BE49-F238E27FC236}">
+                <a16:creationId xmlns:a16="http://schemas.microsoft.com/office/drawing/2014/main" id="{AC4DB139-BA50-486F-850C-00F05FA08542}"/>
+              </a:ext>
+            </a:extLst>
+          </p:cNvPr>
+          <p:cNvSpPr/>
+          <p:nvPr/>
+        </p:nvSpPr>
+        <p:spPr>
+          <a:xfrm>
+            <a:off x="4848900" y="4782688"/>
+            <a:ext cx="9501077" cy="773893"/>
+          </a:xfrm>
+          <a:prstGeom prst="rect">
+            <a:avLst/>
+          </a:prstGeom>
+          <a:noFill/>
+          <a:ln>
+            <a:solidFill>
+              <a:schemeClr val="tx1"/>
+            </a:solidFill>
+          </a:ln>
+        </p:spPr>
+        <p:style>
+          <a:lnRef idx="2">
+            <a:schemeClr val="accent1">
+              <a:shade val="50000"/>
+            </a:schemeClr>
+          </a:lnRef>
+          <a:fillRef idx="1">
+            <a:schemeClr val="accent1"/>
+          </a:fillRef>
+          <a:effectRef idx="0">
+            <a:schemeClr val="accent1"/>
+          </a:effectRef>
+          <a:fontRef idx="minor">
+            <a:schemeClr val="lt1"/>
+          </a:fontRef>
+        </p:style>
+        <p:txBody>
+          <a:bodyPr rtlCol="0" anchor="ctr"/>
+          <a:lstStyle/>
+          <a:p>
+            <a:pPr algn="ctr"/>
+            <a:r>
+              <a:rPr lang="en-US" sz="5400" dirty="0">
+                <a:solidFill>
+                  <a:schemeClr val="tx1"/>
+                </a:solidFill>
+              </a:rPr>
+              <a:t>…</a:t>
+            </a:r>
+          </a:p>
+        </p:txBody>
+      </p:sp>
+      <p:sp>
+        <p:nvSpPr>
+          <p:cNvPr id="74" name="Rechteck 73">
+            <a:extLst>
+              <a:ext uri="{FF2B5EF4-FFF2-40B4-BE49-F238E27FC236}">
+                <a16:creationId xmlns:a16="http://schemas.microsoft.com/office/drawing/2014/main" id="{706499BE-7352-4F0C-BFA7-0B590254CD65}"/>
+              </a:ext>
+            </a:extLst>
+          </p:cNvPr>
+          <p:cNvSpPr/>
+          <p:nvPr/>
+        </p:nvSpPr>
+        <p:spPr>
+          <a:xfrm>
+            <a:off x="4848899" y="5961509"/>
+            <a:ext cx="9501077" cy="773893"/>
+          </a:xfrm>
+          <a:prstGeom prst="rect">
+            <a:avLst/>
+          </a:prstGeom>
+          <a:noFill/>
+          <a:ln>
+            <a:solidFill>
+              <a:schemeClr val="tx1"/>
+            </a:solidFill>
+          </a:ln>
+        </p:spPr>
+        <p:style>
+          <a:lnRef idx="2">
+            <a:schemeClr val="accent1">
+              <a:shade val="50000"/>
+            </a:schemeClr>
+          </a:lnRef>
+          <a:fillRef idx="1">
+            <a:schemeClr val="accent1"/>
+          </a:fillRef>
+          <a:effectRef idx="0">
+            <a:schemeClr val="accent1"/>
+          </a:effectRef>
+          <a:fontRef idx="minor">
+            <a:schemeClr val="lt1"/>
+          </a:fontRef>
+        </p:style>
+        <p:txBody>
+          <a:bodyPr rtlCol="0" anchor="ctr"/>
+          <a:lstStyle/>
+          <a:p>
+            <a:pPr algn="ctr"/>
+            <a:r>
+              <a:rPr lang="en-US" sz="5400" dirty="0">
+                <a:solidFill>
+                  <a:schemeClr val="tx1"/>
+                </a:solidFill>
+              </a:rPr>
+              <a:t>Transformer Encoder Layer</a:t>
+            </a:r>
+          </a:p>
+        </p:txBody>
+      </p:sp>
+      <p:cxnSp>
+        <p:nvCxnSpPr>
+          <p:cNvPr id="75" name="Gerade Verbindung mit Pfeil 74">
+            <a:extLst>
+              <a:ext uri="{FF2B5EF4-FFF2-40B4-BE49-F238E27FC236}">
+                <a16:creationId xmlns:a16="http://schemas.microsoft.com/office/drawing/2014/main" id="{6831C924-90C5-41CA-9E5C-A46EC2745162}"/>
+              </a:ext>
+            </a:extLst>
+          </p:cNvPr>
+          <p:cNvCxnSpPr>
+            <a:cxnSpLocks/>
+            <a:stCxn id="44" idx="2"/>
+            <a:endCxn id="73" idx="0"/>
+          </p:cNvCxnSpPr>
+          <p:nvPr/>
+        </p:nvCxnSpPr>
+        <p:spPr>
+          <a:xfrm flipH="1">
+            <a:off x="9599439" y="4312005"/>
+            <a:ext cx="1" cy="470683"/>
+          </a:xfrm>
+          <a:prstGeom prst="straightConnector1">
+            <a:avLst/>
+          </a:prstGeom>
+          <a:ln w="57150">
+            <a:solidFill>
+              <a:schemeClr val="tx1"/>
+            </a:solidFill>
+            <a:tailEnd type="triangle"/>
+          </a:ln>
+        </p:spPr>
+        <p:style>
+          <a:lnRef idx="1">
+            <a:schemeClr val="accent1"/>
+          </a:lnRef>
+          <a:fillRef idx="0">
+            <a:schemeClr val="accent1"/>
+          </a:fillRef>
+          <a:effectRef idx="0">
+            <a:schemeClr val="accent1"/>
+          </a:effectRef>
+          <a:fontRef idx="minor">
+            <a:schemeClr val="tx1"/>
+          </a:fontRef>
+        </p:style>
+      </p:cxnSp>
+      <p:cxnSp>
+        <p:nvCxnSpPr>
+          <p:cNvPr id="78" name="Gerade Verbindung mit Pfeil 77">
+            <a:extLst>
+              <a:ext uri="{FF2B5EF4-FFF2-40B4-BE49-F238E27FC236}">
+                <a16:creationId xmlns:a16="http://schemas.microsoft.com/office/drawing/2014/main" id="{447CDE81-2C7F-4181-94C6-5F9B9A994375}"/>
+              </a:ext>
+            </a:extLst>
+          </p:cNvPr>
+          <p:cNvCxnSpPr>
+            <a:cxnSpLocks/>
+            <a:stCxn id="73" idx="2"/>
+            <a:endCxn id="74" idx="0"/>
+          </p:cNvCxnSpPr>
+          <p:nvPr/>
+        </p:nvCxnSpPr>
+        <p:spPr>
+          <a:xfrm flipH="1">
+            <a:off x="9599438" y="5556581"/>
+            <a:ext cx="1" cy="404928"/>
+          </a:xfrm>
+          <a:prstGeom prst="straightConnector1">
+            <a:avLst/>
+          </a:prstGeom>
+          <a:ln w="57150">
+            <a:solidFill>
+              <a:schemeClr val="tx1"/>
+            </a:solidFill>
+            <a:tailEnd type="triangle"/>
+          </a:ln>
+        </p:spPr>
+        <p:style>
+          <a:lnRef idx="1">
+            <a:schemeClr val="accent1"/>
+          </a:lnRef>
+          <a:fillRef idx="0">
+            <a:schemeClr val="accent1"/>
+          </a:fillRef>
+          <a:effectRef idx="0">
+            <a:schemeClr val="accent1"/>
+          </a:effectRef>
+          <a:fontRef idx="minor">
+            <a:schemeClr val="tx1"/>
+          </a:fontRef>
+        </p:style>
+      </p:cxnSp>
+      <p:cxnSp>
+        <p:nvCxnSpPr>
+          <p:cNvPr id="81" name="Gerade Verbindung mit Pfeil 80">
+            <a:extLst>
+              <a:ext uri="{FF2B5EF4-FFF2-40B4-BE49-F238E27FC236}">
+                <a16:creationId xmlns:a16="http://schemas.microsoft.com/office/drawing/2014/main" id="{001FBC02-5BA0-4557-ABA5-53B5F47A1A40}"/>
+              </a:ext>
+            </a:extLst>
+          </p:cNvPr>
+          <p:cNvCxnSpPr>
+            <a:cxnSpLocks/>
+            <a:stCxn id="74" idx="2"/>
+            <a:endCxn id="9" idx="0"/>
+          </p:cNvCxnSpPr>
+          <p:nvPr/>
+        </p:nvCxnSpPr>
+        <p:spPr>
+          <a:xfrm>
+            <a:off x="9599438" y="6735402"/>
+            <a:ext cx="2" cy="621135"/>
+          </a:xfrm>
+          <a:prstGeom prst="straightConnector1">
+            <a:avLst/>
+          </a:prstGeom>
+          <a:ln w="57150">
+            <a:solidFill>
+              <a:schemeClr val="tx1"/>
+            </a:solidFill>
+            <a:tailEnd type="triangle"/>
+          </a:ln>
+        </p:spPr>
+        <p:style>
+          <a:lnRef idx="1">
+            <a:schemeClr val="accent1"/>
+          </a:lnRef>
+          <a:fillRef idx="0">
+            <a:schemeClr val="accent1"/>
+          </a:fillRef>
+          <a:effectRef idx="0">
+            <a:schemeClr val="accent1"/>
+          </a:effectRef>
+          <a:fontRef idx="minor">
+            <a:schemeClr val="tx1"/>
+          </a:fontRef>
+        </p:style>
+      </p:cxnSp>
+      <p:cxnSp>
+        <p:nvCxnSpPr>
+          <p:cNvPr id="91" name="Gerade Verbindung mit Pfeil 90">
+            <a:extLst>
+              <a:ext uri="{FF2B5EF4-FFF2-40B4-BE49-F238E27FC236}">
+                <a16:creationId xmlns:a16="http://schemas.microsoft.com/office/drawing/2014/main" id="{9EAD38AE-0859-4323-AE65-3B5C33B25C07}"/>
+              </a:ext>
+            </a:extLst>
+          </p:cNvPr>
+          <p:cNvCxnSpPr>
+            <a:cxnSpLocks/>
+            <a:stCxn id="53" idx="2"/>
+            <a:endCxn id="61" idx="0"/>
+          </p:cNvCxnSpPr>
+          <p:nvPr/>
+        </p:nvCxnSpPr>
+        <p:spPr>
+          <a:xfrm flipH="1">
+            <a:off x="9599434" y="11803765"/>
+            <a:ext cx="1" cy="626894"/>
+          </a:xfrm>
+          <a:prstGeom prst="straightConnector1">
+            <a:avLst/>
+          </a:prstGeom>
+          <a:ln w="57150">
+            <a:solidFill>
+              <a:schemeClr val="tx1"/>
+            </a:solidFill>
+            <a:tailEnd type="triangle"/>
+          </a:ln>
+        </p:spPr>
+        <p:style>
+          <a:lnRef idx="1">
+            <a:schemeClr val="accent1"/>
+          </a:lnRef>
+          <a:fillRef idx="0">
+            <a:schemeClr val="accent1"/>
+          </a:fillRef>
+          <a:effectRef idx="0">
+            <a:schemeClr val="accent1"/>
+          </a:effectRef>
+          <a:fontRef idx="minor">
+            <a:schemeClr val="tx1"/>
+          </a:fontRef>
+        </p:style>
+      </p:cxnSp>
+      <p:sp>
+        <p:nvSpPr>
+          <p:cNvPr id="103" name="Rechteck 102">
+            <a:extLst>
+              <a:ext uri="{FF2B5EF4-FFF2-40B4-BE49-F238E27FC236}">
+                <a16:creationId xmlns:a16="http://schemas.microsoft.com/office/drawing/2014/main" id="{497A6FD4-41F6-42B8-BC09-70D0891C3081}"/>
+              </a:ext>
+            </a:extLst>
+          </p:cNvPr>
+          <p:cNvSpPr/>
+          <p:nvPr/>
+        </p:nvSpPr>
+        <p:spPr>
+          <a:xfrm>
+            <a:off x="4848895" y="18290896"/>
+            <a:ext cx="9501077" cy="773893"/>
+          </a:xfrm>
+          <a:prstGeom prst="rect">
+            <a:avLst/>
+          </a:prstGeom>
+          <a:noFill/>
+          <a:ln>
+            <a:solidFill>
+              <a:schemeClr val="tx1"/>
+            </a:solidFill>
+          </a:ln>
+        </p:spPr>
+        <p:style>
+          <a:lnRef idx="2">
+            <a:schemeClr val="accent1">
+              <a:shade val="50000"/>
+            </a:schemeClr>
+          </a:lnRef>
+          <a:fillRef idx="1">
+            <a:schemeClr val="accent1"/>
+          </a:fillRef>
+          <a:effectRef idx="0">
+            <a:schemeClr val="accent1"/>
+          </a:effectRef>
+          <a:fontRef idx="minor">
+            <a:schemeClr val="lt1"/>
+          </a:fontRef>
+        </p:style>
+        <p:txBody>
+          <a:bodyPr rtlCol="0" anchor="ctr"/>
+          <a:lstStyle/>
+          <a:p>
+            <a:pPr algn="ctr"/>
+            <a:r>
+              <a:rPr lang="en-US" sz="5400" dirty="0">
+                <a:solidFill>
+                  <a:schemeClr val="tx1"/>
+                </a:solidFill>
+              </a:rPr>
+              <a:t>Dense Layer</a:t>
+            </a:r>
+          </a:p>
+        </p:txBody>
+      </p:sp>
+      <p:sp>
+        <p:nvSpPr>
+          <p:cNvPr id="104" name="Rechteck 103">
+            <a:extLst>
+              <a:ext uri="{FF2B5EF4-FFF2-40B4-BE49-F238E27FC236}">
+                <a16:creationId xmlns:a16="http://schemas.microsoft.com/office/drawing/2014/main" id="{07CC6C73-CEC8-4C13-A2CC-87162E46DB42}"/>
+              </a:ext>
+            </a:extLst>
+          </p:cNvPr>
+          <p:cNvSpPr/>
+          <p:nvPr/>
+        </p:nvSpPr>
+        <p:spPr>
+          <a:xfrm>
+            <a:off x="4848896" y="17069189"/>
+            <a:ext cx="9501077" cy="773893"/>
+          </a:xfrm>
+          <a:prstGeom prst="rect">
+            <a:avLst/>
+          </a:prstGeom>
+          <a:noFill/>
+          <a:ln>
+            <a:solidFill>
+              <a:schemeClr val="tx1"/>
+            </a:solidFill>
+          </a:ln>
+        </p:spPr>
+        <p:style>
+          <a:lnRef idx="2">
+            <a:schemeClr val="accent1">
+              <a:shade val="50000"/>
+            </a:schemeClr>
+          </a:lnRef>
+          <a:fillRef idx="1">
+            <a:schemeClr val="accent1"/>
+          </a:fillRef>
+          <a:effectRef idx="0">
+            <a:schemeClr val="accent1"/>
+          </a:effectRef>
+          <a:fontRef idx="minor">
+            <a:schemeClr val="lt1"/>
+          </a:fontRef>
+        </p:style>
+        <p:txBody>
+          <a:bodyPr rtlCol="0" anchor="ctr"/>
+          <a:lstStyle/>
+          <a:p>
+            <a:pPr algn="ctr"/>
+            <a:r>
+              <a:rPr lang="en-US" sz="5400" dirty="0">
+                <a:solidFill>
+                  <a:schemeClr val="tx1"/>
+                </a:solidFill>
+              </a:rPr>
+              <a:t>…</a:t>
+            </a:r>
+          </a:p>
+        </p:txBody>
+      </p:sp>
+      <p:sp>
+        <p:nvSpPr>
+          <p:cNvPr id="105" name="Rechteck 104">
+            <a:extLst>
+              <a:ext uri="{FF2B5EF4-FFF2-40B4-BE49-F238E27FC236}">
+                <a16:creationId xmlns:a16="http://schemas.microsoft.com/office/drawing/2014/main" id="{592E69D8-9B96-4F30-B7DB-89E67259F1C1}"/>
+              </a:ext>
+            </a:extLst>
+          </p:cNvPr>
+          <p:cNvSpPr/>
+          <p:nvPr/>
+        </p:nvSpPr>
+        <p:spPr>
+          <a:xfrm>
+            <a:off x="4848900" y="14617561"/>
+            <a:ext cx="9501077" cy="773893"/>
+          </a:xfrm>
+          <a:prstGeom prst="rect">
+            <a:avLst/>
+          </a:prstGeom>
+          <a:noFill/>
+          <a:ln>
+            <a:solidFill>
+              <a:schemeClr val="tx1"/>
+            </a:solidFill>
+          </a:ln>
+        </p:spPr>
+        <p:style>
+          <a:lnRef idx="2">
+            <a:schemeClr val="accent1">
+              <a:shade val="50000"/>
+            </a:schemeClr>
+          </a:lnRef>
+          <a:fillRef idx="1">
+            <a:schemeClr val="accent1"/>
+          </a:fillRef>
+          <a:effectRef idx="0">
+            <a:schemeClr val="accent1"/>
+          </a:effectRef>
+          <a:fontRef idx="minor">
+            <a:schemeClr val="lt1"/>
+          </a:fontRef>
+        </p:style>
+        <p:txBody>
+          <a:bodyPr rtlCol="0" anchor="ctr"/>
+          <a:lstStyle/>
+          <a:p>
+            <a:pPr algn="ctr"/>
+            <a:r>
+              <a:rPr lang="en-US" sz="5400" dirty="0">
+                <a:solidFill>
+                  <a:schemeClr val="tx1"/>
+                </a:solidFill>
+              </a:rPr>
+              <a:t>Dense Layer</a:t>
+            </a:r>
+          </a:p>
+        </p:txBody>
+      </p:sp>
+      <p:cxnSp>
+        <p:nvCxnSpPr>
+          <p:cNvPr id="106" name="Gerade Verbindung mit Pfeil 105">
+            <a:extLst>
+              <a:ext uri="{FF2B5EF4-FFF2-40B4-BE49-F238E27FC236}">
+                <a16:creationId xmlns:a16="http://schemas.microsoft.com/office/drawing/2014/main" id="{580441F2-3957-4E00-AA7C-E1E9D63C16C3}"/>
+              </a:ext>
+            </a:extLst>
+          </p:cNvPr>
+          <p:cNvCxnSpPr>
+            <a:cxnSpLocks/>
+            <a:stCxn id="105" idx="2"/>
+            <a:endCxn id="107" idx="0"/>
+          </p:cNvCxnSpPr>
+          <p:nvPr/>
+        </p:nvCxnSpPr>
+        <p:spPr>
+          <a:xfrm flipH="1">
+            <a:off x="9599436" y="15391454"/>
+            <a:ext cx="3" cy="456028"/>
+          </a:xfrm>
+          <a:prstGeom prst="straightConnector1">
+            <a:avLst/>
+          </a:prstGeom>
+          <a:ln w="57150">
+            <a:solidFill>
+              <a:schemeClr val="tx1"/>
+            </a:solidFill>
+            <a:tailEnd type="triangle"/>
+          </a:ln>
+        </p:spPr>
+        <p:style>
+          <a:lnRef idx="1">
+            <a:schemeClr val="accent1"/>
+          </a:lnRef>
+          <a:fillRef idx="0">
+            <a:schemeClr val="accent1"/>
+          </a:fillRef>
+          <a:effectRef idx="0">
+            <a:schemeClr val="accent1"/>
+          </a:effectRef>
+          <a:fontRef idx="minor">
+            <a:schemeClr val="tx1"/>
+          </a:fontRef>
+        </p:style>
+      </p:cxnSp>
+      <p:sp>
+        <p:nvSpPr>
+          <p:cNvPr id="107" name="Rechteck 106">
+            <a:extLst>
+              <a:ext uri="{FF2B5EF4-FFF2-40B4-BE49-F238E27FC236}">
+                <a16:creationId xmlns:a16="http://schemas.microsoft.com/office/drawing/2014/main" id="{E2AA8946-AAE0-4BD2-94F3-267A5FFDFD94}"/>
+              </a:ext>
+            </a:extLst>
+          </p:cNvPr>
+          <p:cNvSpPr/>
+          <p:nvPr/>
+        </p:nvSpPr>
+        <p:spPr>
+          <a:xfrm>
+            <a:off x="4848897" y="15847482"/>
+            <a:ext cx="9501077" cy="773893"/>
+          </a:xfrm>
+          <a:prstGeom prst="rect">
+            <a:avLst/>
+          </a:prstGeom>
+          <a:noFill/>
+          <a:ln>
+            <a:solidFill>
+              <a:schemeClr val="tx1"/>
+            </a:solidFill>
+          </a:ln>
+        </p:spPr>
+        <p:style>
+          <a:lnRef idx="2">
+            <a:schemeClr val="accent1">
+              <a:shade val="50000"/>
+            </a:schemeClr>
+          </a:lnRef>
+          <a:fillRef idx="1">
+            <a:schemeClr val="accent1"/>
+          </a:fillRef>
+          <a:effectRef idx="0">
+            <a:schemeClr val="accent1"/>
+          </a:effectRef>
+          <a:fontRef idx="minor">
+            <a:schemeClr val="lt1"/>
+          </a:fontRef>
+        </p:style>
+        <p:txBody>
+          <a:bodyPr rtlCol="0" anchor="ctr"/>
+          <a:lstStyle/>
+          <a:p>
+            <a:pPr algn="ctr"/>
+            <a:r>
+              <a:rPr lang="en-US" sz="5400" dirty="0">
+                <a:solidFill>
+                  <a:schemeClr val="tx1"/>
+                </a:solidFill>
+              </a:rPr>
+              <a:t>Dropout Layer</a:t>
+            </a:r>
+          </a:p>
+        </p:txBody>
+      </p:sp>
+      <p:cxnSp>
+        <p:nvCxnSpPr>
+          <p:cNvPr id="108" name="Gerade Verbindung mit Pfeil 107">
+            <a:extLst>
+              <a:ext uri="{FF2B5EF4-FFF2-40B4-BE49-F238E27FC236}">
+                <a16:creationId xmlns:a16="http://schemas.microsoft.com/office/drawing/2014/main" id="{C43866A5-D822-4FDD-82A1-644BDA47BCE8}"/>
+              </a:ext>
+            </a:extLst>
+          </p:cNvPr>
+          <p:cNvCxnSpPr>
+            <a:cxnSpLocks/>
+            <a:stCxn id="107" idx="2"/>
+            <a:endCxn id="104" idx="0"/>
+          </p:cNvCxnSpPr>
+          <p:nvPr/>
+        </p:nvCxnSpPr>
+        <p:spPr>
+          <a:xfrm flipH="1">
+            <a:off x="9599435" y="16621375"/>
+            <a:ext cx="1" cy="447814"/>
+          </a:xfrm>
+          <a:prstGeom prst="straightConnector1">
+            <a:avLst/>
+          </a:prstGeom>
+          <a:ln w="57150">
+            <a:solidFill>
+              <a:schemeClr val="tx1"/>
+            </a:solidFill>
+            <a:tailEnd type="triangle"/>
+          </a:ln>
+        </p:spPr>
+        <p:style>
+          <a:lnRef idx="1">
+            <a:schemeClr val="accent1"/>
+          </a:lnRef>
+          <a:fillRef idx="0">
+            <a:schemeClr val="accent1"/>
+          </a:fillRef>
+          <a:effectRef idx="0">
+            <a:schemeClr val="accent1"/>
+          </a:effectRef>
+          <a:fontRef idx="minor">
+            <a:schemeClr val="tx1"/>
+          </a:fontRef>
+        </p:style>
+      </p:cxnSp>
+      <p:cxnSp>
+        <p:nvCxnSpPr>
+          <p:cNvPr id="109" name="Gerade Verbindung mit Pfeil 108">
+            <a:extLst>
+              <a:ext uri="{FF2B5EF4-FFF2-40B4-BE49-F238E27FC236}">
+                <a16:creationId xmlns:a16="http://schemas.microsoft.com/office/drawing/2014/main" id="{6D804EAD-1199-4D74-92DB-B627667B2321}"/>
+              </a:ext>
+            </a:extLst>
+          </p:cNvPr>
+          <p:cNvCxnSpPr>
+            <a:cxnSpLocks/>
+            <a:stCxn id="104" idx="2"/>
+            <a:endCxn id="103" idx="0"/>
+          </p:cNvCxnSpPr>
+          <p:nvPr/>
+        </p:nvCxnSpPr>
+        <p:spPr>
+          <a:xfrm flipH="1">
+            <a:off x="9599434" y="17843082"/>
+            <a:ext cx="1" cy="447814"/>
+          </a:xfrm>
+          <a:prstGeom prst="straightConnector1">
+            <a:avLst/>
+          </a:prstGeom>
+          <a:ln w="57150">
+            <a:solidFill>
+              <a:schemeClr val="tx1"/>
+            </a:solidFill>
+            <a:tailEnd type="triangle"/>
+          </a:ln>
+        </p:spPr>
+        <p:style>
+          <a:lnRef idx="1">
+            <a:schemeClr val="accent1"/>
+          </a:lnRef>
+          <a:fillRef idx="0">
+            <a:schemeClr val="accent1"/>
+          </a:fillRef>
+          <a:effectRef idx="0">
+            <a:schemeClr val="accent1"/>
+          </a:effectRef>
+          <a:fontRef idx="minor">
+            <a:schemeClr val="tx1"/>
+          </a:fontRef>
+        </p:style>
+      </p:cxnSp>
+      <p:cxnSp>
+        <p:nvCxnSpPr>
+          <p:cNvPr id="112" name="Gerade Verbindung mit Pfeil 111">
+            <a:extLst>
+              <a:ext uri="{FF2B5EF4-FFF2-40B4-BE49-F238E27FC236}">
+                <a16:creationId xmlns:a16="http://schemas.microsoft.com/office/drawing/2014/main" id="{1DAC8F93-2877-4192-B674-553DACA4CFFD}"/>
+              </a:ext>
+            </a:extLst>
+          </p:cNvPr>
+          <p:cNvCxnSpPr>
+            <a:cxnSpLocks/>
+            <a:stCxn id="61" idx="2"/>
+          </p:cNvCxnSpPr>
+          <p:nvPr/>
+        </p:nvCxnSpPr>
+        <p:spPr>
+          <a:xfrm>
+            <a:off x="9599434" y="13933935"/>
+            <a:ext cx="0" cy="734268"/>
+          </a:xfrm>
+          <a:prstGeom prst="straightConnector1">
+            <a:avLst/>
+          </a:prstGeom>
+          <a:ln w="57150">
+            <a:solidFill>
+              <a:schemeClr val="tx1"/>
+            </a:solidFill>
+            <a:tailEnd type="triangle"/>
+          </a:ln>
+        </p:spPr>
+        <p:style>
+          <a:lnRef idx="1">
+            <a:schemeClr val="accent1"/>
+          </a:lnRef>
+          <a:fillRef idx="0">
+            <a:schemeClr val="accent1"/>
+          </a:fillRef>
+          <a:effectRef idx="0">
+            <a:schemeClr val="accent1"/>
+          </a:effectRef>
+          <a:fontRef idx="minor">
+            <a:schemeClr val="tx1"/>
+          </a:fontRef>
+        </p:style>
+      </p:cxnSp>
+      <p:cxnSp>
+        <p:nvCxnSpPr>
+          <p:cNvPr id="115" name="Gerade Verbindung mit Pfeil 114">
+            <a:extLst>
+              <a:ext uri="{FF2B5EF4-FFF2-40B4-BE49-F238E27FC236}">
+                <a16:creationId xmlns:a16="http://schemas.microsoft.com/office/drawing/2014/main" id="{B8683620-8536-4F95-979A-C34E20F381F5}"/>
+              </a:ext>
+            </a:extLst>
+          </p:cNvPr>
+          <p:cNvCxnSpPr>
+            <a:cxnSpLocks/>
+          </p:cNvCxnSpPr>
+          <p:nvPr/>
+        </p:nvCxnSpPr>
+        <p:spPr>
+          <a:xfrm>
+            <a:off x="9599433" y="1382919"/>
+            <a:ext cx="0" cy="814957"/>
+          </a:xfrm>
+          <a:prstGeom prst="straightConnector1">
+            <a:avLst/>
+          </a:prstGeom>
+          <a:ln w="57150">
+            <a:solidFill>
+              <a:schemeClr val="tx1"/>
+            </a:solidFill>
+            <a:tailEnd type="triangle"/>
+          </a:ln>
+        </p:spPr>
+        <p:style>
+          <a:lnRef idx="1">
+            <a:schemeClr val="accent1"/>
+          </a:lnRef>
+          <a:fillRef idx="0">
+            <a:schemeClr val="accent1"/>
+          </a:fillRef>
+          <a:effectRef idx="0">
+            <a:schemeClr val="accent1"/>
+          </a:effectRef>
+          <a:fontRef idx="minor">
+            <a:schemeClr val="tx1"/>
+          </a:fontRef>
+        </p:style>
+      </p:cxnSp>
+      <p:sp>
+        <p:nvSpPr>
+          <p:cNvPr id="120" name="Textfeld 119">
+            <a:extLst>
+              <a:ext uri="{FF2B5EF4-FFF2-40B4-BE49-F238E27FC236}">
+                <a16:creationId xmlns:a16="http://schemas.microsoft.com/office/drawing/2014/main" id="{483E1E2F-4EA1-4B27-A177-9810B35996FE}"/>
+              </a:ext>
+            </a:extLst>
+          </p:cNvPr>
+          <p:cNvSpPr txBox="1"/>
+          <p:nvPr/>
+        </p:nvSpPr>
+        <p:spPr>
+          <a:xfrm>
+            <a:off x="16014716" y="12795351"/>
+            <a:ext cx="10782300" cy="769441"/>
+          </a:xfrm>
+          <a:prstGeom prst="rect">
+            <a:avLst/>
+          </a:prstGeom>
+          <a:noFill/>
+        </p:spPr>
+        <p:txBody>
+          <a:bodyPr wrap="square" rtlCol="0">
+            <a:spAutoFit/>
+          </a:bodyPr>
+          <a:lstStyle/>
+          <a:p>
+            <a:r>
+              <a:rPr lang="en-US" sz="4400" b="1" dirty="0"/>
+              <a:t>automatic</a:t>
+            </a:r>
+          </a:p>
+        </p:txBody>
+      </p:sp>
+      <p:sp>
+        <p:nvSpPr>
+          <p:cNvPr id="121" name="Textfeld 120">
+            <a:extLst>
+              <a:ext uri="{FF2B5EF4-FFF2-40B4-BE49-F238E27FC236}">
+                <a16:creationId xmlns:a16="http://schemas.microsoft.com/office/drawing/2014/main" id="{22193605-02DE-43FF-9B53-6D79356E4A51}"/>
+              </a:ext>
+            </a:extLst>
+          </p:cNvPr>
+          <p:cNvSpPr txBox="1"/>
+          <p:nvPr/>
+        </p:nvSpPr>
+        <p:spPr>
+          <a:xfrm>
+            <a:off x="16217900" y="2278547"/>
+            <a:ext cx="10782300" cy="769441"/>
+          </a:xfrm>
+          <a:prstGeom prst="rect">
+            <a:avLst/>
+          </a:prstGeom>
+          <a:noFill/>
+        </p:spPr>
+        <p:txBody>
+          <a:bodyPr wrap="square" rtlCol="0">
+            <a:spAutoFit/>
+          </a:bodyPr>
+          <a:lstStyle/>
+          <a:p>
+            <a:r>
+              <a:rPr lang="en-US" sz="4400" b="1" i="1" dirty="0"/>
+              <a:t>Parameter </a:t>
+            </a:r>
+            <a:r>
+              <a:rPr lang="en-US" sz="4400" b="1" dirty="0" err="1"/>
+              <a:t>add_pos_embedding</a:t>
+            </a:r>
+            <a:endParaRPr lang="en-US" sz="4400" b="1" dirty="0"/>
+          </a:p>
+        </p:txBody>
+      </p:sp>
+      <p:sp>
+        <p:nvSpPr>
+          <p:cNvPr id="122" name="Rechteck 121">
+            <a:extLst>
+              <a:ext uri="{FF2B5EF4-FFF2-40B4-BE49-F238E27FC236}">
+                <a16:creationId xmlns:a16="http://schemas.microsoft.com/office/drawing/2014/main" id="{43744E7E-C1FB-4E11-BC28-0A5AE7CA6E46}"/>
+              </a:ext>
+            </a:extLst>
+          </p:cNvPr>
+          <p:cNvSpPr/>
+          <p:nvPr/>
+        </p:nvSpPr>
+        <p:spPr>
+          <a:xfrm>
+            <a:off x="98364" y="2278547"/>
+            <a:ext cx="4414634" cy="769441"/>
+          </a:xfrm>
+          <a:prstGeom prst="rect">
+            <a:avLst/>
+          </a:prstGeom>
+          <a:solidFill>
+            <a:schemeClr val="bg1">
+              <a:lumMod val="75000"/>
+            </a:schemeClr>
+          </a:solidFill>
+          <a:ln>
+            <a:solidFill>
+              <a:schemeClr val="tx1"/>
+            </a:solidFill>
+          </a:ln>
+        </p:spPr>
+        <p:style>
+          <a:lnRef idx="2">
+            <a:schemeClr val="accent1">
+              <a:shade val="50000"/>
+            </a:schemeClr>
+          </a:lnRef>
+          <a:fillRef idx="1">
+            <a:schemeClr val="accent1"/>
+          </a:fillRef>
+          <a:effectRef idx="0">
+            <a:schemeClr val="accent1"/>
+          </a:effectRef>
+          <a:fontRef idx="minor">
+            <a:schemeClr val="lt1"/>
+          </a:fontRef>
+        </p:style>
+        <p:txBody>
+          <a:bodyPr rtlCol="0" anchor="ctr"/>
+          <a:lstStyle/>
+          <a:p>
+            <a:pPr algn="ctr"/>
+            <a:r>
+              <a:rPr lang="en-US" sz="4400">
+                <a:solidFill>
+                  <a:schemeClr val="tx1"/>
+                </a:solidFill>
+              </a:rPr>
+              <a:t>Order Awareness</a:t>
+            </a:r>
+          </a:p>
+        </p:txBody>
+      </p:sp>
+      <p:sp>
+        <p:nvSpPr>
+          <p:cNvPr id="123" name="Rechteck 122">
+            <a:extLst>
+              <a:ext uri="{FF2B5EF4-FFF2-40B4-BE49-F238E27FC236}">
+                <a16:creationId xmlns:a16="http://schemas.microsoft.com/office/drawing/2014/main" id="{245A7E63-710E-4671-8C63-902649F98383}"/>
+              </a:ext>
+            </a:extLst>
+          </p:cNvPr>
+          <p:cNvSpPr/>
+          <p:nvPr/>
+        </p:nvSpPr>
+        <p:spPr>
+          <a:xfrm>
+            <a:off x="98364" y="3542564"/>
+            <a:ext cx="4414634" cy="3192838"/>
+          </a:xfrm>
+          <a:prstGeom prst="rect">
+            <a:avLst/>
+          </a:prstGeom>
+          <a:solidFill>
+            <a:schemeClr val="bg1">
+              <a:lumMod val="75000"/>
+            </a:schemeClr>
+          </a:solidFill>
+          <a:ln>
+            <a:solidFill>
+              <a:schemeClr val="tx1"/>
+            </a:solidFill>
+          </a:ln>
+        </p:spPr>
+        <p:style>
+          <a:lnRef idx="2">
+            <a:schemeClr val="accent1">
+              <a:shade val="50000"/>
+            </a:schemeClr>
+          </a:lnRef>
+          <a:fillRef idx="1">
+            <a:schemeClr val="accent1"/>
+          </a:fillRef>
+          <a:effectRef idx="0">
+            <a:schemeClr val="accent1"/>
+          </a:effectRef>
+          <a:fontRef idx="minor">
+            <a:schemeClr val="lt1"/>
+          </a:fontRef>
+        </p:style>
+        <p:txBody>
+          <a:bodyPr rtlCol="0" anchor="ctr"/>
+          <a:lstStyle/>
+          <a:p>
+            <a:pPr algn="ctr"/>
+            <a:r>
+              <a:rPr lang="en-US" sz="4400">
+                <a:solidFill>
+                  <a:schemeClr val="tx1"/>
+                </a:solidFill>
+              </a:rPr>
+              <a:t>Context Awareness</a:t>
+            </a:r>
+          </a:p>
+        </p:txBody>
+      </p:sp>
+      <p:sp>
+        <p:nvSpPr>
+          <p:cNvPr id="124" name="Rechteck 123">
+            <a:extLst>
+              <a:ext uri="{FF2B5EF4-FFF2-40B4-BE49-F238E27FC236}">
+                <a16:creationId xmlns:a16="http://schemas.microsoft.com/office/drawing/2014/main" id="{3CFD7B05-A0AB-4EF9-B9EE-224B4A47D67C}"/>
+              </a:ext>
+            </a:extLst>
+          </p:cNvPr>
+          <p:cNvSpPr/>
+          <p:nvPr/>
+        </p:nvSpPr>
+        <p:spPr>
+          <a:xfrm>
+            <a:off x="72951" y="7354311"/>
+            <a:ext cx="4414634" cy="4449453"/>
+          </a:xfrm>
+          <a:prstGeom prst="rect">
+            <a:avLst/>
+          </a:prstGeom>
+          <a:solidFill>
+            <a:schemeClr val="bg1">
+              <a:lumMod val="75000"/>
+            </a:schemeClr>
+          </a:solidFill>
+          <a:ln>
+            <a:solidFill>
+              <a:schemeClr val="tx1"/>
+            </a:solidFill>
+          </a:ln>
+        </p:spPr>
+        <p:style>
+          <a:lnRef idx="2">
+            <a:schemeClr val="accent1">
+              <a:shade val="50000"/>
+            </a:schemeClr>
+          </a:lnRef>
+          <a:fillRef idx="1">
+            <a:schemeClr val="accent1"/>
+          </a:fillRef>
+          <a:effectRef idx="0">
+            <a:schemeClr val="accent1"/>
+          </a:effectRef>
+          <a:fontRef idx="minor">
+            <a:schemeClr val="lt1"/>
+          </a:fontRef>
+        </p:style>
+        <p:txBody>
+          <a:bodyPr rtlCol="0" anchor="ctr"/>
+          <a:lstStyle/>
+          <a:p>
+            <a:pPr algn="ctr"/>
+            <a:r>
+              <a:rPr lang="en-US" sz="4400">
+                <a:solidFill>
+                  <a:schemeClr val="tx1"/>
+                </a:solidFill>
+              </a:rPr>
+              <a:t>Sequence Processing</a:t>
+            </a:r>
+          </a:p>
+        </p:txBody>
+      </p:sp>
+      <p:sp>
+        <p:nvSpPr>
+          <p:cNvPr id="125" name="Rechteck 124">
+            <a:extLst>
+              <a:ext uri="{FF2B5EF4-FFF2-40B4-BE49-F238E27FC236}">
+                <a16:creationId xmlns:a16="http://schemas.microsoft.com/office/drawing/2014/main" id="{49C4F4C2-75EB-4D25-8F83-10FA3A984D92}"/>
+              </a:ext>
+            </a:extLst>
+          </p:cNvPr>
+          <p:cNvSpPr/>
+          <p:nvPr/>
+        </p:nvSpPr>
+        <p:spPr>
+          <a:xfrm>
+            <a:off x="98364" y="12430660"/>
+            <a:ext cx="4414634" cy="1503276"/>
+          </a:xfrm>
+          <a:prstGeom prst="rect">
+            <a:avLst/>
+          </a:prstGeom>
+          <a:solidFill>
+            <a:schemeClr val="bg1">
+              <a:lumMod val="75000"/>
+            </a:schemeClr>
+          </a:solidFill>
+          <a:ln>
+            <a:solidFill>
+              <a:schemeClr val="tx1"/>
+            </a:solidFill>
+          </a:ln>
+        </p:spPr>
+        <p:style>
+          <a:lnRef idx="2">
+            <a:schemeClr val="accent1">
+              <a:shade val="50000"/>
+            </a:schemeClr>
+          </a:lnRef>
+          <a:fillRef idx="1">
+            <a:schemeClr val="accent1"/>
+          </a:fillRef>
+          <a:effectRef idx="0">
+            <a:schemeClr val="accent1"/>
+          </a:effectRef>
+          <a:fontRef idx="minor">
+            <a:schemeClr val="lt1"/>
+          </a:fontRef>
+        </p:style>
+        <p:txBody>
+          <a:bodyPr rtlCol="0" anchor="ctr"/>
+          <a:lstStyle/>
+          <a:p>
+            <a:pPr algn="ctr"/>
+            <a:r>
+              <a:rPr lang="en-US" sz="4400">
+                <a:solidFill>
+                  <a:schemeClr val="tx1"/>
+                </a:solidFill>
+              </a:rPr>
+              <a:t>Compression</a:t>
+            </a:r>
+          </a:p>
+        </p:txBody>
+      </p:sp>
+      <p:sp>
+        <p:nvSpPr>
+          <p:cNvPr id="126" name="Rechteck 125">
+            <a:extLst>
+              <a:ext uri="{FF2B5EF4-FFF2-40B4-BE49-F238E27FC236}">
+                <a16:creationId xmlns:a16="http://schemas.microsoft.com/office/drawing/2014/main" id="{F0664392-2DB0-45E0-81F4-A6FB3CB87A15}"/>
+              </a:ext>
+            </a:extLst>
+          </p:cNvPr>
+          <p:cNvSpPr/>
+          <p:nvPr/>
+        </p:nvSpPr>
+        <p:spPr>
+          <a:xfrm>
+            <a:off x="98364" y="14668203"/>
+            <a:ext cx="4414634" cy="4396586"/>
+          </a:xfrm>
+          <a:prstGeom prst="rect">
+            <a:avLst/>
+          </a:prstGeom>
+          <a:solidFill>
+            <a:schemeClr val="bg1">
+              <a:lumMod val="75000"/>
+            </a:schemeClr>
+          </a:solidFill>
+          <a:ln>
+            <a:solidFill>
+              <a:schemeClr val="tx1"/>
+            </a:solidFill>
+          </a:ln>
+        </p:spPr>
+        <p:style>
+          <a:lnRef idx="2">
+            <a:schemeClr val="accent1">
+              <a:shade val="50000"/>
+            </a:schemeClr>
+          </a:lnRef>
+          <a:fillRef idx="1">
+            <a:schemeClr val="accent1"/>
+          </a:fillRef>
+          <a:effectRef idx="0">
+            <a:schemeClr val="accent1"/>
+          </a:effectRef>
+          <a:fontRef idx="minor">
+            <a:schemeClr val="lt1"/>
+          </a:fontRef>
+        </p:style>
+        <p:txBody>
+          <a:bodyPr rtlCol="0" anchor="ctr"/>
+          <a:lstStyle/>
+          <a:p>
+            <a:pPr algn="ctr"/>
+            <a:r>
+              <a:rPr lang="en-US" sz="4400">
+                <a:solidFill>
+                  <a:schemeClr val="tx1"/>
+                </a:solidFill>
+              </a:rPr>
+              <a:t>Final Processing/</a:t>
+            </a:r>
+            <a:br>
+              <a:rPr lang="en-US" sz="4400">
+                <a:solidFill>
+                  <a:schemeClr val="tx1"/>
+                </a:solidFill>
+              </a:rPr>
+            </a:br>
+            <a:r>
+              <a:rPr lang="en-US" sz="4400">
+                <a:solidFill>
+                  <a:schemeClr val="tx1"/>
+                </a:solidFill>
+              </a:rPr>
+              <a:t>Compression</a:t>
+            </a:r>
+          </a:p>
+        </p:txBody>
+      </p:sp>
+      <p:sp>
+        <p:nvSpPr>
+          <p:cNvPr id="127" name="Rechteck 126">
+            <a:extLst>
+              <a:ext uri="{FF2B5EF4-FFF2-40B4-BE49-F238E27FC236}">
+                <a16:creationId xmlns:a16="http://schemas.microsoft.com/office/drawing/2014/main" id="{89AD531C-05CA-4457-B73C-F0F0F3F32909}"/>
+              </a:ext>
+            </a:extLst>
+          </p:cNvPr>
+          <p:cNvSpPr/>
+          <p:nvPr/>
+        </p:nvSpPr>
+        <p:spPr>
+          <a:xfrm>
+            <a:off x="98364" y="19997793"/>
+            <a:ext cx="4414634" cy="1577075"/>
+          </a:xfrm>
+          <a:prstGeom prst="rect">
+            <a:avLst/>
+          </a:prstGeom>
+          <a:solidFill>
+            <a:schemeClr val="bg1">
+              <a:lumMod val="75000"/>
+            </a:schemeClr>
+          </a:solidFill>
+          <a:ln>
+            <a:solidFill>
+              <a:schemeClr val="tx1"/>
+            </a:solidFill>
+          </a:ln>
+        </p:spPr>
+        <p:style>
+          <a:lnRef idx="2">
+            <a:schemeClr val="accent1">
+              <a:shade val="50000"/>
+            </a:schemeClr>
+          </a:lnRef>
+          <a:fillRef idx="1">
+            <a:schemeClr val="accent1"/>
+          </a:fillRef>
+          <a:effectRef idx="0">
+            <a:schemeClr val="accent1"/>
+          </a:effectRef>
+          <a:fontRef idx="minor">
+            <a:schemeClr val="lt1"/>
+          </a:fontRef>
+        </p:style>
+        <p:txBody>
+          <a:bodyPr rtlCol="0" anchor="ctr"/>
+          <a:lstStyle/>
+          <a:p>
+            <a:pPr algn="ctr"/>
+            <a:r>
+              <a:rPr lang="en-US" sz="4400" dirty="0">
+                <a:solidFill>
+                  <a:schemeClr val="tx1"/>
+                </a:solidFill>
+              </a:rPr>
+              <a:t>Result</a:t>
+            </a:r>
+          </a:p>
+        </p:txBody>
+      </p:sp>
+    </p:spTree>
+    <p:extLst>
+      <p:ext uri="{BB962C8B-B14F-4D97-AF65-F5344CB8AC3E}">
+        <p14:creationId xmlns:p14="http://schemas.microsoft.com/office/powerpoint/2010/main" val="434656957"/>
+      </p:ext>
+    </p:extLst>
+  </p:cSld>
+  <p:clrMapOvr>
+    <a:masterClrMapping/>
+  </p:clrMapOvr>
+</p:sld>
+</file>
+
 <file path=ppt/theme/theme1.xml><?xml version="1.0" encoding="utf-8"?>
 <a:theme xmlns:a="http://schemas.openxmlformats.org/drawingml/2006/main" name="Office">
   <a:themeElements>

</xml_diff>

<commit_message>
First complete draft of version 0.3.1
</commit_message>
<xml_diff>
--- a/materials/images_hochformat.pptx
+++ b/materials/images_hochformat.pptx
@@ -9,6 +9,7 @@
     <p:sldId id="257" r:id="rId3"/>
     <p:sldId id="258" r:id="rId4"/>
     <p:sldId id="259" r:id="rId5"/>
+    <p:sldId id="260" r:id="rId6"/>
   </p:sldIdLst>
   <p:sldSz cx="27000200" cy="34199513"/>
   <p:notesSz cx="6858000" cy="9144000"/>
@@ -246,7 +247,7 @@
           <a:p>
             <a:fld id="{F39F49B5-785A-44C4-99F0-898FF83CD003}" type="datetimeFigureOut">
               <a:rPr lang="de-DE" smtClean="0"/>
-              <a:t>22.11.2023</a:t>
+              <a:t>15.01.2024</a:t>
             </a:fld>
             <a:endParaRPr lang="de-DE"/>
           </a:p>
@@ -416,7 +417,7 @@
           <a:p>
             <a:fld id="{F39F49B5-785A-44C4-99F0-898FF83CD003}" type="datetimeFigureOut">
               <a:rPr lang="de-DE" smtClean="0"/>
-              <a:t>22.11.2023</a:t>
+              <a:t>15.01.2024</a:t>
             </a:fld>
             <a:endParaRPr lang="de-DE"/>
           </a:p>
@@ -596,7 +597,7 @@
           <a:p>
             <a:fld id="{F39F49B5-785A-44C4-99F0-898FF83CD003}" type="datetimeFigureOut">
               <a:rPr lang="de-DE" smtClean="0"/>
-              <a:t>22.11.2023</a:t>
+              <a:t>15.01.2024</a:t>
             </a:fld>
             <a:endParaRPr lang="de-DE"/>
           </a:p>
@@ -766,7 +767,7 @@
           <a:p>
             <a:fld id="{F39F49B5-785A-44C4-99F0-898FF83CD003}" type="datetimeFigureOut">
               <a:rPr lang="de-DE" smtClean="0"/>
-              <a:t>22.11.2023</a:t>
+              <a:t>15.01.2024</a:t>
             </a:fld>
             <a:endParaRPr lang="de-DE"/>
           </a:p>
@@ -1010,7 +1011,7 @@
           <a:p>
             <a:fld id="{F39F49B5-785A-44C4-99F0-898FF83CD003}" type="datetimeFigureOut">
               <a:rPr lang="de-DE" smtClean="0"/>
-              <a:t>22.11.2023</a:t>
+              <a:t>15.01.2024</a:t>
             </a:fld>
             <a:endParaRPr lang="de-DE"/>
           </a:p>
@@ -1242,7 +1243,7 @@
           <a:p>
             <a:fld id="{F39F49B5-785A-44C4-99F0-898FF83CD003}" type="datetimeFigureOut">
               <a:rPr lang="de-DE" smtClean="0"/>
-              <a:t>22.11.2023</a:t>
+              <a:t>15.01.2024</a:t>
             </a:fld>
             <a:endParaRPr lang="de-DE"/>
           </a:p>
@@ -1609,7 +1610,7 @@
           <a:p>
             <a:fld id="{F39F49B5-785A-44C4-99F0-898FF83CD003}" type="datetimeFigureOut">
               <a:rPr lang="de-DE" smtClean="0"/>
-              <a:t>22.11.2023</a:t>
+              <a:t>15.01.2024</a:t>
             </a:fld>
             <a:endParaRPr lang="de-DE"/>
           </a:p>
@@ -1727,7 +1728,7 @@
           <a:p>
             <a:fld id="{F39F49B5-785A-44C4-99F0-898FF83CD003}" type="datetimeFigureOut">
               <a:rPr lang="de-DE" smtClean="0"/>
-              <a:t>22.11.2023</a:t>
+              <a:t>15.01.2024</a:t>
             </a:fld>
             <a:endParaRPr lang="de-DE"/>
           </a:p>
@@ -1822,7 +1823,7 @@
           <a:p>
             <a:fld id="{F39F49B5-785A-44C4-99F0-898FF83CD003}" type="datetimeFigureOut">
               <a:rPr lang="de-DE" smtClean="0"/>
-              <a:t>22.11.2023</a:t>
+              <a:t>15.01.2024</a:t>
             </a:fld>
             <a:endParaRPr lang="de-DE"/>
           </a:p>
@@ -2099,7 +2100,7 @@
           <a:p>
             <a:fld id="{F39F49B5-785A-44C4-99F0-898FF83CD003}" type="datetimeFigureOut">
               <a:rPr lang="de-DE" smtClean="0"/>
-              <a:t>22.11.2023</a:t>
+              <a:t>15.01.2024</a:t>
             </a:fld>
             <a:endParaRPr lang="de-DE"/>
           </a:p>
@@ -2356,7 +2357,7 @@
           <a:p>
             <a:fld id="{F39F49B5-785A-44C4-99F0-898FF83CD003}" type="datetimeFigureOut">
               <a:rPr lang="de-DE" smtClean="0"/>
-              <a:t>22.11.2023</a:t>
+              <a:t>15.01.2024</a:t>
             </a:fld>
             <a:endParaRPr lang="de-DE"/>
           </a:p>
@@ -2569,7 +2570,7 @@
           <a:p>
             <a:fld id="{F39F49B5-785A-44C4-99F0-898FF83CD003}" type="datetimeFigureOut">
               <a:rPr lang="de-DE" smtClean="0"/>
-              <a:t>22.11.2023</a:t>
+              <a:t>15.01.2024</a:t>
             </a:fld>
             <a:endParaRPr lang="de-DE"/>
           </a:p>
@@ -11460,6 +11461,930 @@
 </p:sld>
 </file>
 
+<file path=ppt/slides/slide5.xml><?xml version="1.0" encoding="utf-8"?>
+<p:sld xmlns:a="http://schemas.openxmlformats.org/drawingml/2006/main" xmlns:r="http://schemas.openxmlformats.org/officeDocument/2006/relationships" xmlns:p="http://schemas.openxmlformats.org/presentationml/2006/main">
+  <p:cSld>
+    <p:spTree>
+      <p:nvGrpSpPr>
+        <p:cNvPr id="1" name=""/>
+        <p:cNvGrpSpPr/>
+        <p:nvPr/>
+      </p:nvGrpSpPr>
+      <p:grpSpPr>
+        <a:xfrm>
+          <a:off x="0" y="0"/>
+          <a:ext cx="0" cy="0"/>
+          <a:chOff x="0" y="0"/>
+          <a:chExt cx="0" cy="0"/>
+        </a:xfrm>
+      </p:grpSpPr>
+      <p:sp>
+        <p:nvSpPr>
+          <p:cNvPr id="4" name="Rechteck 3">
+            <a:extLst>
+              <a:ext uri="{FF2B5EF4-FFF2-40B4-BE49-F238E27FC236}">
+                <a16:creationId xmlns:a16="http://schemas.microsoft.com/office/drawing/2014/main" id="{8BB2F650-D5FD-4C8D-9E38-C8E618FF702D}"/>
+              </a:ext>
+            </a:extLst>
+          </p:cNvPr>
+          <p:cNvSpPr/>
+          <p:nvPr/>
+        </p:nvSpPr>
+        <p:spPr>
+          <a:xfrm>
+            <a:off x="8749561" y="1930205"/>
+            <a:ext cx="9501077" cy="4557682"/>
+          </a:xfrm>
+          <a:prstGeom prst="rect">
+            <a:avLst/>
+          </a:prstGeom>
+          <a:noFill/>
+          <a:ln>
+            <a:solidFill>
+              <a:schemeClr val="tx1"/>
+            </a:solidFill>
+          </a:ln>
+        </p:spPr>
+        <p:style>
+          <a:lnRef idx="2">
+            <a:schemeClr val="accent1">
+              <a:shade val="50000"/>
+            </a:schemeClr>
+          </a:lnRef>
+          <a:fillRef idx="1">
+            <a:schemeClr val="accent1"/>
+          </a:fillRef>
+          <a:effectRef idx="0">
+            <a:schemeClr val="accent1"/>
+          </a:effectRef>
+          <a:fontRef idx="minor">
+            <a:schemeClr val="lt1"/>
+          </a:fontRef>
+        </p:style>
+        <p:txBody>
+          <a:bodyPr rtlCol="0" anchor="ctr"/>
+          <a:lstStyle/>
+          <a:p>
+            <a:pPr algn="ctr"/>
+            <a:r>
+              <a:rPr lang="en-US" sz="5400" b="1" dirty="0">
+                <a:solidFill>
+                  <a:schemeClr val="tx1"/>
+                </a:solidFill>
+              </a:rPr>
+              <a:t>Base Model</a:t>
+            </a:r>
+          </a:p>
+          <a:p>
+            <a:pPr algn="ctr"/>
+            <a:r>
+              <a:rPr lang="en-US" sz="5400" dirty="0">
+                <a:solidFill>
+                  <a:schemeClr val="tx1"/>
+                </a:solidFill>
+              </a:rPr>
+              <a:t>(e.g., BERT, </a:t>
+            </a:r>
+            <a:r>
+              <a:rPr lang="en-US" sz="5400" dirty="0" err="1">
+                <a:solidFill>
+                  <a:schemeClr val="tx1"/>
+                </a:solidFill>
+              </a:rPr>
+              <a:t>RoBERTa</a:t>
+            </a:r>
+            <a:r>
+              <a:rPr lang="en-US" sz="5400" dirty="0">
+                <a:solidFill>
+                  <a:schemeClr val="tx1"/>
+                </a:solidFill>
+              </a:rPr>
+              <a:t> etc.)</a:t>
+            </a:r>
+          </a:p>
+          <a:p>
+            <a:pPr algn="ctr"/>
+            <a:r>
+              <a:rPr lang="en-US" sz="5400" i="1" dirty="0">
+                <a:solidFill>
+                  <a:schemeClr val="tx1"/>
+                </a:solidFill>
+              </a:rPr>
+              <a:t>Transformer</a:t>
+            </a:r>
+          </a:p>
+        </p:txBody>
+      </p:sp>
+      <p:sp>
+        <p:nvSpPr>
+          <p:cNvPr id="5" name="Rechteck 4">
+            <a:extLst>
+              <a:ext uri="{FF2B5EF4-FFF2-40B4-BE49-F238E27FC236}">
+                <a16:creationId xmlns:a16="http://schemas.microsoft.com/office/drawing/2014/main" id="{4EB33B9B-0C60-4C51-80B1-3BC1E406E551}"/>
+              </a:ext>
+            </a:extLst>
+          </p:cNvPr>
+          <p:cNvSpPr/>
+          <p:nvPr/>
+        </p:nvSpPr>
+        <p:spPr>
+          <a:xfrm>
+            <a:off x="1717390" y="9528434"/>
+            <a:ext cx="7032172" cy="2271680"/>
+          </a:xfrm>
+          <a:prstGeom prst="rect">
+            <a:avLst/>
+          </a:prstGeom>
+          <a:noFill/>
+          <a:ln>
+            <a:solidFill>
+              <a:schemeClr val="tx1"/>
+            </a:solidFill>
+          </a:ln>
+        </p:spPr>
+        <p:style>
+          <a:lnRef idx="2">
+            <a:schemeClr val="accent1">
+              <a:shade val="50000"/>
+            </a:schemeClr>
+          </a:lnRef>
+          <a:fillRef idx="1">
+            <a:schemeClr val="accent1"/>
+          </a:fillRef>
+          <a:effectRef idx="0">
+            <a:schemeClr val="accent1"/>
+          </a:effectRef>
+          <a:fontRef idx="minor">
+            <a:schemeClr val="lt1"/>
+          </a:fontRef>
+        </p:style>
+        <p:txBody>
+          <a:bodyPr rtlCol="0" anchor="ctr"/>
+          <a:lstStyle/>
+          <a:p>
+            <a:pPr algn="ctr"/>
+            <a:r>
+              <a:rPr lang="en-US" sz="5400" b="1" dirty="0">
+                <a:solidFill>
+                  <a:schemeClr val="tx1"/>
+                </a:solidFill>
+              </a:rPr>
+              <a:t>Text Embedding Model</a:t>
+            </a:r>
+          </a:p>
+          <a:p>
+            <a:pPr algn="ctr"/>
+            <a:r>
+              <a:rPr lang="en-US" sz="5400" i="1" dirty="0">
+                <a:solidFill>
+                  <a:schemeClr val="tx1"/>
+                </a:solidFill>
+              </a:rPr>
+              <a:t>R Interface</a:t>
+            </a:r>
+          </a:p>
+        </p:txBody>
+      </p:sp>
+      <p:sp>
+        <p:nvSpPr>
+          <p:cNvPr id="6" name="Rechteck 5">
+            <a:extLst>
+              <a:ext uri="{FF2B5EF4-FFF2-40B4-BE49-F238E27FC236}">
+                <a16:creationId xmlns:a16="http://schemas.microsoft.com/office/drawing/2014/main" id="{14B99E3C-7B17-40FF-AEE5-0713D6E6C165}"/>
+              </a:ext>
+            </a:extLst>
+          </p:cNvPr>
+          <p:cNvSpPr/>
+          <p:nvPr/>
+        </p:nvSpPr>
+        <p:spPr>
+          <a:xfrm>
+            <a:off x="9984013" y="9550205"/>
+            <a:ext cx="7032172" cy="2271680"/>
+          </a:xfrm>
+          <a:prstGeom prst="rect">
+            <a:avLst/>
+          </a:prstGeom>
+          <a:noFill/>
+          <a:ln>
+            <a:solidFill>
+              <a:schemeClr val="tx1"/>
+            </a:solidFill>
+          </a:ln>
+        </p:spPr>
+        <p:style>
+          <a:lnRef idx="2">
+            <a:schemeClr val="accent1">
+              <a:shade val="50000"/>
+            </a:schemeClr>
+          </a:lnRef>
+          <a:fillRef idx="1">
+            <a:schemeClr val="accent1"/>
+          </a:fillRef>
+          <a:effectRef idx="0">
+            <a:schemeClr val="accent1"/>
+          </a:effectRef>
+          <a:fontRef idx="minor">
+            <a:schemeClr val="lt1"/>
+          </a:fontRef>
+        </p:style>
+        <p:txBody>
+          <a:bodyPr rtlCol="0" anchor="ctr"/>
+          <a:lstStyle/>
+          <a:p>
+            <a:pPr algn="ctr"/>
+            <a:r>
+              <a:rPr lang="en-US" sz="5400" b="1" dirty="0">
+                <a:solidFill>
+                  <a:schemeClr val="tx1"/>
+                </a:solidFill>
+              </a:rPr>
+              <a:t>Text Embedding Model</a:t>
+            </a:r>
+          </a:p>
+          <a:p>
+            <a:pPr algn="ctr"/>
+            <a:r>
+              <a:rPr lang="en-US" sz="5400" i="1" dirty="0">
+                <a:solidFill>
+                  <a:schemeClr val="tx1"/>
+                </a:solidFill>
+              </a:rPr>
+              <a:t>R Interface</a:t>
+            </a:r>
+          </a:p>
+        </p:txBody>
+      </p:sp>
+      <p:sp>
+        <p:nvSpPr>
+          <p:cNvPr id="7" name="Rechteck 6">
+            <a:extLst>
+              <a:ext uri="{FF2B5EF4-FFF2-40B4-BE49-F238E27FC236}">
+                <a16:creationId xmlns:a16="http://schemas.microsoft.com/office/drawing/2014/main" id="{744A1A46-7E69-49E1-817D-672E0B4160C9}"/>
+              </a:ext>
+            </a:extLst>
+          </p:cNvPr>
+          <p:cNvSpPr/>
+          <p:nvPr/>
+        </p:nvSpPr>
+        <p:spPr>
+          <a:xfrm>
+            <a:off x="18250638" y="9550205"/>
+            <a:ext cx="7032172" cy="2271680"/>
+          </a:xfrm>
+          <a:prstGeom prst="rect">
+            <a:avLst/>
+          </a:prstGeom>
+          <a:noFill/>
+          <a:ln>
+            <a:solidFill>
+              <a:schemeClr val="tx1"/>
+            </a:solidFill>
+          </a:ln>
+        </p:spPr>
+        <p:style>
+          <a:lnRef idx="2">
+            <a:schemeClr val="accent1">
+              <a:shade val="50000"/>
+            </a:schemeClr>
+          </a:lnRef>
+          <a:fillRef idx="1">
+            <a:schemeClr val="accent1"/>
+          </a:fillRef>
+          <a:effectRef idx="0">
+            <a:schemeClr val="accent1"/>
+          </a:effectRef>
+          <a:fontRef idx="minor">
+            <a:schemeClr val="lt1"/>
+          </a:fontRef>
+        </p:style>
+        <p:txBody>
+          <a:bodyPr rtlCol="0" anchor="ctr"/>
+          <a:lstStyle/>
+          <a:p>
+            <a:pPr algn="ctr"/>
+            <a:r>
+              <a:rPr lang="en-US" sz="5400" b="1" dirty="0">
+                <a:solidFill>
+                  <a:schemeClr val="tx1"/>
+                </a:solidFill>
+              </a:rPr>
+              <a:t>Text Embedding Model</a:t>
+            </a:r>
+          </a:p>
+          <a:p>
+            <a:pPr algn="ctr"/>
+            <a:r>
+              <a:rPr lang="en-US" sz="5400" i="1" dirty="0">
+                <a:solidFill>
+                  <a:schemeClr val="tx1"/>
+                </a:solidFill>
+              </a:rPr>
+              <a:t>R Interface</a:t>
+            </a:r>
+          </a:p>
+        </p:txBody>
+      </p:sp>
+      <p:sp>
+        <p:nvSpPr>
+          <p:cNvPr id="8" name="Rechteck 7">
+            <a:extLst>
+              <a:ext uri="{FF2B5EF4-FFF2-40B4-BE49-F238E27FC236}">
+                <a16:creationId xmlns:a16="http://schemas.microsoft.com/office/drawing/2014/main" id="{4C90B74B-70B9-4C7E-9850-DF50F97FFF26}"/>
+              </a:ext>
+            </a:extLst>
+          </p:cNvPr>
+          <p:cNvSpPr/>
+          <p:nvPr/>
+        </p:nvSpPr>
+        <p:spPr>
+          <a:xfrm>
+            <a:off x="1717389" y="14840661"/>
+            <a:ext cx="7032172" cy="2271680"/>
+          </a:xfrm>
+          <a:prstGeom prst="rect">
+            <a:avLst/>
+          </a:prstGeom>
+          <a:noFill/>
+          <a:ln>
+            <a:solidFill>
+              <a:schemeClr val="tx1"/>
+            </a:solidFill>
+          </a:ln>
+        </p:spPr>
+        <p:style>
+          <a:lnRef idx="2">
+            <a:schemeClr val="accent1">
+              <a:shade val="50000"/>
+            </a:schemeClr>
+          </a:lnRef>
+          <a:fillRef idx="1">
+            <a:schemeClr val="accent1"/>
+          </a:fillRef>
+          <a:effectRef idx="0">
+            <a:schemeClr val="accent1"/>
+          </a:effectRef>
+          <a:fontRef idx="minor">
+            <a:schemeClr val="lt1"/>
+          </a:fontRef>
+        </p:style>
+        <p:txBody>
+          <a:bodyPr rtlCol="0" anchor="ctr"/>
+          <a:lstStyle/>
+          <a:p>
+            <a:pPr algn="ctr"/>
+            <a:r>
+              <a:rPr lang="en-US" sz="4800" b="1" dirty="0">
+                <a:solidFill>
+                  <a:schemeClr val="tx1"/>
+                </a:solidFill>
+              </a:rPr>
+              <a:t>Classifier</a:t>
+            </a:r>
+          </a:p>
+          <a:p>
+            <a:pPr algn="ctr"/>
+            <a:r>
+              <a:rPr lang="en-US" sz="4800" i="1" dirty="0">
+                <a:solidFill>
+                  <a:schemeClr val="tx1"/>
+                </a:solidFill>
+              </a:rPr>
+              <a:t>R Interface</a:t>
+            </a:r>
+          </a:p>
+          <a:p>
+            <a:pPr algn="ctr"/>
+            <a:r>
+              <a:rPr lang="en-US" sz="4800" i="1" dirty="0" err="1">
+                <a:solidFill>
+                  <a:schemeClr val="tx1"/>
+                </a:solidFill>
+              </a:rPr>
+              <a:t>Tensorflow</a:t>
+            </a:r>
+            <a:r>
+              <a:rPr lang="en-US" sz="4800" i="1" dirty="0">
+                <a:solidFill>
+                  <a:schemeClr val="tx1"/>
+                </a:solidFill>
+              </a:rPr>
+              <a:t>/</a:t>
+            </a:r>
+            <a:r>
+              <a:rPr lang="en-US" sz="4800" i="1" dirty="0" err="1">
+                <a:solidFill>
+                  <a:schemeClr val="tx1"/>
+                </a:solidFill>
+              </a:rPr>
+              <a:t>PyTorch</a:t>
+            </a:r>
+            <a:r>
+              <a:rPr lang="en-US" sz="4800" i="1" dirty="0">
+                <a:solidFill>
+                  <a:schemeClr val="tx1"/>
+                </a:solidFill>
+              </a:rPr>
+              <a:t> Model</a:t>
+            </a:r>
+          </a:p>
+        </p:txBody>
+      </p:sp>
+      <p:sp>
+        <p:nvSpPr>
+          <p:cNvPr id="9" name="Rechteck 8">
+            <a:extLst>
+              <a:ext uri="{FF2B5EF4-FFF2-40B4-BE49-F238E27FC236}">
+                <a16:creationId xmlns:a16="http://schemas.microsoft.com/office/drawing/2014/main" id="{9BD85F47-95AA-4142-A148-2B7BDC7BB19C}"/>
+              </a:ext>
+            </a:extLst>
+          </p:cNvPr>
+          <p:cNvSpPr/>
+          <p:nvPr/>
+        </p:nvSpPr>
+        <p:spPr>
+          <a:xfrm>
+            <a:off x="9984013" y="14884203"/>
+            <a:ext cx="7032172" cy="2271680"/>
+          </a:xfrm>
+          <a:prstGeom prst="rect">
+            <a:avLst/>
+          </a:prstGeom>
+          <a:noFill/>
+          <a:ln>
+            <a:solidFill>
+              <a:schemeClr val="tx1"/>
+            </a:solidFill>
+          </a:ln>
+        </p:spPr>
+        <p:style>
+          <a:lnRef idx="2">
+            <a:schemeClr val="accent1">
+              <a:shade val="50000"/>
+            </a:schemeClr>
+          </a:lnRef>
+          <a:fillRef idx="1">
+            <a:schemeClr val="accent1"/>
+          </a:fillRef>
+          <a:effectRef idx="0">
+            <a:schemeClr val="accent1"/>
+          </a:effectRef>
+          <a:fontRef idx="minor">
+            <a:schemeClr val="lt1"/>
+          </a:fontRef>
+        </p:style>
+        <p:txBody>
+          <a:bodyPr rtlCol="0" anchor="ctr"/>
+          <a:lstStyle/>
+          <a:p>
+            <a:pPr algn="ctr"/>
+            <a:r>
+              <a:rPr lang="en-US" sz="4800" b="1" dirty="0">
+                <a:solidFill>
+                  <a:schemeClr val="tx1"/>
+                </a:solidFill>
+              </a:rPr>
+              <a:t>Classifier</a:t>
+            </a:r>
+          </a:p>
+          <a:p>
+            <a:pPr algn="ctr"/>
+            <a:r>
+              <a:rPr lang="en-US" sz="4800" i="1" dirty="0">
+                <a:solidFill>
+                  <a:schemeClr val="tx1"/>
+                </a:solidFill>
+              </a:rPr>
+              <a:t>R Interface</a:t>
+            </a:r>
+          </a:p>
+          <a:p>
+            <a:pPr algn="ctr"/>
+            <a:r>
+              <a:rPr lang="en-US" sz="4800" i="1" dirty="0" err="1">
+                <a:solidFill>
+                  <a:schemeClr val="tx1"/>
+                </a:solidFill>
+              </a:rPr>
+              <a:t>Tensorflow</a:t>
+            </a:r>
+            <a:r>
+              <a:rPr lang="en-US" sz="4800" i="1" dirty="0">
+                <a:solidFill>
+                  <a:schemeClr val="tx1"/>
+                </a:solidFill>
+              </a:rPr>
+              <a:t>/</a:t>
+            </a:r>
+            <a:r>
+              <a:rPr lang="en-US" sz="4800" i="1" dirty="0" err="1">
+                <a:solidFill>
+                  <a:schemeClr val="tx1"/>
+                </a:solidFill>
+              </a:rPr>
+              <a:t>PyTorch</a:t>
+            </a:r>
+            <a:r>
+              <a:rPr lang="en-US" sz="4800" i="1" dirty="0">
+                <a:solidFill>
+                  <a:schemeClr val="tx1"/>
+                </a:solidFill>
+              </a:rPr>
+              <a:t> Model</a:t>
+            </a:r>
+          </a:p>
+        </p:txBody>
+      </p:sp>
+      <p:sp>
+        <p:nvSpPr>
+          <p:cNvPr id="10" name="Rechteck 9">
+            <a:extLst>
+              <a:ext uri="{FF2B5EF4-FFF2-40B4-BE49-F238E27FC236}">
+                <a16:creationId xmlns:a16="http://schemas.microsoft.com/office/drawing/2014/main" id="{B22B01BB-E5D1-407E-88B1-0E77941F0180}"/>
+              </a:ext>
+            </a:extLst>
+          </p:cNvPr>
+          <p:cNvSpPr/>
+          <p:nvPr/>
+        </p:nvSpPr>
+        <p:spPr>
+          <a:xfrm>
+            <a:off x="18250637" y="14884203"/>
+            <a:ext cx="7032172" cy="2271680"/>
+          </a:xfrm>
+          <a:prstGeom prst="rect">
+            <a:avLst/>
+          </a:prstGeom>
+          <a:noFill/>
+          <a:ln>
+            <a:solidFill>
+              <a:schemeClr val="tx1"/>
+            </a:solidFill>
+          </a:ln>
+        </p:spPr>
+        <p:style>
+          <a:lnRef idx="2">
+            <a:schemeClr val="accent1">
+              <a:shade val="50000"/>
+            </a:schemeClr>
+          </a:lnRef>
+          <a:fillRef idx="1">
+            <a:schemeClr val="accent1"/>
+          </a:fillRef>
+          <a:effectRef idx="0">
+            <a:schemeClr val="accent1"/>
+          </a:effectRef>
+          <a:fontRef idx="minor">
+            <a:schemeClr val="lt1"/>
+          </a:fontRef>
+        </p:style>
+        <p:txBody>
+          <a:bodyPr rtlCol="0" anchor="ctr"/>
+          <a:lstStyle/>
+          <a:p>
+            <a:pPr algn="ctr"/>
+            <a:r>
+              <a:rPr lang="en-US" sz="4800" b="1" dirty="0">
+                <a:solidFill>
+                  <a:schemeClr val="tx1"/>
+                </a:solidFill>
+              </a:rPr>
+              <a:t>Classifier</a:t>
+            </a:r>
+          </a:p>
+          <a:p>
+            <a:pPr algn="ctr"/>
+            <a:r>
+              <a:rPr lang="en-US" sz="4800" i="1" dirty="0">
+                <a:solidFill>
+                  <a:schemeClr val="tx1"/>
+                </a:solidFill>
+              </a:rPr>
+              <a:t>R Interface</a:t>
+            </a:r>
+          </a:p>
+          <a:p>
+            <a:pPr algn="ctr"/>
+            <a:r>
+              <a:rPr lang="en-US" sz="4800" i="1" dirty="0" err="1">
+                <a:solidFill>
+                  <a:schemeClr val="tx1"/>
+                </a:solidFill>
+              </a:rPr>
+              <a:t>Tensorflow</a:t>
+            </a:r>
+            <a:r>
+              <a:rPr lang="en-US" sz="4800" i="1" dirty="0">
+                <a:solidFill>
+                  <a:schemeClr val="tx1"/>
+                </a:solidFill>
+              </a:rPr>
+              <a:t>/</a:t>
+            </a:r>
+            <a:r>
+              <a:rPr lang="en-US" sz="4800" i="1" dirty="0" err="1">
+                <a:solidFill>
+                  <a:schemeClr val="tx1"/>
+                </a:solidFill>
+              </a:rPr>
+              <a:t>PyTorch</a:t>
+            </a:r>
+            <a:r>
+              <a:rPr lang="en-US" sz="4800" i="1" dirty="0">
+                <a:solidFill>
+                  <a:schemeClr val="tx1"/>
+                </a:solidFill>
+              </a:rPr>
+              <a:t> Model</a:t>
+            </a:r>
+          </a:p>
+        </p:txBody>
+      </p:sp>
+      <p:cxnSp>
+        <p:nvCxnSpPr>
+          <p:cNvPr id="12" name="Gerade Verbindung mit Pfeil 11">
+            <a:extLst>
+              <a:ext uri="{FF2B5EF4-FFF2-40B4-BE49-F238E27FC236}">
+                <a16:creationId xmlns:a16="http://schemas.microsoft.com/office/drawing/2014/main" id="{B7E1811E-1330-405A-8E19-39E2E4C120EE}"/>
+              </a:ext>
+            </a:extLst>
+          </p:cNvPr>
+          <p:cNvCxnSpPr>
+            <a:cxnSpLocks/>
+            <a:stCxn id="4" idx="2"/>
+            <a:endCxn id="5" idx="0"/>
+          </p:cNvCxnSpPr>
+          <p:nvPr/>
+        </p:nvCxnSpPr>
+        <p:spPr>
+          <a:xfrm flipH="1">
+            <a:off x="5233476" y="6487887"/>
+            <a:ext cx="8266624" cy="3040547"/>
+          </a:xfrm>
+          <a:prstGeom prst="straightConnector1">
+            <a:avLst/>
+          </a:prstGeom>
+          <a:ln w="76200">
+            <a:solidFill>
+              <a:schemeClr val="tx1"/>
+            </a:solidFill>
+            <a:tailEnd type="triangle"/>
+          </a:ln>
+        </p:spPr>
+        <p:style>
+          <a:lnRef idx="1">
+            <a:schemeClr val="accent1"/>
+          </a:lnRef>
+          <a:fillRef idx="0">
+            <a:schemeClr val="accent1"/>
+          </a:fillRef>
+          <a:effectRef idx="0">
+            <a:schemeClr val="accent1"/>
+          </a:effectRef>
+          <a:fontRef idx="minor">
+            <a:schemeClr val="tx1"/>
+          </a:fontRef>
+        </p:style>
+      </p:cxnSp>
+      <p:cxnSp>
+        <p:nvCxnSpPr>
+          <p:cNvPr id="14" name="Gerade Verbindung mit Pfeil 13">
+            <a:extLst>
+              <a:ext uri="{FF2B5EF4-FFF2-40B4-BE49-F238E27FC236}">
+                <a16:creationId xmlns:a16="http://schemas.microsoft.com/office/drawing/2014/main" id="{F3E9EE04-E472-432F-875F-7C3419FB8095}"/>
+              </a:ext>
+            </a:extLst>
+          </p:cNvPr>
+          <p:cNvCxnSpPr>
+            <a:cxnSpLocks/>
+            <a:stCxn id="4" idx="2"/>
+            <a:endCxn id="6" idx="0"/>
+          </p:cNvCxnSpPr>
+          <p:nvPr/>
+        </p:nvCxnSpPr>
+        <p:spPr>
+          <a:xfrm flipH="1">
+            <a:off x="13500099" y="6487887"/>
+            <a:ext cx="1" cy="3062318"/>
+          </a:xfrm>
+          <a:prstGeom prst="straightConnector1">
+            <a:avLst/>
+          </a:prstGeom>
+          <a:ln w="76200">
+            <a:solidFill>
+              <a:schemeClr val="tx1"/>
+            </a:solidFill>
+            <a:tailEnd type="triangle"/>
+          </a:ln>
+        </p:spPr>
+        <p:style>
+          <a:lnRef idx="1">
+            <a:schemeClr val="accent1"/>
+          </a:lnRef>
+          <a:fillRef idx="0">
+            <a:schemeClr val="accent1"/>
+          </a:fillRef>
+          <a:effectRef idx="0">
+            <a:schemeClr val="accent1"/>
+          </a:effectRef>
+          <a:fontRef idx="minor">
+            <a:schemeClr val="tx1"/>
+          </a:fontRef>
+        </p:style>
+      </p:cxnSp>
+      <p:cxnSp>
+        <p:nvCxnSpPr>
+          <p:cNvPr id="19" name="Gerade Verbindung mit Pfeil 18">
+            <a:extLst>
+              <a:ext uri="{FF2B5EF4-FFF2-40B4-BE49-F238E27FC236}">
+                <a16:creationId xmlns:a16="http://schemas.microsoft.com/office/drawing/2014/main" id="{1ECDF1B2-605A-4926-B25B-D494FF8F7F90}"/>
+              </a:ext>
+            </a:extLst>
+          </p:cNvPr>
+          <p:cNvCxnSpPr>
+            <a:stCxn id="4" idx="2"/>
+          </p:cNvCxnSpPr>
+          <p:nvPr/>
+        </p:nvCxnSpPr>
+        <p:spPr>
+          <a:xfrm>
+            <a:off x="13500100" y="6487887"/>
+            <a:ext cx="8266623" cy="3062318"/>
+          </a:xfrm>
+          <a:prstGeom prst="straightConnector1">
+            <a:avLst/>
+          </a:prstGeom>
+          <a:ln w="76200">
+            <a:solidFill>
+              <a:schemeClr val="tx1"/>
+            </a:solidFill>
+            <a:tailEnd type="triangle"/>
+          </a:ln>
+        </p:spPr>
+        <p:style>
+          <a:lnRef idx="1">
+            <a:schemeClr val="accent1"/>
+          </a:lnRef>
+          <a:fillRef idx="0">
+            <a:schemeClr val="accent1"/>
+          </a:fillRef>
+          <a:effectRef idx="0">
+            <a:schemeClr val="accent1"/>
+          </a:effectRef>
+          <a:fontRef idx="minor">
+            <a:schemeClr val="tx1"/>
+          </a:fontRef>
+        </p:style>
+      </p:cxnSp>
+      <p:cxnSp>
+        <p:nvCxnSpPr>
+          <p:cNvPr id="21" name="Gerade Verbindung mit Pfeil 20">
+            <a:extLst>
+              <a:ext uri="{FF2B5EF4-FFF2-40B4-BE49-F238E27FC236}">
+                <a16:creationId xmlns:a16="http://schemas.microsoft.com/office/drawing/2014/main" id="{302A89AE-46EC-4ACC-BE66-DCF96178F947}"/>
+              </a:ext>
+            </a:extLst>
+          </p:cNvPr>
+          <p:cNvCxnSpPr>
+            <a:stCxn id="6" idx="2"/>
+            <a:endCxn id="8" idx="0"/>
+          </p:cNvCxnSpPr>
+          <p:nvPr/>
+        </p:nvCxnSpPr>
+        <p:spPr>
+          <a:xfrm flipH="1">
+            <a:off x="5233475" y="11821885"/>
+            <a:ext cx="8266624" cy="3018776"/>
+          </a:xfrm>
+          <a:prstGeom prst="straightConnector1">
+            <a:avLst/>
+          </a:prstGeom>
+          <a:ln w="76200">
+            <a:solidFill>
+              <a:schemeClr val="tx1"/>
+            </a:solidFill>
+            <a:tailEnd type="triangle"/>
+          </a:ln>
+        </p:spPr>
+        <p:style>
+          <a:lnRef idx="1">
+            <a:schemeClr val="accent1"/>
+          </a:lnRef>
+          <a:fillRef idx="0">
+            <a:schemeClr val="accent1"/>
+          </a:fillRef>
+          <a:effectRef idx="0">
+            <a:schemeClr val="accent1"/>
+          </a:effectRef>
+          <a:fontRef idx="minor">
+            <a:schemeClr val="tx1"/>
+          </a:fontRef>
+        </p:style>
+      </p:cxnSp>
+      <p:cxnSp>
+        <p:nvCxnSpPr>
+          <p:cNvPr id="23" name="Gerade Verbindung mit Pfeil 22">
+            <a:extLst>
+              <a:ext uri="{FF2B5EF4-FFF2-40B4-BE49-F238E27FC236}">
+                <a16:creationId xmlns:a16="http://schemas.microsoft.com/office/drawing/2014/main" id="{57EE94F6-736D-4A3C-AF4D-64B43CA4A243}"/>
+              </a:ext>
+            </a:extLst>
+          </p:cNvPr>
+          <p:cNvCxnSpPr>
+            <a:cxnSpLocks/>
+            <a:stCxn id="6" idx="2"/>
+            <a:endCxn id="9" idx="0"/>
+          </p:cNvCxnSpPr>
+          <p:nvPr/>
+        </p:nvCxnSpPr>
+        <p:spPr>
+          <a:xfrm>
+            <a:off x="13500099" y="11821885"/>
+            <a:ext cx="0" cy="3062318"/>
+          </a:xfrm>
+          <a:prstGeom prst="straightConnector1">
+            <a:avLst/>
+          </a:prstGeom>
+          <a:ln w="76200">
+            <a:solidFill>
+              <a:schemeClr val="tx1"/>
+            </a:solidFill>
+            <a:tailEnd type="triangle"/>
+          </a:ln>
+        </p:spPr>
+        <p:style>
+          <a:lnRef idx="1">
+            <a:schemeClr val="accent1"/>
+          </a:lnRef>
+          <a:fillRef idx="0">
+            <a:schemeClr val="accent1"/>
+          </a:fillRef>
+          <a:effectRef idx="0">
+            <a:schemeClr val="accent1"/>
+          </a:effectRef>
+          <a:fontRef idx="minor">
+            <a:schemeClr val="tx1"/>
+          </a:fontRef>
+        </p:style>
+      </p:cxnSp>
+      <p:cxnSp>
+        <p:nvCxnSpPr>
+          <p:cNvPr id="27" name="Gerade Verbindung mit Pfeil 26">
+            <a:extLst>
+              <a:ext uri="{FF2B5EF4-FFF2-40B4-BE49-F238E27FC236}">
+                <a16:creationId xmlns:a16="http://schemas.microsoft.com/office/drawing/2014/main" id="{21B0055C-2AE9-4254-A9A8-BD8B46DD8485}"/>
+              </a:ext>
+            </a:extLst>
+          </p:cNvPr>
+          <p:cNvCxnSpPr>
+            <a:stCxn id="6" idx="2"/>
+            <a:endCxn id="10" idx="0"/>
+          </p:cNvCxnSpPr>
+          <p:nvPr/>
+        </p:nvCxnSpPr>
+        <p:spPr>
+          <a:xfrm>
+            <a:off x="13500099" y="11821885"/>
+            <a:ext cx="8266624" cy="3062318"/>
+          </a:xfrm>
+          <a:prstGeom prst="straightConnector1">
+            <a:avLst/>
+          </a:prstGeom>
+          <a:ln w="76200">
+            <a:solidFill>
+              <a:schemeClr val="tx1"/>
+            </a:solidFill>
+            <a:tailEnd type="triangle"/>
+          </a:ln>
+        </p:spPr>
+        <p:style>
+          <a:lnRef idx="1">
+            <a:schemeClr val="accent1"/>
+          </a:lnRef>
+          <a:fillRef idx="0">
+            <a:schemeClr val="accent1"/>
+          </a:fillRef>
+          <a:effectRef idx="0">
+            <a:schemeClr val="accent1"/>
+          </a:effectRef>
+          <a:fontRef idx="minor">
+            <a:schemeClr val="tx1"/>
+          </a:fontRef>
+        </p:style>
+      </p:cxnSp>
+    </p:spTree>
+    <p:extLst>
+      <p:ext uri="{BB962C8B-B14F-4D97-AF65-F5344CB8AC3E}">
+        <p14:creationId xmlns:p14="http://schemas.microsoft.com/office/powerpoint/2010/main" val="4128543342"/>
+      </p:ext>
+    </p:extLst>
+  </p:cSld>
+  <p:clrMapOvr>
+    <a:masterClrMapping/>
+  </p:clrMapOvr>
+</p:sld>
+</file>
+
 <file path=ppt/theme/theme1.xml><?xml version="1.0" encoding="utf-8"?>
 <a:theme xmlns:a="http://schemas.openxmlformats.org/drawingml/2006/main" name="Office">
   <a:themeElements>

</xml_diff>

<commit_message>
-Update Documentation and vignette classification -Update Tests for classifiers -Update classifier python scripts for a better selection of the best model
</commit_message>
<xml_diff>
--- a/materials/images_hochformat.pptx
+++ b/materials/images_hochformat.pptx
@@ -248,7 +248,7 @@
           <a:p>
             <a:fld id="{F39F49B5-785A-44C4-99F0-898FF83CD003}" type="datetimeFigureOut">
               <a:rPr lang="de-DE" smtClean="0"/>
-              <a:t>15.05.2024</a:t>
+              <a:t>24.09.2024</a:t>
             </a:fld>
             <a:endParaRPr lang="de-DE"/>
           </a:p>
@@ -418,7 +418,7 @@
           <a:p>
             <a:fld id="{F39F49B5-785A-44C4-99F0-898FF83CD003}" type="datetimeFigureOut">
               <a:rPr lang="de-DE" smtClean="0"/>
-              <a:t>15.05.2024</a:t>
+              <a:t>24.09.2024</a:t>
             </a:fld>
             <a:endParaRPr lang="de-DE"/>
           </a:p>
@@ -598,7 +598,7 @@
           <a:p>
             <a:fld id="{F39F49B5-785A-44C4-99F0-898FF83CD003}" type="datetimeFigureOut">
               <a:rPr lang="de-DE" smtClean="0"/>
-              <a:t>15.05.2024</a:t>
+              <a:t>24.09.2024</a:t>
             </a:fld>
             <a:endParaRPr lang="de-DE"/>
           </a:p>
@@ -768,7 +768,7 @@
           <a:p>
             <a:fld id="{F39F49B5-785A-44C4-99F0-898FF83CD003}" type="datetimeFigureOut">
               <a:rPr lang="de-DE" smtClean="0"/>
-              <a:t>15.05.2024</a:t>
+              <a:t>24.09.2024</a:t>
             </a:fld>
             <a:endParaRPr lang="de-DE"/>
           </a:p>
@@ -1012,7 +1012,7 @@
           <a:p>
             <a:fld id="{F39F49B5-785A-44C4-99F0-898FF83CD003}" type="datetimeFigureOut">
               <a:rPr lang="de-DE" smtClean="0"/>
-              <a:t>15.05.2024</a:t>
+              <a:t>24.09.2024</a:t>
             </a:fld>
             <a:endParaRPr lang="de-DE"/>
           </a:p>
@@ -1244,7 +1244,7 @@
           <a:p>
             <a:fld id="{F39F49B5-785A-44C4-99F0-898FF83CD003}" type="datetimeFigureOut">
               <a:rPr lang="de-DE" smtClean="0"/>
-              <a:t>15.05.2024</a:t>
+              <a:t>24.09.2024</a:t>
             </a:fld>
             <a:endParaRPr lang="de-DE"/>
           </a:p>
@@ -1611,7 +1611,7 @@
           <a:p>
             <a:fld id="{F39F49B5-785A-44C4-99F0-898FF83CD003}" type="datetimeFigureOut">
               <a:rPr lang="de-DE" smtClean="0"/>
-              <a:t>15.05.2024</a:t>
+              <a:t>24.09.2024</a:t>
             </a:fld>
             <a:endParaRPr lang="de-DE"/>
           </a:p>
@@ -1729,7 +1729,7 @@
           <a:p>
             <a:fld id="{F39F49B5-785A-44C4-99F0-898FF83CD003}" type="datetimeFigureOut">
               <a:rPr lang="de-DE" smtClean="0"/>
-              <a:t>15.05.2024</a:t>
+              <a:t>24.09.2024</a:t>
             </a:fld>
             <a:endParaRPr lang="de-DE"/>
           </a:p>
@@ -1824,7 +1824,7 @@
           <a:p>
             <a:fld id="{F39F49B5-785A-44C4-99F0-898FF83CD003}" type="datetimeFigureOut">
               <a:rPr lang="de-DE" smtClean="0"/>
-              <a:t>15.05.2024</a:t>
+              <a:t>24.09.2024</a:t>
             </a:fld>
             <a:endParaRPr lang="de-DE"/>
           </a:p>
@@ -2101,7 +2101,7 @@
           <a:p>
             <a:fld id="{F39F49B5-785A-44C4-99F0-898FF83CD003}" type="datetimeFigureOut">
               <a:rPr lang="de-DE" smtClean="0"/>
-              <a:t>15.05.2024</a:t>
+              <a:t>24.09.2024</a:t>
             </a:fld>
             <a:endParaRPr lang="de-DE"/>
           </a:p>
@@ -2358,7 +2358,7 @@
           <a:p>
             <a:fld id="{F39F49B5-785A-44C4-99F0-898FF83CD003}" type="datetimeFigureOut">
               <a:rPr lang="de-DE" smtClean="0"/>
-              <a:t>15.05.2024</a:t>
+              <a:t>24.09.2024</a:t>
             </a:fld>
             <a:endParaRPr lang="de-DE"/>
           </a:p>
@@ -2571,7 +2571,7 @@
           <a:p>
             <a:fld id="{F39F49B5-785A-44C4-99F0-898FF83CD003}" type="datetimeFigureOut">
               <a:rPr lang="de-DE" smtClean="0"/>
-              <a:t>15.05.2024</a:t>
+              <a:t>24.09.2024</a:t>
             </a:fld>
             <a:endParaRPr lang="de-DE"/>
           </a:p>
@@ -10748,7 +10748,7 @@
         <p:spPr>
           <a:xfrm>
             <a:off x="16217900" y="7354312"/>
-            <a:ext cx="10782300" cy="5509200"/>
+            <a:ext cx="10782300" cy="4832092"/>
           </a:xfrm>
           <a:prstGeom prst="rect">
             <a:avLst/>
@@ -10767,31 +10767,39 @@
             </a:r>
             <a:r>
               <a:rPr lang="en-US" sz="4400" b="1" dirty="0"/>
-              <a:t> rec</a:t>
-            </a:r>
+              <a:t> </a:t>
+            </a:r>
+            <a:r>
+              <a:rPr lang="en-US" sz="4400" b="1" dirty="0" err="1"/>
+              <a:t>rec_layers</a:t>
+            </a:r>
+            <a:endParaRPr lang="en-US" sz="4400" b="1" dirty="0"/>
           </a:p>
           <a:p>
             <a:r>
               <a:rPr lang="en-US" sz="4400" dirty="0"/>
-              <a:t>Number of layers: Vector length </a:t>
-            </a:r>
+              <a:t>Number of layers</a:t>
+            </a:r>
+          </a:p>
+          <a:p>
+            <a:r>
+              <a:rPr lang="en-US" sz="4400" b="1" i="1" dirty="0"/>
+              <a:t>Parameter</a:t>
+            </a:r>
+            <a:r>
+              <a:rPr lang="en-US" sz="4400" b="1" dirty="0"/>
+              <a:t> </a:t>
+            </a:r>
+            <a:r>
+              <a:rPr lang="en-US" sz="4400" b="1" dirty="0" err="1"/>
+              <a:t>rec_size</a:t>
+            </a:r>
+            <a:endParaRPr lang="en-US" sz="4400" b="1" dirty="0"/>
           </a:p>
           <a:p>
             <a:r>
               <a:rPr lang="en-US" sz="4400" dirty="0"/>
-              <a:t>Number of neurons:  Vector elements</a:t>
-            </a:r>
-          </a:p>
-          <a:p>
-            <a:r>
-              <a:rPr lang="en-US" sz="4400" dirty="0"/>
-              <a:t>Times: automatic</a:t>
-            </a:r>
-          </a:p>
-          <a:p>
-            <a:r>
-              <a:rPr lang="en-US" sz="4400" dirty="0"/>
-              <a:t>Features: automatic</a:t>
+              <a:t>Number of neurons</a:t>
             </a:r>
           </a:p>
           <a:p>
@@ -11001,8 +11009,8 @@
         </p:nvSpPr>
         <p:spPr>
           <a:xfrm>
-            <a:off x="16014716" y="14615336"/>
-            <a:ext cx="10782300" cy="2800767"/>
+            <a:off x="16014716" y="15004507"/>
+            <a:ext cx="10782300" cy="3477875"/>
           </a:xfrm>
           <a:prstGeom prst="rect">
             <a:avLst/>
@@ -11021,19 +11029,39 @@
             </a:r>
             <a:r>
               <a:rPr lang="en-US" sz="4400" b="1" dirty="0"/>
-              <a:t> hidden</a:t>
-            </a:r>
+              <a:t> </a:t>
+            </a:r>
+            <a:r>
+              <a:rPr lang="en-US" sz="4400" b="1" dirty="0" err="1"/>
+              <a:t>dense_layers</a:t>
+            </a:r>
+            <a:endParaRPr lang="en-US" sz="4400" b="1" dirty="0"/>
           </a:p>
           <a:p>
             <a:r>
               <a:rPr lang="en-US" sz="4400" dirty="0"/>
-              <a:t>Number of layers: Vector length</a:t>
-            </a:r>
+              <a:t>Number of layers</a:t>
+            </a:r>
+          </a:p>
+          <a:p>
+            <a:r>
+              <a:rPr lang="en-US" sz="4400" b="1" i="1" dirty="0"/>
+              <a:t>Parameter</a:t>
+            </a:r>
+            <a:r>
+              <a:rPr lang="en-US" sz="4400" b="1" dirty="0"/>
+              <a:t> </a:t>
+            </a:r>
+            <a:r>
+              <a:rPr lang="en-US" sz="4400" b="1" dirty="0" err="1"/>
+              <a:t>dense_size</a:t>
+            </a:r>
+            <a:endParaRPr lang="en-US" sz="4400" dirty="0"/>
           </a:p>
           <a:p>
             <a:r>
               <a:rPr lang="en-US" sz="4400" dirty="0"/>
-              <a:t>Number of neurons:  Vector elements</a:t>
+              <a:t>Number of neurons</a:t>
             </a:r>
             <a:br>
               <a:rPr lang="en-US" sz="4400" dirty="0"/>

</xml_diff>

<commit_message>
[Feat] Plot histor for TextEmbeddingModels, Classifiers and FeatureExtractir [Feat] Plot coding stream for classifiers [Fix] Normalized documentation and documentation functions [Update] Studie to the new functions [Removed] Support for DeBERTaV2 [Update] Updated and extendted Vignette for using the package with Syntax
</commit_message>
<xml_diff>
--- a/materials/images_hochformat.pptx
+++ b/materials/images_hochformat.pptx
@@ -256,7 +256,7 @@
           <a:p>
             <a:fld id="{F39F49B5-785A-44C4-99F0-898FF83CD003}" type="datetimeFigureOut">
               <a:rPr lang="de-DE" smtClean="0"/>
-              <a:t>04.07.2025</a:t>
+              <a:t>11.07.2025</a:t>
             </a:fld>
             <a:endParaRPr lang="de-DE"/>
           </a:p>
@@ -426,7 +426,7 @@
           <a:p>
             <a:fld id="{F39F49B5-785A-44C4-99F0-898FF83CD003}" type="datetimeFigureOut">
               <a:rPr lang="de-DE" smtClean="0"/>
-              <a:t>04.07.2025</a:t>
+              <a:t>11.07.2025</a:t>
             </a:fld>
             <a:endParaRPr lang="de-DE"/>
           </a:p>
@@ -606,7 +606,7 @@
           <a:p>
             <a:fld id="{F39F49B5-785A-44C4-99F0-898FF83CD003}" type="datetimeFigureOut">
               <a:rPr lang="de-DE" smtClean="0"/>
-              <a:t>04.07.2025</a:t>
+              <a:t>11.07.2025</a:t>
             </a:fld>
             <a:endParaRPr lang="de-DE"/>
           </a:p>
@@ -776,7 +776,7 @@
           <a:p>
             <a:fld id="{F39F49B5-785A-44C4-99F0-898FF83CD003}" type="datetimeFigureOut">
               <a:rPr lang="de-DE" smtClean="0"/>
-              <a:t>04.07.2025</a:t>
+              <a:t>11.07.2025</a:t>
             </a:fld>
             <a:endParaRPr lang="de-DE"/>
           </a:p>
@@ -1020,7 +1020,7 @@
           <a:p>
             <a:fld id="{F39F49B5-785A-44C4-99F0-898FF83CD003}" type="datetimeFigureOut">
               <a:rPr lang="de-DE" smtClean="0"/>
-              <a:t>04.07.2025</a:t>
+              <a:t>11.07.2025</a:t>
             </a:fld>
             <a:endParaRPr lang="de-DE"/>
           </a:p>
@@ -1252,7 +1252,7 @@
           <a:p>
             <a:fld id="{F39F49B5-785A-44C4-99F0-898FF83CD003}" type="datetimeFigureOut">
               <a:rPr lang="de-DE" smtClean="0"/>
-              <a:t>04.07.2025</a:t>
+              <a:t>11.07.2025</a:t>
             </a:fld>
             <a:endParaRPr lang="de-DE"/>
           </a:p>
@@ -1619,7 +1619,7 @@
           <a:p>
             <a:fld id="{F39F49B5-785A-44C4-99F0-898FF83CD003}" type="datetimeFigureOut">
               <a:rPr lang="de-DE" smtClean="0"/>
-              <a:t>04.07.2025</a:t>
+              <a:t>11.07.2025</a:t>
             </a:fld>
             <a:endParaRPr lang="de-DE"/>
           </a:p>
@@ -1737,7 +1737,7 @@
           <a:p>
             <a:fld id="{F39F49B5-785A-44C4-99F0-898FF83CD003}" type="datetimeFigureOut">
               <a:rPr lang="de-DE" smtClean="0"/>
-              <a:t>04.07.2025</a:t>
+              <a:t>11.07.2025</a:t>
             </a:fld>
             <a:endParaRPr lang="de-DE"/>
           </a:p>
@@ -1832,7 +1832,7 @@
           <a:p>
             <a:fld id="{F39F49B5-785A-44C4-99F0-898FF83CD003}" type="datetimeFigureOut">
               <a:rPr lang="de-DE" smtClean="0"/>
-              <a:t>04.07.2025</a:t>
+              <a:t>11.07.2025</a:t>
             </a:fld>
             <a:endParaRPr lang="de-DE"/>
           </a:p>
@@ -2109,7 +2109,7 @@
           <a:p>
             <a:fld id="{F39F49B5-785A-44C4-99F0-898FF83CD003}" type="datetimeFigureOut">
               <a:rPr lang="de-DE" smtClean="0"/>
-              <a:t>04.07.2025</a:t>
+              <a:t>11.07.2025</a:t>
             </a:fld>
             <a:endParaRPr lang="de-DE"/>
           </a:p>
@@ -2366,7 +2366,7 @@
           <a:p>
             <a:fld id="{F39F49B5-785A-44C4-99F0-898FF83CD003}" type="datetimeFigureOut">
               <a:rPr lang="de-DE" smtClean="0"/>
-              <a:t>04.07.2025</a:t>
+              <a:t>11.07.2025</a:t>
             </a:fld>
             <a:endParaRPr lang="de-DE"/>
           </a:p>
@@ -2579,7 +2579,7 @@
           <a:p>
             <a:fld id="{F39F49B5-785A-44C4-99F0-898FF83CD003}" type="datetimeFigureOut">
               <a:rPr lang="de-DE" smtClean="0"/>
-              <a:t>04.07.2025</a:t>
+              <a:t>11.07.2025</a:t>
             </a:fld>
             <a:endParaRPr lang="de-DE"/>
           </a:p>
@@ -32230,8 +32230,8 @@
         </p:nvSpPr>
         <p:spPr>
           <a:xfrm>
-            <a:off x="9984014" y="4596240"/>
-            <a:ext cx="7032172" cy="2775864"/>
+            <a:off x="19887768" y="6789880"/>
+            <a:ext cx="5031397" cy="2775864"/>
           </a:xfrm>
           <a:prstGeom prst="rect">
             <a:avLst/>
@@ -32555,65 +32555,6 @@
           </a:p>
         </p:txBody>
       </p:sp>
-      <p:sp>
-        <p:nvSpPr>
-          <p:cNvPr id="9" name="Rechteck 8">
-            <a:extLst>
-              <a:ext uri="{FF2B5EF4-FFF2-40B4-BE49-F238E27FC236}">
-                <a16:creationId xmlns:a16="http://schemas.microsoft.com/office/drawing/2014/main" id="{4A7F91A8-6F48-CAD2-44D3-001531BDDBE3}"/>
-              </a:ext>
-            </a:extLst>
-          </p:cNvPr>
-          <p:cNvSpPr/>
-          <p:nvPr/>
-        </p:nvSpPr>
-        <p:spPr>
-          <a:xfrm>
-            <a:off x="9984014" y="22581643"/>
-            <a:ext cx="7032172" cy="2775864"/>
-          </a:xfrm>
-          <a:prstGeom prst="rect">
-            <a:avLst/>
-          </a:prstGeom>
-          <a:noFill/>
-          <a:ln>
-            <a:solidFill>
-              <a:schemeClr val="tx1"/>
-            </a:solidFill>
-          </a:ln>
-        </p:spPr>
-        <p:style>
-          <a:lnRef idx="2">
-            <a:schemeClr val="accent1">
-              <a:shade val="50000"/>
-            </a:schemeClr>
-          </a:lnRef>
-          <a:fillRef idx="1">
-            <a:schemeClr val="accent1"/>
-          </a:fillRef>
-          <a:effectRef idx="0">
-            <a:schemeClr val="accent1"/>
-          </a:effectRef>
-          <a:fontRef idx="minor">
-            <a:schemeClr val="lt1"/>
-          </a:fontRef>
-        </p:style>
-        <p:txBody>
-          <a:bodyPr rtlCol="0" anchor="ctr"/>
-          <a:lstStyle/>
-          <a:p>
-            <a:pPr algn="ctr"/>
-            <a:r>
-              <a:rPr lang="en-US" sz="5400" b="1" dirty="0">
-                <a:solidFill>
-                  <a:schemeClr val="tx1"/>
-                </a:solidFill>
-              </a:rPr>
-              <a:t>Pooling Layer</a:t>
-            </a:r>
-          </a:p>
-        </p:txBody>
-      </p:sp>
       <p:cxnSp>
         <p:nvCxnSpPr>
           <p:cNvPr id="11" name="Gerade Verbindung mit Pfeil 10">
@@ -32633,7 +32574,7 @@
         <p:spPr>
           <a:xfrm>
             <a:off x="13500100" y="3404778"/>
-            <a:ext cx="0" cy="1191462"/>
+            <a:ext cx="8903367" cy="3385102"/>
           </a:xfrm>
           <a:prstGeom prst="straightConnector1">
             <a:avLst/>
@@ -32672,152 +32613,14 @@
           <p:cNvCxnSpPr>
             <a:cxnSpLocks/>
             <a:stCxn id="38" idx="2"/>
-            <a:endCxn id="9" idx="0"/>
+            <a:endCxn id="120" idx="0"/>
           </p:cNvCxnSpPr>
           <p:nvPr/>
         </p:nvCxnSpPr>
         <p:spPr>
           <a:xfrm>
             <a:off x="13500100" y="21597981"/>
-            <a:ext cx="0" cy="983662"/>
-          </a:xfrm>
-          <a:prstGeom prst="straightConnector1">
-            <a:avLst/>
-          </a:prstGeom>
-          <a:ln w="152400">
-            <a:solidFill>
-              <a:schemeClr val="tx1"/>
-            </a:solidFill>
-            <a:tailEnd type="triangle"/>
-          </a:ln>
-        </p:spPr>
-        <p:style>
-          <a:lnRef idx="1">
-            <a:schemeClr val="accent1"/>
-          </a:lnRef>
-          <a:fillRef idx="0">
-            <a:schemeClr val="accent1"/>
-          </a:fillRef>
-          <a:effectRef idx="0">
-            <a:schemeClr val="accent1"/>
-          </a:effectRef>
-          <a:fontRef idx="minor">
-            <a:schemeClr val="tx1"/>
-          </a:fontRef>
-        </p:style>
-      </p:cxnSp>
-      <p:cxnSp>
-        <p:nvCxnSpPr>
-          <p:cNvPr id="21" name="Gerade Verbindung mit Pfeil 20">
-            <a:extLst>
-              <a:ext uri="{FF2B5EF4-FFF2-40B4-BE49-F238E27FC236}">
-                <a16:creationId xmlns:a16="http://schemas.microsoft.com/office/drawing/2014/main" id="{DEB94B7C-340F-84C0-7361-F688EF475C6E}"/>
-              </a:ext>
-            </a:extLst>
-          </p:cNvPr>
-          <p:cNvCxnSpPr>
-            <a:cxnSpLocks/>
-            <a:stCxn id="3" idx="2"/>
-            <a:endCxn id="4" idx="0"/>
-          </p:cNvCxnSpPr>
-          <p:nvPr/>
-        </p:nvCxnSpPr>
-        <p:spPr>
-          <a:xfrm flipH="1">
-            <a:off x="4828628" y="7372104"/>
-            <a:ext cx="8671472" cy="4167894"/>
-          </a:xfrm>
-          <a:prstGeom prst="straightConnector1">
-            <a:avLst/>
-          </a:prstGeom>
-          <a:ln w="152400">
-            <a:solidFill>
-              <a:schemeClr val="tx1"/>
-            </a:solidFill>
-            <a:tailEnd type="triangle"/>
-          </a:ln>
-        </p:spPr>
-        <p:style>
-          <a:lnRef idx="1">
-            <a:schemeClr val="accent1"/>
-          </a:lnRef>
-          <a:fillRef idx="0">
-            <a:schemeClr val="accent1"/>
-          </a:fillRef>
-          <a:effectRef idx="0">
-            <a:schemeClr val="accent1"/>
-          </a:effectRef>
-          <a:fontRef idx="minor">
-            <a:schemeClr val="tx1"/>
-          </a:fontRef>
-        </p:style>
-      </p:cxnSp>
-      <p:cxnSp>
-        <p:nvCxnSpPr>
-          <p:cNvPr id="25" name="Gerade Verbindung mit Pfeil 24">
-            <a:extLst>
-              <a:ext uri="{FF2B5EF4-FFF2-40B4-BE49-F238E27FC236}">
-                <a16:creationId xmlns:a16="http://schemas.microsoft.com/office/drawing/2014/main" id="{741E33DF-092E-24AC-7BEB-C4A0C2D11312}"/>
-              </a:ext>
-            </a:extLst>
-          </p:cNvPr>
-          <p:cNvCxnSpPr>
-            <a:cxnSpLocks/>
-            <a:stCxn id="3" idx="2"/>
-            <a:endCxn id="5" idx="0"/>
-          </p:cNvCxnSpPr>
-          <p:nvPr/>
-        </p:nvCxnSpPr>
-        <p:spPr>
-          <a:xfrm flipH="1">
-            <a:off x="10686908" y="7372104"/>
-            <a:ext cx="2813192" cy="4245766"/>
-          </a:xfrm>
-          <a:prstGeom prst="straightConnector1">
-            <a:avLst/>
-          </a:prstGeom>
-          <a:ln w="152400">
-            <a:solidFill>
-              <a:schemeClr val="tx1"/>
-            </a:solidFill>
-            <a:tailEnd type="triangle"/>
-          </a:ln>
-        </p:spPr>
-        <p:style>
-          <a:lnRef idx="1">
-            <a:schemeClr val="accent1"/>
-          </a:lnRef>
-          <a:fillRef idx="0">
-            <a:schemeClr val="accent1"/>
-          </a:fillRef>
-          <a:effectRef idx="0">
-            <a:schemeClr val="accent1"/>
-          </a:effectRef>
-          <a:fontRef idx="minor">
-            <a:schemeClr val="tx1"/>
-          </a:fontRef>
-        </p:style>
-      </p:cxnSp>
-      <p:cxnSp>
-        <p:nvCxnSpPr>
-          <p:cNvPr id="29" name="Gerade Verbindung mit Pfeil 28">
-            <a:extLst>
-              <a:ext uri="{FF2B5EF4-FFF2-40B4-BE49-F238E27FC236}">
-                <a16:creationId xmlns:a16="http://schemas.microsoft.com/office/drawing/2014/main" id="{ECC8CEFC-B659-C3F8-3D2D-964407F3A764}"/>
-              </a:ext>
-            </a:extLst>
-          </p:cNvPr>
-          <p:cNvCxnSpPr>
-            <a:cxnSpLocks/>
-            <a:stCxn id="3" idx="2"/>
-            <a:endCxn id="7" idx="0"/>
-          </p:cNvCxnSpPr>
-          <p:nvPr/>
-        </p:nvCxnSpPr>
-        <p:spPr>
-          <a:xfrm>
-            <a:off x="13500100" y="7372104"/>
-            <a:ext cx="3045088" cy="4245766"/>
+            <a:ext cx="0" cy="1682565"/>
           </a:xfrm>
           <a:prstGeom prst="straightConnector1">
             <a:avLst/>
@@ -32862,8 +32665,8 @@
         </p:nvCxnSpPr>
         <p:spPr>
           <a:xfrm>
-            <a:off x="13500100" y="7372104"/>
-            <a:ext cx="8903368" cy="4227385"/>
+            <a:off x="22403467" y="9565744"/>
+            <a:ext cx="1" cy="2033745"/>
           </a:xfrm>
           <a:prstGeom prst="straightConnector1">
             <a:avLst/>
@@ -33133,53 +32936,6 @@
           </a:fontRef>
         </p:style>
       </p:cxnSp>
-      <p:cxnSp>
-        <p:nvCxnSpPr>
-          <p:cNvPr id="114" name="Verbinder: gewinkelt 113">
-            <a:extLst>
-              <a:ext uri="{FF2B5EF4-FFF2-40B4-BE49-F238E27FC236}">
-                <a16:creationId xmlns:a16="http://schemas.microsoft.com/office/drawing/2014/main" id="{48B73BCD-3119-D4CD-CB1F-FDD409775DBE}"/>
-              </a:ext>
-            </a:extLst>
-          </p:cNvPr>
-          <p:cNvCxnSpPr>
-            <a:stCxn id="3" idx="1"/>
-          </p:cNvCxnSpPr>
-          <p:nvPr/>
-        </p:nvCxnSpPr>
-        <p:spPr>
-          <a:xfrm rot="10800000" flipV="1">
-            <a:off x="9984014" y="5984172"/>
-            <a:ext cx="12700" cy="14373260"/>
-          </a:xfrm>
-          <a:prstGeom prst="bentConnector4">
-            <a:avLst>
-              <a:gd name="adj1" fmla="val 70957890"/>
-              <a:gd name="adj2" fmla="val 100031"/>
-            </a:avLst>
-          </a:prstGeom>
-          <a:ln w="152400">
-            <a:solidFill>
-              <a:schemeClr val="tx1"/>
-            </a:solidFill>
-            <a:tailEnd type="triangle"/>
-          </a:ln>
-        </p:spPr>
-        <p:style>
-          <a:lnRef idx="1">
-            <a:schemeClr val="accent1"/>
-          </a:lnRef>
-          <a:fillRef idx="0">
-            <a:schemeClr val="accent1"/>
-          </a:fillRef>
-          <a:effectRef idx="0">
-            <a:schemeClr val="accent1"/>
-          </a:effectRef>
-          <a:fontRef idx="minor">
-            <a:schemeClr val="tx1"/>
-          </a:fontRef>
-        </p:style>
-      </p:cxnSp>
       <p:sp>
         <p:nvSpPr>
           <p:cNvPr id="120" name="Rechteck 119">
@@ -33194,7 +32950,7 @@
         </p:nvSpPr>
         <p:spPr>
           <a:xfrm>
-            <a:off x="9996714" y="26341169"/>
+            <a:off x="9984014" y="23280546"/>
             <a:ext cx="7032172" cy="2775864"/>
           </a:xfrm>
           <a:prstGeom prst="rect">
@@ -33239,29 +32995,589 @@
           </a:p>
         </p:txBody>
       </p:sp>
+      <p:sp>
+        <p:nvSpPr>
+          <p:cNvPr id="24" name="Rechteck 23">
+            <a:extLst>
+              <a:ext uri="{FF2B5EF4-FFF2-40B4-BE49-F238E27FC236}">
+                <a16:creationId xmlns:a16="http://schemas.microsoft.com/office/drawing/2014/main" id="{A99620F9-32C6-CB7F-D167-8F35FDC578B5}"/>
+              </a:ext>
+            </a:extLst>
+          </p:cNvPr>
+          <p:cNvSpPr/>
+          <p:nvPr/>
+        </p:nvSpPr>
+        <p:spPr>
+          <a:xfrm>
+            <a:off x="14029488" y="6856301"/>
+            <a:ext cx="5031397" cy="2775864"/>
+          </a:xfrm>
+          <a:prstGeom prst="rect">
+            <a:avLst/>
+          </a:prstGeom>
+          <a:noFill/>
+          <a:ln>
+            <a:solidFill>
+              <a:schemeClr val="tx1"/>
+            </a:solidFill>
+          </a:ln>
+        </p:spPr>
+        <p:style>
+          <a:lnRef idx="2">
+            <a:schemeClr val="accent1">
+              <a:shade val="50000"/>
+            </a:schemeClr>
+          </a:lnRef>
+          <a:fillRef idx="1">
+            <a:schemeClr val="accent1"/>
+          </a:fillRef>
+          <a:effectRef idx="0">
+            <a:schemeClr val="accent1"/>
+          </a:effectRef>
+          <a:fontRef idx="minor">
+            <a:schemeClr val="lt1"/>
+          </a:fontRef>
+        </p:style>
+        <p:txBody>
+          <a:bodyPr rtlCol="0" anchor="ctr"/>
+          <a:lstStyle/>
+          <a:p>
+            <a:pPr algn="ctr"/>
+            <a:r>
+              <a:rPr lang="en-US" sz="5400" b="1" dirty="0">
+                <a:solidFill>
+                  <a:schemeClr val="tx1"/>
+                </a:solidFill>
+              </a:rPr>
+              <a:t>Feature Layer</a:t>
+            </a:r>
+          </a:p>
+        </p:txBody>
+      </p:sp>
+      <p:sp>
+        <p:nvSpPr>
+          <p:cNvPr id="26" name="Rechteck 25">
+            <a:extLst>
+              <a:ext uri="{FF2B5EF4-FFF2-40B4-BE49-F238E27FC236}">
+                <a16:creationId xmlns:a16="http://schemas.microsoft.com/office/drawing/2014/main" id="{A2EF1D31-AA34-07F7-DD24-CF2850BAA90B}"/>
+              </a:ext>
+            </a:extLst>
+          </p:cNvPr>
+          <p:cNvSpPr/>
+          <p:nvPr/>
+        </p:nvSpPr>
+        <p:spPr>
+          <a:xfrm>
+            <a:off x="8171207" y="6856301"/>
+            <a:ext cx="5031397" cy="2775864"/>
+          </a:xfrm>
+          <a:prstGeom prst="rect">
+            <a:avLst/>
+          </a:prstGeom>
+          <a:noFill/>
+          <a:ln>
+            <a:solidFill>
+              <a:schemeClr val="tx1"/>
+            </a:solidFill>
+          </a:ln>
+        </p:spPr>
+        <p:style>
+          <a:lnRef idx="2">
+            <a:schemeClr val="accent1">
+              <a:shade val="50000"/>
+            </a:schemeClr>
+          </a:lnRef>
+          <a:fillRef idx="1">
+            <a:schemeClr val="accent1"/>
+          </a:fillRef>
+          <a:effectRef idx="0">
+            <a:schemeClr val="accent1"/>
+          </a:effectRef>
+          <a:fontRef idx="minor">
+            <a:schemeClr val="lt1"/>
+          </a:fontRef>
+        </p:style>
+        <p:txBody>
+          <a:bodyPr rtlCol="0" anchor="ctr"/>
+          <a:lstStyle/>
+          <a:p>
+            <a:pPr algn="ctr"/>
+            <a:r>
+              <a:rPr lang="en-US" sz="5400" b="1" dirty="0">
+                <a:solidFill>
+                  <a:schemeClr val="tx1"/>
+                </a:solidFill>
+              </a:rPr>
+              <a:t>Feature Layer</a:t>
+            </a:r>
+          </a:p>
+        </p:txBody>
+      </p:sp>
+      <p:sp>
+        <p:nvSpPr>
+          <p:cNvPr id="27" name="Rechteck 26">
+            <a:extLst>
+              <a:ext uri="{FF2B5EF4-FFF2-40B4-BE49-F238E27FC236}">
+                <a16:creationId xmlns:a16="http://schemas.microsoft.com/office/drawing/2014/main" id="{09D2FAC6-C504-05A9-167F-C1C66CF129A8}"/>
+              </a:ext>
+            </a:extLst>
+          </p:cNvPr>
+          <p:cNvSpPr/>
+          <p:nvPr/>
+        </p:nvSpPr>
+        <p:spPr>
+          <a:xfrm>
+            <a:off x="2312927" y="6856301"/>
+            <a:ext cx="5031397" cy="2775864"/>
+          </a:xfrm>
+          <a:prstGeom prst="rect">
+            <a:avLst/>
+          </a:prstGeom>
+          <a:noFill/>
+          <a:ln>
+            <a:solidFill>
+              <a:schemeClr val="tx1"/>
+            </a:solidFill>
+          </a:ln>
+        </p:spPr>
+        <p:style>
+          <a:lnRef idx="2">
+            <a:schemeClr val="accent1">
+              <a:shade val="50000"/>
+            </a:schemeClr>
+          </a:lnRef>
+          <a:fillRef idx="1">
+            <a:schemeClr val="accent1"/>
+          </a:fillRef>
+          <a:effectRef idx="0">
+            <a:schemeClr val="accent1"/>
+          </a:effectRef>
+          <a:fontRef idx="minor">
+            <a:schemeClr val="lt1"/>
+          </a:fontRef>
+        </p:style>
+        <p:txBody>
+          <a:bodyPr rtlCol="0" anchor="ctr"/>
+          <a:lstStyle/>
+          <a:p>
+            <a:pPr algn="ctr"/>
+            <a:r>
+              <a:rPr lang="en-US" sz="5400" b="1" dirty="0">
+                <a:solidFill>
+                  <a:schemeClr val="tx1"/>
+                </a:solidFill>
+              </a:rPr>
+              <a:t>Feature Layer</a:t>
+            </a:r>
+          </a:p>
+        </p:txBody>
+      </p:sp>
       <p:cxnSp>
         <p:nvCxnSpPr>
-          <p:cNvPr id="121" name="Gerade Verbindung mit Pfeil 120">
-            <a:extLst>
-              <a:ext uri="{FF2B5EF4-FFF2-40B4-BE49-F238E27FC236}">
-                <a16:creationId xmlns:a16="http://schemas.microsoft.com/office/drawing/2014/main" id="{8F1B5F2D-5CE0-505E-7F1E-304949C7927F}"/>
+          <p:cNvPr id="30" name="Gerade Verbindung mit Pfeil 29">
+            <a:extLst>
+              <a:ext uri="{FF2B5EF4-FFF2-40B4-BE49-F238E27FC236}">
+                <a16:creationId xmlns:a16="http://schemas.microsoft.com/office/drawing/2014/main" id="{7B74CB4B-408B-24D4-F721-C537FCBD4F1D}"/>
               </a:ext>
             </a:extLst>
           </p:cNvPr>
           <p:cNvCxnSpPr>
             <a:cxnSpLocks/>
-            <a:stCxn id="9" idx="2"/>
-            <a:endCxn id="120" idx="0"/>
+            <a:stCxn id="24" idx="2"/>
+            <a:endCxn id="7" idx="0"/>
           </p:cNvCxnSpPr>
           <p:nvPr/>
         </p:nvCxnSpPr>
         <p:spPr>
           <a:xfrm>
-            <a:off x="13500100" y="25357507"/>
-            <a:ext cx="12700" cy="983662"/>
+            <a:off x="16545187" y="9632165"/>
+            <a:ext cx="1" cy="1985705"/>
           </a:xfrm>
           <a:prstGeom prst="straightConnector1">
             <a:avLst/>
+          </a:prstGeom>
+          <a:ln w="152400">
+            <a:solidFill>
+              <a:schemeClr val="tx1"/>
+            </a:solidFill>
+            <a:tailEnd type="triangle"/>
+          </a:ln>
+        </p:spPr>
+        <p:style>
+          <a:lnRef idx="1">
+            <a:schemeClr val="accent1"/>
+          </a:lnRef>
+          <a:fillRef idx="0">
+            <a:schemeClr val="accent1"/>
+          </a:fillRef>
+          <a:effectRef idx="0">
+            <a:schemeClr val="accent1"/>
+          </a:effectRef>
+          <a:fontRef idx="minor">
+            <a:schemeClr val="tx1"/>
+          </a:fontRef>
+        </p:style>
+      </p:cxnSp>
+      <p:cxnSp>
+        <p:nvCxnSpPr>
+          <p:cNvPr id="37" name="Gerade Verbindung mit Pfeil 36">
+            <a:extLst>
+              <a:ext uri="{FF2B5EF4-FFF2-40B4-BE49-F238E27FC236}">
+                <a16:creationId xmlns:a16="http://schemas.microsoft.com/office/drawing/2014/main" id="{FE504FCA-0EF0-EDC5-5919-D89840C89A4F}"/>
+              </a:ext>
+            </a:extLst>
+          </p:cNvPr>
+          <p:cNvCxnSpPr>
+            <a:cxnSpLocks/>
+            <a:stCxn id="26" idx="2"/>
+            <a:endCxn id="5" idx="0"/>
+          </p:cNvCxnSpPr>
+          <p:nvPr/>
+        </p:nvCxnSpPr>
+        <p:spPr>
+          <a:xfrm>
+            <a:off x="10686906" y="9632165"/>
+            <a:ext cx="2" cy="1985705"/>
+          </a:xfrm>
+          <a:prstGeom prst="straightConnector1">
+            <a:avLst/>
+          </a:prstGeom>
+          <a:ln w="152400">
+            <a:solidFill>
+              <a:schemeClr val="tx1"/>
+            </a:solidFill>
+            <a:tailEnd type="triangle"/>
+          </a:ln>
+        </p:spPr>
+        <p:style>
+          <a:lnRef idx="1">
+            <a:schemeClr val="accent1"/>
+          </a:lnRef>
+          <a:fillRef idx="0">
+            <a:schemeClr val="accent1"/>
+          </a:fillRef>
+          <a:effectRef idx="0">
+            <a:schemeClr val="accent1"/>
+          </a:effectRef>
+          <a:fontRef idx="minor">
+            <a:schemeClr val="tx1"/>
+          </a:fontRef>
+        </p:style>
+      </p:cxnSp>
+      <p:cxnSp>
+        <p:nvCxnSpPr>
+          <p:cNvPr id="43" name="Gerade Verbindung mit Pfeil 42">
+            <a:extLst>
+              <a:ext uri="{FF2B5EF4-FFF2-40B4-BE49-F238E27FC236}">
+                <a16:creationId xmlns:a16="http://schemas.microsoft.com/office/drawing/2014/main" id="{5EDD910B-FF13-9C03-216A-FD207DBE5DE4}"/>
+              </a:ext>
+            </a:extLst>
+          </p:cNvPr>
+          <p:cNvCxnSpPr>
+            <a:cxnSpLocks/>
+            <a:stCxn id="27" idx="2"/>
+            <a:endCxn id="4" idx="0"/>
+          </p:cNvCxnSpPr>
+          <p:nvPr/>
+        </p:nvCxnSpPr>
+        <p:spPr>
+          <a:xfrm>
+            <a:off x="4828626" y="9632165"/>
+            <a:ext cx="2" cy="1907833"/>
+          </a:xfrm>
+          <a:prstGeom prst="straightConnector1">
+            <a:avLst/>
+          </a:prstGeom>
+          <a:ln w="152400">
+            <a:solidFill>
+              <a:schemeClr val="tx1"/>
+            </a:solidFill>
+            <a:tailEnd type="triangle"/>
+          </a:ln>
+        </p:spPr>
+        <p:style>
+          <a:lnRef idx="1">
+            <a:schemeClr val="accent1"/>
+          </a:lnRef>
+          <a:fillRef idx="0">
+            <a:schemeClr val="accent1"/>
+          </a:fillRef>
+          <a:effectRef idx="0">
+            <a:schemeClr val="accent1"/>
+          </a:effectRef>
+          <a:fontRef idx="minor">
+            <a:schemeClr val="tx1"/>
+          </a:fontRef>
+        </p:style>
+      </p:cxnSp>
+      <p:sp>
+        <p:nvSpPr>
+          <p:cNvPr id="50" name="Rechteck 49">
+            <a:extLst>
+              <a:ext uri="{FF2B5EF4-FFF2-40B4-BE49-F238E27FC236}">
+                <a16:creationId xmlns:a16="http://schemas.microsoft.com/office/drawing/2014/main" id="{A6EE5187-F816-B2B0-2F0E-6FE696D4F79E}"/>
+              </a:ext>
+            </a:extLst>
+          </p:cNvPr>
+          <p:cNvSpPr/>
+          <p:nvPr/>
+        </p:nvSpPr>
+        <p:spPr>
+          <a:xfrm>
+            <a:off x="2312927" y="628914"/>
+            <a:ext cx="5031397" cy="2775864"/>
+          </a:xfrm>
+          <a:prstGeom prst="rect">
+            <a:avLst/>
+          </a:prstGeom>
+          <a:noFill/>
+          <a:ln>
+            <a:solidFill>
+              <a:schemeClr val="tx1"/>
+            </a:solidFill>
+          </a:ln>
+        </p:spPr>
+        <p:style>
+          <a:lnRef idx="2">
+            <a:schemeClr val="accent1">
+              <a:shade val="50000"/>
+            </a:schemeClr>
+          </a:lnRef>
+          <a:fillRef idx="1">
+            <a:schemeClr val="accent1"/>
+          </a:fillRef>
+          <a:effectRef idx="0">
+            <a:schemeClr val="accent1"/>
+          </a:effectRef>
+          <a:fontRef idx="minor">
+            <a:schemeClr val="lt1"/>
+          </a:fontRef>
+        </p:style>
+        <p:txBody>
+          <a:bodyPr rtlCol="0" anchor="ctr"/>
+          <a:lstStyle/>
+          <a:p>
+            <a:pPr algn="ctr"/>
+            <a:r>
+              <a:rPr lang="en-US" sz="5400" b="1" dirty="0">
+                <a:solidFill>
+                  <a:schemeClr val="tx1"/>
+                </a:solidFill>
+              </a:rPr>
+              <a:t>Feature Layer</a:t>
+            </a:r>
+          </a:p>
+        </p:txBody>
+      </p:sp>
+      <p:cxnSp>
+        <p:nvCxnSpPr>
+          <p:cNvPr id="51" name="Gerade Verbindung mit Pfeil 50">
+            <a:extLst>
+              <a:ext uri="{FF2B5EF4-FFF2-40B4-BE49-F238E27FC236}">
+                <a16:creationId xmlns:a16="http://schemas.microsoft.com/office/drawing/2014/main" id="{B16C95DF-E129-12A6-D23D-C6A35FADB406}"/>
+              </a:ext>
+            </a:extLst>
+          </p:cNvPr>
+          <p:cNvCxnSpPr>
+            <a:cxnSpLocks/>
+            <a:stCxn id="2" idx="2"/>
+            <a:endCxn id="24" idx="0"/>
+          </p:cNvCxnSpPr>
+          <p:nvPr/>
+        </p:nvCxnSpPr>
+        <p:spPr>
+          <a:xfrm>
+            <a:off x="13500100" y="3404778"/>
+            <a:ext cx="3045087" cy="3451523"/>
+          </a:xfrm>
+          <a:prstGeom prst="straightConnector1">
+            <a:avLst/>
+          </a:prstGeom>
+          <a:ln w="152400">
+            <a:solidFill>
+              <a:schemeClr val="tx1"/>
+            </a:solidFill>
+            <a:tailEnd type="triangle"/>
+          </a:ln>
+        </p:spPr>
+        <p:style>
+          <a:lnRef idx="1">
+            <a:schemeClr val="accent1"/>
+          </a:lnRef>
+          <a:fillRef idx="0">
+            <a:schemeClr val="accent1"/>
+          </a:fillRef>
+          <a:effectRef idx="0">
+            <a:schemeClr val="accent1"/>
+          </a:effectRef>
+          <a:fontRef idx="minor">
+            <a:schemeClr val="tx1"/>
+          </a:fontRef>
+        </p:style>
+      </p:cxnSp>
+      <p:cxnSp>
+        <p:nvCxnSpPr>
+          <p:cNvPr id="53" name="Gerade Verbindung mit Pfeil 52">
+            <a:extLst>
+              <a:ext uri="{FF2B5EF4-FFF2-40B4-BE49-F238E27FC236}">
+                <a16:creationId xmlns:a16="http://schemas.microsoft.com/office/drawing/2014/main" id="{106AB19C-268D-48DB-C44B-EB645D5B2CA5}"/>
+              </a:ext>
+            </a:extLst>
+          </p:cNvPr>
+          <p:cNvCxnSpPr>
+            <a:cxnSpLocks/>
+            <a:stCxn id="2" idx="2"/>
+            <a:endCxn id="26" idx="0"/>
+          </p:cNvCxnSpPr>
+          <p:nvPr/>
+        </p:nvCxnSpPr>
+        <p:spPr>
+          <a:xfrm flipH="1">
+            <a:off x="10686906" y="3404778"/>
+            <a:ext cx="2813194" cy="3451523"/>
+          </a:xfrm>
+          <a:prstGeom prst="straightConnector1">
+            <a:avLst/>
+          </a:prstGeom>
+          <a:ln w="152400">
+            <a:solidFill>
+              <a:schemeClr val="tx1"/>
+            </a:solidFill>
+            <a:tailEnd type="triangle"/>
+          </a:ln>
+        </p:spPr>
+        <p:style>
+          <a:lnRef idx="1">
+            <a:schemeClr val="accent1"/>
+          </a:lnRef>
+          <a:fillRef idx="0">
+            <a:schemeClr val="accent1"/>
+          </a:fillRef>
+          <a:effectRef idx="0">
+            <a:schemeClr val="accent1"/>
+          </a:effectRef>
+          <a:fontRef idx="minor">
+            <a:schemeClr val="tx1"/>
+          </a:fontRef>
+        </p:style>
+      </p:cxnSp>
+      <p:cxnSp>
+        <p:nvCxnSpPr>
+          <p:cNvPr id="55" name="Gerade Verbindung mit Pfeil 54">
+            <a:extLst>
+              <a:ext uri="{FF2B5EF4-FFF2-40B4-BE49-F238E27FC236}">
+                <a16:creationId xmlns:a16="http://schemas.microsoft.com/office/drawing/2014/main" id="{8FE3697F-3D13-A71E-A8DF-21FA12617FCE}"/>
+              </a:ext>
+            </a:extLst>
+          </p:cNvPr>
+          <p:cNvCxnSpPr>
+            <a:cxnSpLocks/>
+            <a:stCxn id="2" idx="2"/>
+            <a:endCxn id="27" idx="0"/>
+          </p:cNvCxnSpPr>
+          <p:nvPr/>
+        </p:nvCxnSpPr>
+        <p:spPr>
+          <a:xfrm flipH="1">
+            <a:off x="4828626" y="3404778"/>
+            <a:ext cx="8671474" cy="3451523"/>
+          </a:xfrm>
+          <a:prstGeom prst="straightConnector1">
+            <a:avLst/>
+          </a:prstGeom>
+          <a:ln w="152400">
+            <a:solidFill>
+              <a:schemeClr val="tx1"/>
+            </a:solidFill>
+            <a:tailEnd type="triangle"/>
+          </a:ln>
+        </p:spPr>
+        <p:style>
+          <a:lnRef idx="1">
+            <a:schemeClr val="accent1"/>
+          </a:lnRef>
+          <a:fillRef idx="0">
+            <a:schemeClr val="accent1"/>
+          </a:fillRef>
+          <a:effectRef idx="0">
+            <a:schemeClr val="accent1"/>
+          </a:effectRef>
+          <a:fontRef idx="minor">
+            <a:schemeClr val="tx1"/>
+          </a:fontRef>
+        </p:style>
+      </p:cxnSp>
+      <p:cxnSp>
+        <p:nvCxnSpPr>
+          <p:cNvPr id="63" name="Gerade Verbindung mit Pfeil 62">
+            <a:extLst>
+              <a:ext uri="{FF2B5EF4-FFF2-40B4-BE49-F238E27FC236}">
+                <a16:creationId xmlns:a16="http://schemas.microsoft.com/office/drawing/2014/main" id="{CCE2EEBB-4881-4991-A188-3A5F35D70EBC}"/>
+              </a:ext>
+            </a:extLst>
+          </p:cNvPr>
+          <p:cNvCxnSpPr>
+            <a:cxnSpLocks/>
+            <a:stCxn id="2" idx="1"/>
+            <a:endCxn id="50" idx="3"/>
+          </p:cNvCxnSpPr>
+          <p:nvPr/>
+        </p:nvCxnSpPr>
+        <p:spPr>
+          <a:xfrm flipH="1">
+            <a:off x="7344324" y="2016846"/>
+            <a:ext cx="2639690" cy="0"/>
+          </a:xfrm>
+          <a:prstGeom prst="straightConnector1">
+            <a:avLst/>
+          </a:prstGeom>
+          <a:ln w="152400">
+            <a:solidFill>
+              <a:schemeClr val="tx1"/>
+            </a:solidFill>
+            <a:tailEnd type="triangle"/>
+          </a:ln>
+        </p:spPr>
+        <p:style>
+          <a:lnRef idx="1">
+            <a:schemeClr val="accent1"/>
+          </a:lnRef>
+          <a:fillRef idx="0">
+            <a:schemeClr val="accent1"/>
+          </a:fillRef>
+          <a:effectRef idx="0">
+            <a:schemeClr val="accent1"/>
+          </a:effectRef>
+          <a:fontRef idx="minor">
+            <a:schemeClr val="tx1"/>
+          </a:fontRef>
+        </p:style>
+      </p:cxnSp>
+      <p:cxnSp>
+        <p:nvCxnSpPr>
+          <p:cNvPr id="67" name="Verbinder: gewinkelt 66">
+            <a:extLst>
+              <a:ext uri="{FF2B5EF4-FFF2-40B4-BE49-F238E27FC236}">
+                <a16:creationId xmlns:a16="http://schemas.microsoft.com/office/drawing/2014/main" id="{460E2CC5-F2F8-61A0-1159-F9AED412D1B1}"/>
+              </a:ext>
+            </a:extLst>
+          </p:cNvPr>
+          <p:cNvCxnSpPr>
+            <a:cxnSpLocks/>
+            <a:stCxn id="50" idx="1"/>
+            <a:endCxn id="38" idx="1"/>
+          </p:cNvCxnSpPr>
+          <p:nvPr/>
+        </p:nvCxnSpPr>
+        <p:spPr>
+          <a:xfrm rot="10800000" flipH="1" flipV="1">
+            <a:off x="2312926" y="2016845"/>
+            <a:ext cx="7671087" cy="18193203"/>
+          </a:xfrm>
+          <a:prstGeom prst="bentConnector3">
+            <a:avLst>
+              <a:gd name="adj1" fmla="val -7594"/>
+            </a:avLst>
           </a:prstGeom>
           <a:ln w="152400">
             <a:solidFill>

</xml_diff>

<commit_message>
[Fix] Synthetic creation of cases
</commit_message>
<xml_diff>
--- a/materials/images_hochformat.pptx
+++ b/materials/images_hochformat.pptx
@@ -256,7 +256,7 @@
           <a:p>
             <a:fld id="{F39F49B5-785A-44C4-99F0-898FF83CD003}" type="datetimeFigureOut">
               <a:rPr lang="de-DE" smtClean="0"/>
-              <a:t>11.07.2025</a:t>
+              <a:t>14.07.2025</a:t>
             </a:fld>
             <a:endParaRPr lang="de-DE"/>
           </a:p>
@@ -426,7 +426,7 @@
           <a:p>
             <a:fld id="{F39F49B5-785A-44C4-99F0-898FF83CD003}" type="datetimeFigureOut">
               <a:rPr lang="de-DE" smtClean="0"/>
-              <a:t>11.07.2025</a:t>
+              <a:t>14.07.2025</a:t>
             </a:fld>
             <a:endParaRPr lang="de-DE"/>
           </a:p>
@@ -606,7 +606,7 @@
           <a:p>
             <a:fld id="{F39F49B5-785A-44C4-99F0-898FF83CD003}" type="datetimeFigureOut">
               <a:rPr lang="de-DE" smtClean="0"/>
-              <a:t>11.07.2025</a:t>
+              <a:t>14.07.2025</a:t>
             </a:fld>
             <a:endParaRPr lang="de-DE"/>
           </a:p>
@@ -776,7 +776,7 @@
           <a:p>
             <a:fld id="{F39F49B5-785A-44C4-99F0-898FF83CD003}" type="datetimeFigureOut">
               <a:rPr lang="de-DE" smtClean="0"/>
-              <a:t>11.07.2025</a:t>
+              <a:t>14.07.2025</a:t>
             </a:fld>
             <a:endParaRPr lang="de-DE"/>
           </a:p>
@@ -1020,7 +1020,7 @@
           <a:p>
             <a:fld id="{F39F49B5-785A-44C4-99F0-898FF83CD003}" type="datetimeFigureOut">
               <a:rPr lang="de-DE" smtClean="0"/>
-              <a:t>11.07.2025</a:t>
+              <a:t>14.07.2025</a:t>
             </a:fld>
             <a:endParaRPr lang="de-DE"/>
           </a:p>
@@ -1252,7 +1252,7 @@
           <a:p>
             <a:fld id="{F39F49B5-785A-44C4-99F0-898FF83CD003}" type="datetimeFigureOut">
               <a:rPr lang="de-DE" smtClean="0"/>
-              <a:t>11.07.2025</a:t>
+              <a:t>14.07.2025</a:t>
             </a:fld>
             <a:endParaRPr lang="de-DE"/>
           </a:p>
@@ -1619,7 +1619,7 @@
           <a:p>
             <a:fld id="{F39F49B5-785A-44C4-99F0-898FF83CD003}" type="datetimeFigureOut">
               <a:rPr lang="de-DE" smtClean="0"/>
-              <a:t>11.07.2025</a:t>
+              <a:t>14.07.2025</a:t>
             </a:fld>
             <a:endParaRPr lang="de-DE"/>
           </a:p>
@@ -1737,7 +1737,7 @@
           <a:p>
             <a:fld id="{F39F49B5-785A-44C4-99F0-898FF83CD003}" type="datetimeFigureOut">
               <a:rPr lang="de-DE" smtClean="0"/>
-              <a:t>11.07.2025</a:t>
+              <a:t>14.07.2025</a:t>
             </a:fld>
             <a:endParaRPr lang="de-DE"/>
           </a:p>
@@ -1832,7 +1832,7 @@
           <a:p>
             <a:fld id="{F39F49B5-785A-44C4-99F0-898FF83CD003}" type="datetimeFigureOut">
               <a:rPr lang="de-DE" smtClean="0"/>
-              <a:t>11.07.2025</a:t>
+              <a:t>14.07.2025</a:t>
             </a:fld>
             <a:endParaRPr lang="de-DE"/>
           </a:p>
@@ -2109,7 +2109,7 @@
           <a:p>
             <a:fld id="{F39F49B5-785A-44C4-99F0-898FF83CD003}" type="datetimeFigureOut">
               <a:rPr lang="de-DE" smtClean="0"/>
-              <a:t>11.07.2025</a:t>
+              <a:t>14.07.2025</a:t>
             </a:fld>
             <a:endParaRPr lang="de-DE"/>
           </a:p>
@@ -2366,7 +2366,7 @@
           <a:p>
             <a:fld id="{F39F49B5-785A-44C4-99F0-898FF83CD003}" type="datetimeFigureOut">
               <a:rPr lang="de-DE" smtClean="0"/>
-              <a:t>11.07.2025</a:t>
+              <a:t>14.07.2025</a:t>
             </a:fld>
             <a:endParaRPr lang="de-DE"/>
           </a:p>
@@ -2579,7 +2579,7 @@
           <a:p>
             <a:fld id="{F39F49B5-785A-44C4-99F0-898FF83CD003}" type="datetimeFigureOut">
               <a:rPr lang="de-DE" smtClean="0"/>
-              <a:t>11.07.2025</a:t>
+              <a:t>14.07.2025</a:t>
             </a:fld>
             <a:endParaRPr lang="de-DE"/>
           </a:p>
@@ -22302,7 +22302,7 @@
                   <a:schemeClr val="tx1"/>
                 </a:solidFill>
               </a:rPr>
-              <a:t>Activation</a:t>
+              <a:t>Attention</a:t>
             </a:r>
           </a:p>
         </p:txBody>

</xml_diff>

<commit_message>
[Update] Tests [Update] Reorganised merge layer [Update] Documentation
</commit_message>
<xml_diff>
--- a/materials/images_hochformat.pptx
+++ b/materials/images_hochformat.pptx
@@ -256,7 +256,7 @@
           <a:p>
             <a:fld id="{F39F49B5-785A-44C4-99F0-898FF83CD003}" type="datetimeFigureOut">
               <a:rPr lang="de-DE" smtClean="0"/>
-              <a:t>14.07.2025</a:t>
+              <a:t>17.07.2025</a:t>
             </a:fld>
             <a:endParaRPr lang="de-DE"/>
           </a:p>
@@ -426,7 +426,7 @@
           <a:p>
             <a:fld id="{F39F49B5-785A-44C4-99F0-898FF83CD003}" type="datetimeFigureOut">
               <a:rPr lang="de-DE" smtClean="0"/>
-              <a:t>14.07.2025</a:t>
+              <a:t>17.07.2025</a:t>
             </a:fld>
             <a:endParaRPr lang="de-DE"/>
           </a:p>
@@ -606,7 +606,7 @@
           <a:p>
             <a:fld id="{F39F49B5-785A-44C4-99F0-898FF83CD003}" type="datetimeFigureOut">
               <a:rPr lang="de-DE" smtClean="0"/>
-              <a:t>14.07.2025</a:t>
+              <a:t>17.07.2025</a:t>
             </a:fld>
             <a:endParaRPr lang="de-DE"/>
           </a:p>
@@ -776,7 +776,7 @@
           <a:p>
             <a:fld id="{F39F49B5-785A-44C4-99F0-898FF83CD003}" type="datetimeFigureOut">
               <a:rPr lang="de-DE" smtClean="0"/>
-              <a:t>14.07.2025</a:t>
+              <a:t>17.07.2025</a:t>
             </a:fld>
             <a:endParaRPr lang="de-DE"/>
           </a:p>
@@ -1020,7 +1020,7 @@
           <a:p>
             <a:fld id="{F39F49B5-785A-44C4-99F0-898FF83CD003}" type="datetimeFigureOut">
               <a:rPr lang="de-DE" smtClean="0"/>
-              <a:t>14.07.2025</a:t>
+              <a:t>17.07.2025</a:t>
             </a:fld>
             <a:endParaRPr lang="de-DE"/>
           </a:p>
@@ -1252,7 +1252,7 @@
           <a:p>
             <a:fld id="{F39F49B5-785A-44C4-99F0-898FF83CD003}" type="datetimeFigureOut">
               <a:rPr lang="de-DE" smtClean="0"/>
-              <a:t>14.07.2025</a:t>
+              <a:t>17.07.2025</a:t>
             </a:fld>
             <a:endParaRPr lang="de-DE"/>
           </a:p>
@@ -1619,7 +1619,7 @@
           <a:p>
             <a:fld id="{F39F49B5-785A-44C4-99F0-898FF83CD003}" type="datetimeFigureOut">
               <a:rPr lang="de-DE" smtClean="0"/>
-              <a:t>14.07.2025</a:t>
+              <a:t>17.07.2025</a:t>
             </a:fld>
             <a:endParaRPr lang="de-DE"/>
           </a:p>
@@ -1737,7 +1737,7 @@
           <a:p>
             <a:fld id="{F39F49B5-785A-44C4-99F0-898FF83CD003}" type="datetimeFigureOut">
               <a:rPr lang="de-DE" smtClean="0"/>
-              <a:t>14.07.2025</a:t>
+              <a:t>17.07.2025</a:t>
             </a:fld>
             <a:endParaRPr lang="de-DE"/>
           </a:p>
@@ -1832,7 +1832,7 @@
           <a:p>
             <a:fld id="{F39F49B5-785A-44C4-99F0-898FF83CD003}" type="datetimeFigureOut">
               <a:rPr lang="de-DE" smtClean="0"/>
-              <a:t>14.07.2025</a:t>
+              <a:t>17.07.2025</a:t>
             </a:fld>
             <a:endParaRPr lang="de-DE"/>
           </a:p>
@@ -2109,7 +2109,7 @@
           <a:p>
             <a:fld id="{F39F49B5-785A-44C4-99F0-898FF83CD003}" type="datetimeFigureOut">
               <a:rPr lang="de-DE" smtClean="0"/>
-              <a:t>14.07.2025</a:t>
+              <a:t>17.07.2025</a:t>
             </a:fld>
             <a:endParaRPr lang="de-DE"/>
           </a:p>
@@ -2366,7 +2366,7 @@
           <a:p>
             <a:fld id="{F39F49B5-785A-44C4-99F0-898FF83CD003}" type="datetimeFigureOut">
               <a:rPr lang="de-DE" smtClean="0"/>
-              <a:t>14.07.2025</a:t>
+              <a:t>17.07.2025</a:t>
             </a:fld>
             <a:endParaRPr lang="de-DE"/>
           </a:p>
@@ -2579,7 +2579,7 @@
           <a:p>
             <a:fld id="{F39F49B5-785A-44C4-99F0-898FF83CD003}" type="datetimeFigureOut">
               <a:rPr lang="de-DE" smtClean="0"/>
-              <a:t>14.07.2025</a:t>
+              <a:t>17.07.2025</a:t>
             </a:fld>
             <a:endParaRPr lang="de-DE"/>
           </a:p>
@@ -22033,8 +22033,8 @@
         </p:nvSpPr>
         <p:spPr>
           <a:xfrm>
-            <a:off x="9027241" y="6430562"/>
-            <a:ext cx="11598442" cy="11975425"/>
+            <a:off x="9027241" y="4377713"/>
+            <a:ext cx="11598442" cy="14028275"/>
           </a:xfrm>
           <a:prstGeom prst="roundRect">
             <a:avLst/>
@@ -22073,6 +22073,1124 @@
       </p:sp>
       <p:sp>
         <p:nvSpPr>
+          <p:cNvPr id="12" name="Rechteck 11">
+            <a:extLst>
+              <a:ext uri="{FF2B5EF4-FFF2-40B4-BE49-F238E27FC236}">
+                <a16:creationId xmlns:a16="http://schemas.microsoft.com/office/drawing/2014/main" id="{F47730CF-82A1-3D97-9B33-B9659A484F6A}"/>
+              </a:ext>
+            </a:extLst>
+          </p:cNvPr>
+          <p:cNvSpPr/>
+          <p:nvPr/>
+        </p:nvSpPr>
+        <p:spPr>
+          <a:xfrm>
+            <a:off x="11310376" y="9502998"/>
+            <a:ext cx="7032172" cy="1336244"/>
+          </a:xfrm>
+          <a:prstGeom prst="rect">
+            <a:avLst/>
+          </a:prstGeom>
+          <a:noFill/>
+          <a:ln>
+            <a:solidFill>
+              <a:schemeClr val="tx1"/>
+            </a:solidFill>
+          </a:ln>
+        </p:spPr>
+        <p:style>
+          <a:lnRef idx="2">
+            <a:schemeClr val="accent1">
+              <a:shade val="50000"/>
+            </a:schemeClr>
+          </a:lnRef>
+          <a:fillRef idx="1">
+            <a:schemeClr val="accent1"/>
+          </a:fillRef>
+          <a:effectRef idx="0">
+            <a:schemeClr val="accent1"/>
+          </a:effectRef>
+          <a:fontRef idx="minor">
+            <a:schemeClr val="lt1"/>
+          </a:fontRef>
+        </p:style>
+        <p:txBody>
+          <a:bodyPr rtlCol="0" anchor="ctr"/>
+          <a:lstStyle/>
+          <a:p>
+            <a:pPr algn="ctr"/>
+            <a:r>
+              <a:rPr lang="en-US" sz="5400" b="1" dirty="0">
+                <a:solidFill>
+                  <a:schemeClr val="tx1"/>
+                </a:solidFill>
+              </a:rPr>
+              <a:t>Concatenate</a:t>
+            </a:r>
+          </a:p>
+        </p:txBody>
+      </p:sp>
+      <p:sp>
+        <p:nvSpPr>
+          <p:cNvPr id="13" name="Rechteck 12">
+            <a:extLst>
+              <a:ext uri="{FF2B5EF4-FFF2-40B4-BE49-F238E27FC236}">
+                <a16:creationId xmlns:a16="http://schemas.microsoft.com/office/drawing/2014/main" id="{D4C75B1B-1F8B-B9E0-F491-2B722CA074B3}"/>
+              </a:ext>
+            </a:extLst>
+          </p:cNvPr>
+          <p:cNvSpPr/>
+          <p:nvPr/>
+        </p:nvSpPr>
+        <p:spPr>
+          <a:xfrm>
+            <a:off x="11310376" y="11874855"/>
+            <a:ext cx="7032172" cy="1336244"/>
+          </a:xfrm>
+          <a:prstGeom prst="rect">
+            <a:avLst/>
+          </a:prstGeom>
+          <a:noFill/>
+          <a:ln>
+            <a:solidFill>
+              <a:schemeClr val="tx1"/>
+            </a:solidFill>
+          </a:ln>
+        </p:spPr>
+        <p:style>
+          <a:lnRef idx="2">
+            <a:schemeClr val="accent1">
+              <a:shade val="50000"/>
+            </a:schemeClr>
+          </a:lnRef>
+          <a:fillRef idx="1">
+            <a:schemeClr val="accent1"/>
+          </a:fillRef>
+          <a:effectRef idx="0">
+            <a:schemeClr val="accent1"/>
+          </a:effectRef>
+          <a:fontRef idx="minor">
+            <a:schemeClr val="lt1"/>
+          </a:fontRef>
+        </p:style>
+        <p:txBody>
+          <a:bodyPr rtlCol="0" anchor="ctr"/>
+          <a:lstStyle/>
+          <a:p>
+            <a:pPr algn="ctr"/>
+            <a:r>
+              <a:rPr lang="en-US" sz="5400" b="1" dirty="0">
+                <a:solidFill>
+                  <a:schemeClr val="tx1"/>
+                </a:solidFill>
+              </a:rPr>
+              <a:t>Attention</a:t>
+            </a:r>
+          </a:p>
+        </p:txBody>
+      </p:sp>
+      <p:cxnSp>
+        <p:nvCxnSpPr>
+          <p:cNvPr id="15" name="Gerade Verbindung mit Pfeil 14">
+            <a:extLst>
+              <a:ext uri="{FF2B5EF4-FFF2-40B4-BE49-F238E27FC236}">
+                <a16:creationId xmlns:a16="http://schemas.microsoft.com/office/drawing/2014/main" id="{50107676-436C-4215-F408-F6C3368E5710}"/>
+              </a:ext>
+            </a:extLst>
+          </p:cNvPr>
+          <p:cNvCxnSpPr>
+            <a:cxnSpLocks/>
+            <a:stCxn id="10" idx="2"/>
+            <a:endCxn id="12" idx="0"/>
+          </p:cNvCxnSpPr>
+          <p:nvPr/>
+        </p:nvCxnSpPr>
+        <p:spPr>
+          <a:xfrm>
+            <a:off x="14826461" y="8691697"/>
+            <a:ext cx="1" cy="811301"/>
+          </a:xfrm>
+          <a:prstGeom prst="straightConnector1">
+            <a:avLst/>
+          </a:prstGeom>
+          <a:ln w="152400">
+            <a:solidFill>
+              <a:schemeClr val="tx1"/>
+            </a:solidFill>
+            <a:tailEnd type="triangle"/>
+          </a:ln>
+        </p:spPr>
+        <p:style>
+          <a:lnRef idx="1">
+            <a:schemeClr val="accent1"/>
+          </a:lnRef>
+          <a:fillRef idx="0">
+            <a:schemeClr val="accent1"/>
+          </a:fillRef>
+          <a:effectRef idx="0">
+            <a:schemeClr val="accent1"/>
+          </a:effectRef>
+          <a:fontRef idx="minor">
+            <a:schemeClr val="tx1"/>
+          </a:fontRef>
+        </p:style>
+      </p:cxnSp>
+      <p:cxnSp>
+        <p:nvCxnSpPr>
+          <p:cNvPr id="16" name="Gerade Verbindung mit Pfeil 15">
+            <a:extLst>
+              <a:ext uri="{FF2B5EF4-FFF2-40B4-BE49-F238E27FC236}">
+                <a16:creationId xmlns:a16="http://schemas.microsoft.com/office/drawing/2014/main" id="{D25DF7DE-0945-7F80-3BD2-EF97A89D52B5}"/>
+              </a:ext>
+            </a:extLst>
+          </p:cNvPr>
+          <p:cNvCxnSpPr>
+            <a:stCxn id="12" idx="2"/>
+            <a:endCxn id="13" idx="0"/>
+          </p:cNvCxnSpPr>
+          <p:nvPr/>
+        </p:nvCxnSpPr>
+        <p:spPr>
+          <a:xfrm>
+            <a:off x="14826462" y="10839242"/>
+            <a:ext cx="0" cy="1035613"/>
+          </a:xfrm>
+          <a:prstGeom prst="straightConnector1">
+            <a:avLst/>
+          </a:prstGeom>
+          <a:ln w="152400">
+            <a:solidFill>
+              <a:schemeClr val="tx1"/>
+            </a:solidFill>
+            <a:tailEnd type="triangle"/>
+          </a:ln>
+        </p:spPr>
+        <p:style>
+          <a:lnRef idx="1">
+            <a:schemeClr val="accent1"/>
+          </a:lnRef>
+          <a:fillRef idx="0">
+            <a:schemeClr val="accent1"/>
+          </a:fillRef>
+          <a:effectRef idx="0">
+            <a:schemeClr val="accent1"/>
+          </a:effectRef>
+          <a:fontRef idx="minor">
+            <a:schemeClr val="tx1"/>
+          </a:fontRef>
+        </p:style>
+      </p:cxnSp>
+      <p:sp>
+        <p:nvSpPr>
+          <p:cNvPr id="25" name="Rechteck 24">
+            <a:extLst>
+              <a:ext uri="{FF2B5EF4-FFF2-40B4-BE49-F238E27FC236}">
+                <a16:creationId xmlns:a16="http://schemas.microsoft.com/office/drawing/2014/main" id="{A5104653-98BF-F557-E467-1C72EFE55C4E}"/>
+              </a:ext>
+            </a:extLst>
+          </p:cNvPr>
+          <p:cNvSpPr/>
+          <p:nvPr/>
+        </p:nvSpPr>
+        <p:spPr>
+          <a:xfrm>
+            <a:off x="11310376" y="14223615"/>
+            <a:ext cx="7032172" cy="1336244"/>
+          </a:xfrm>
+          <a:prstGeom prst="rect">
+            <a:avLst/>
+          </a:prstGeom>
+          <a:noFill/>
+          <a:ln>
+            <a:solidFill>
+              <a:schemeClr val="tx1"/>
+            </a:solidFill>
+          </a:ln>
+        </p:spPr>
+        <p:style>
+          <a:lnRef idx="2">
+            <a:schemeClr val="accent1">
+              <a:shade val="50000"/>
+            </a:schemeClr>
+          </a:lnRef>
+          <a:fillRef idx="1">
+            <a:schemeClr val="accent1"/>
+          </a:fillRef>
+          <a:effectRef idx="0">
+            <a:schemeClr val="accent1"/>
+          </a:effectRef>
+          <a:fontRef idx="minor">
+            <a:schemeClr val="lt1"/>
+          </a:fontRef>
+        </p:style>
+        <p:txBody>
+          <a:bodyPr rtlCol="0" anchor="ctr"/>
+          <a:lstStyle/>
+          <a:p>
+            <a:pPr algn="ctr"/>
+            <a:r>
+              <a:rPr lang="en-US" sz="5400" b="1" dirty="0">
+                <a:solidFill>
+                  <a:schemeClr val="tx1"/>
+                </a:solidFill>
+              </a:rPr>
+              <a:t>Weighted Sum</a:t>
+            </a:r>
+          </a:p>
+        </p:txBody>
+      </p:sp>
+      <p:cxnSp>
+        <p:nvCxnSpPr>
+          <p:cNvPr id="31" name="Gerade Verbindung mit Pfeil 30">
+            <a:extLst>
+              <a:ext uri="{FF2B5EF4-FFF2-40B4-BE49-F238E27FC236}">
+                <a16:creationId xmlns:a16="http://schemas.microsoft.com/office/drawing/2014/main" id="{A52E6239-BD7B-5F43-FEAF-30D59FC180C0}"/>
+              </a:ext>
+            </a:extLst>
+          </p:cNvPr>
+          <p:cNvCxnSpPr>
+            <a:cxnSpLocks/>
+            <a:stCxn id="13" idx="2"/>
+            <a:endCxn id="25" idx="0"/>
+          </p:cNvCxnSpPr>
+          <p:nvPr/>
+        </p:nvCxnSpPr>
+        <p:spPr>
+          <a:xfrm>
+            <a:off x="14826462" y="13211099"/>
+            <a:ext cx="0" cy="1012516"/>
+          </a:xfrm>
+          <a:prstGeom prst="straightConnector1">
+            <a:avLst/>
+          </a:prstGeom>
+          <a:ln w="152400">
+            <a:solidFill>
+              <a:schemeClr val="tx1"/>
+            </a:solidFill>
+            <a:tailEnd type="triangle"/>
+          </a:ln>
+        </p:spPr>
+        <p:style>
+          <a:lnRef idx="1">
+            <a:schemeClr val="accent1"/>
+          </a:lnRef>
+          <a:fillRef idx="0">
+            <a:schemeClr val="accent1"/>
+          </a:fillRef>
+          <a:effectRef idx="0">
+            <a:schemeClr val="accent1"/>
+          </a:effectRef>
+          <a:fontRef idx="minor">
+            <a:schemeClr val="tx1"/>
+          </a:fontRef>
+        </p:style>
+      </p:cxnSp>
+      <p:cxnSp>
+        <p:nvCxnSpPr>
+          <p:cNvPr id="33" name="Gerade Verbindung mit Pfeil 32">
+            <a:extLst>
+              <a:ext uri="{FF2B5EF4-FFF2-40B4-BE49-F238E27FC236}">
+                <a16:creationId xmlns:a16="http://schemas.microsoft.com/office/drawing/2014/main" id="{860387E1-A9AD-5883-8F74-656E01C3F623}"/>
+              </a:ext>
+            </a:extLst>
+          </p:cNvPr>
+          <p:cNvCxnSpPr>
+            <a:cxnSpLocks/>
+            <a:stCxn id="25" idx="2"/>
+            <a:endCxn id="92" idx="0"/>
+          </p:cNvCxnSpPr>
+          <p:nvPr/>
+        </p:nvCxnSpPr>
+        <p:spPr>
+          <a:xfrm>
+            <a:off x="14826462" y="15559859"/>
+            <a:ext cx="0" cy="1012516"/>
+          </a:xfrm>
+          <a:prstGeom prst="straightConnector1">
+            <a:avLst/>
+          </a:prstGeom>
+          <a:ln w="152400">
+            <a:solidFill>
+              <a:schemeClr val="tx1"/>
+            </a:solidFill>
+            <a:tailEnd type="triangle"/>
+          </a:ln>
+        </p:spPr>
+        <p:style>
+          <a:lnRef idx="1">
+            <a:schemeClr val="accent1"/>
+          </a:lnRef>
+          <a:fillRef idx="0">
+            <a:schemeClr val="accent1"/>
+          </a:fillRef>
+          <a:effectRef idx="0">
+            <a:schemeClr val="accent1"/>
+          </a:effectRef>
+          <a:fontRef idx="minor">
+            <a:schemeClr val="tx1"/>
+          </a:fontRef>
+        </p:style>
+      </p:cxnSp>
+      <p:sp>
+        <p:nvSpPr>
+          <p:cNvPr id="92" name="Rechteck 91">
+            <a:extLst>
+              <a:ext uri="{FF2B5EF4-FFF2-40B4-BE49-F238E27FC236}">
+                <a16:creationId xmlns:a16="http://schemas.microsoft.com/office/drawing/2014/main" id="{D1637578-6A3F-1845-69CD-F6CC168DE4F2}"/>
+              </a:ext>
+            </a:extLst>
+          </p:cNvPr>
+          <p:cNvSpPr/>
+          <p:nvPr/>
+        </p:nvSpPr>
+        <p:spPr>
+          <a:xfrm>
+            <a:off x="11310376" y="16572375"/>
+            <a:ext cx="7032172" cy="1336244"/>
+          </a:xfrm>
+          <a:prstGeom prst="rect">
+            <a:avLst/>
+          </a:prstGeom>
+          <a:noFill/>
+          <a:ln>
+            <a:solidFill>
+              <a:schemeClr val="tx1"/>
+            </a:solidFill>
+          </a:ln>
+        </p:spPr>
+        <p:style>
+          <a:lnRef idx="2">
+            <a:schemeClr val="accent1">
+              <a:shade val="50000"/>
+            </a:schemeClr>
+          </a:lnRef>
+          <a:fillRef idx="1">
+            <a:schemeClr val="accent1"/>
+          </a:fillRef>
+          <a:effectRef idx="0">
+            <a:schemeClr val="accent1"/>
+          </a:effectRef>
+          <a:fontRef idx="minor">
+            <a:schemeClr val="lt1"/>
+          </a:fontRef>
+        </p:style>
+        <p:txBody>
+          <a:bodyPr rtlCol="0" anchor="ctr"/>
+          <a:lstStyle/>
+          <a:p>
+            <a:pPr algn="ctr"/>
+            <a:r>
+              <a:rPr lang="en-US" sz="5400" b="1" dirty="0">
+                <a:solidFill>
+                  <a:schemeClr val="tx1"/>
+                </a:solidFill>
+              </a:rPr>
+              <a:t>Pooling Over Features</a:t>
+            </a:r>
+          </a:p>
+        </p:txBody>
+      </p:sp>
+      <p:cxnSp>
+        <p:nvCxnSpPr>
+          <p:cNvPr id="94" name="Gerade Verbindung mit Pfeil 93">
+            <a:extLst>
+              <a:ext uri="{FF2B5EF4-FFF2-40B4-BE49-F238E27FC236}">
+                <a16:creationId xmlns:a16="http://schemas.microsoft.com/office/drawing/2014/main" id="{3B0B94B7-11D7-7BB8-5181-750275689757}"/>
+              </a:ext>
+            </a:extLst>
+          </p:cNvPr>
+          <p:cNvCxnSpPr>
+            <a:cxnSpLocks/>
+            <a:stCxn id="92" idx="2"/>
+          </p:cNvCxnSpPr>
+          <p:nvPr/>
+        </p:nvCxnSpPr>
+        <p:spPr>
+          <a:xfrm>
+            <a:off x="14826462" y="17908619"/>
+            <a:ext cx="0" cy="2149187"/>
+          </a:xfrm>
+          <a:prstGeom prst="straightConnector1">
+            <a:avLst/>
+          </a:prstGeom>
+          <a:ln w="152400">
+            <a:solidFill>
+              <a:schemeClr val="tx1"/>
+            </a:solidFill>
+            <a:tailEnd type="triangle"/>
+          </a:ln>
+        </p:spPr>
+        <p:style>
+          <a:lnRef idx="1">
+            <a:schemeClr val="accent1"/>
+          </a:lnRef>
+          <a:fillRef idx="0">
+            <a:schemeClr val="accent1"/>
+          </a:fillRef>
+          <a:effectRef idx="0">
+            <a:schemeClr val="accent1"/>
+          </a:effectRef>
+          <a:fontRef idx="minor">
+            <a:schemeClr val="tx1"/>
+          </a:fontRef>
+        </p:style>
+      </p:cxnSp>
+      <p:cxnSp>
+        <p:nvCxnSpPr>
+          <p:cNvPr id="103" name="Gerade Verbindung mit Pfeil 102">
+            <a:extLst>
+              <a:ext uri="{FF2B5EF4-FFF2-40B4-BE49-F238E27FC236}">
+                <a16:creationId xmlns:a16="http://schemas.microsoft.com/office/drawing/2014/main" id="{BA0C9B52-0437-3515-F1F1-753F5AB11E90}"/>
+              </a:ext>
+            </a:extLst>
+          </p:cNvPr>
+          <p:cNvCxnSpPr>
+            <a:cxnSpLocks/>
+            <a:stCxn id="8" idx="2"/>
+            <a:endCxn id="4" idx="0"/>
+          </p:cNvCxnSpPr>
+          <p:nvPr/>
+        </p:nvCxnSpPr>
+        <p:spPr>
+          <a:xfrm>
+            <a:off x="6714290" y="4039048"/>
+            <a:ext cx="4831562" cy="1319733"/>
+          </a:xfrm>
+          <a:prstGeom prst="straightConnector1">
+            <a:avLst/>
+          </a:prstGeom>
+          <a:ln w="152400">
+            <a:solidFill>
+              <a:schemeClr val="tx1"/>
+            </a:solidFill>
+            <a:tailEnd type="triangle"/>
+          </a:ln>
+        </p:spPr>
+        <p:style>
+          <a:lnRef idx="1">
+            <a:schemeClr val="accent1"/>
+          </a:lnRef>
+          <a:fillRef idx="0">
+            <a:schemeClr val="accent1"/>
+          </a:fillRef>
+          <a:effectRef idx="0">
+            <a:schemeClr val="accent1"/>
+          </a:effectRef>
+          <a:fontRef idx="minor">
+            <a:schemeClr val="tx1"/>
+          </a:fontRef>
+        </p:style>
+      </p:cxnSp>
+      <p:cxnSp>
+        <p:nvCxnSpPr>
+          <p:cNvPr id="106" name="Gerade Verbindung mit Pfeil 105">
+            <a:extLst>
+              <a:ext uri="{FF2B5EF4-FFF2-40B4-BE49-F238E27FC236}">
+                <a16:creationId xmlns:a16="http://schemas.microsoft.com/office/drawing/2014/main" id="{977FE689-4625-6BDD-315A-7A54E706E45F}"/>
+              </a:ext>
+            </a:extLst>
+          </p:cNvPr>
+          <p:cNvCxnSpPr>
+            <a:cxnSpLocks/>
+            <a:stCxn id="52" idx="2"/>
+            <a:endCxn id="14" idx="0"/>
+          </p:cNvCxnSpPr>
+          <p:nvPr/>
+        </p:nvCxnSpPr>
+        <p:spPr>
+          <a:xfrm>
+            <a:off x="14826462" y="4039048"/>
+            <a:ext cx="1" cy="1319733"/>
+          </a:xfrm>
+          <a:prstGeom prst="straightConnector1">
+            <a:avLst/>
+          </a:prstGeom>
+          <a:ln w="152400">
+            <a:solidFill>
+              <a:schemeClr val="tx1"/>
+            </a:solidFill>
+            <a:tailEnd type="triangle"/>
+          </a:ln>
+        </p:spPr>
+        <p:style>
+          <a:lnRef idx="1">
+            <a:schemeClr val="accent1"/>
+          </a:lnRef>
+          <a:fillRef idx="0">
+            <a:schemeClr val="accent1"/>
+          </a:fillRef>
+          <a:effectRef idx="0">
+            <a:schemeClr val="accent1"/>
+          </a:effectRef>
+          <a:fontRef idx="minor">
+            <a:schemeClr val="tx1"/>
+          </a:fontRef>
+        </p:style>
+      </p:cxnSp>
+      <p:cxnSp>
+        <p:nvCxnSpPr>
+          <p:cNvPr id="109" name="Gerade Verbindung mit Pfeil 108">
+            <a:extLst>
+              <a:ext uri="{FF2B5EF4-FFF2-40B4-BE49-F238E27FC236}">
+                <a16:creationId xmlns:a16="http://schemas.microsoft.com/office/drawing/2014/main" id="{45A40FCE-2138-2EA6-9AB2-5142C5CED0B5}"/>
+              </a:ext>
+            </a:extLst>
+          </p:cNvPr>
+          <p:cNvCxnSpPr>
+            <a:cxnSpLocks/>
+            <a:stCxn id="88" idx="2"/>
+            <a:endCxn id="20" idx="0"/>
+          </p:cNvCxnSpPr>
+          <p:nvPr/>
+        </p:nvCxnSpPr>
+        <p:spPr>
+          <a:xfrm flipH="1">
+            <a:off x="18107073" y="4039048"/>
+            <a:ext cx="4831561" cy="1314041"/>
+          </a:xfrm>
+          <a:prstGeom prst="straightConnector1">
+            <a:avLst/>
+          </a:prstGeom>
+          <a:ln w="152400">
+            <a:solidFill>
+              <a:schemeClr val="tx1"/>
+            </a:solidFill>
+            <a:tailEnd type="triangle"/>
+          </a:ln>
+        </p:spPr>
+        <p:style>
+          <a:lnRef idx="1">
+            <a:schemeClr val="accent1"/>
+          </a:lnRef>
+          <a:fillRef idx="0">
+            <a:schemeClr val="accent1"/>
+          </a:fillRef>
+          <a:effectRef idx="0">
+            <a:schemeClr val="accent1"/>
+          </a:effectRef>
+          <a:fontRef idx="minor">
+            <a:schemeClr val="tx1"/>
+          </a:fontRef>
+        </p:style>
+      </p:cxnSp>
+      <p:cxnSp>
+        <p:nvCxnSpPr>
+          <p:cNvPr id="119" name="Verbinder: gewinkelt 118">
+            <a:extLst>
+              <a:ext uri="{FF2B5EF4-FFF2-40B4-BE49-F238E27FC236}">
+                <a16:creationId xmlns:a16="http://schemas.microsoft.com/office/drawing/2014/main" id="{526EE649-B4DD-A68B-0A2D-7050C12126B9}"/>
+              </a:ext>
+            </a:extLst>
+          </p:cNvPr>
+          <p:cNvCxnSpPr>
+            <a:cxnSpLocks/>
+            <a:stCxn id="12" idx="1"/>
+            <a:endCxn id="25" idx="1"/>
+          </p:cNvCxnSpPr>
+          <p:nvPr/>
+        </p:nvCxnSpPr>
+        <p:spPr>
+          <a:xfrm rot="10800000" flipV="1">
+            <a:off x="11310376" y="10171119"/>
+            <a:ext cx="12700" cy="4720617"/>
+          </a:xfrm>
+          <a:prstGeom prst="bentConnector3">
+            <a:avLst>
+              <a:gd name="adj1" fmla="val 9232260"/>
+            </a:avLst>
+          </a:prstGeom>
+          <a:ln w="152400">
+            <a:solidFill>
+              <a:schemeClr val="tx1"/>
+            </a:solidFill>
+            <a:tailEnd type="triangle"/>
+          </a:ln>
+        </p:spPr>
+        <p:style>
+          <a:lnRef idx="1">
+            <a:schemeClr val="accent1"/>
+          </a:lnRef>
+          <a:fillRef idx="0">
+            <a:schemeClr val="accent1"/>
+          </a:fillRef>
+          <a:effectRef idx="0">
+            <a:schemeClr val="accent1"/>
+          </a:effectRef>
+          <a:fontRef idx="minor">
+            <a:schemeClr val="tx1"/>
+          </a:fontRef>
+        </p:style>
+      </p:cxnSp>
+      <p:cxnSp>
+        <p:nvCxnSpPr>
+          <p:cNvPr id="3" name="Gerade Verbindung mit Pfeil 2">
+            <a:extLst>
+              <a:ext uri="{FF2B5EF4-FFF2-40B4-BE49-F238E27FC236}">
+                <a16:creationId xmlns:a16="http://schemas.microsoft.com/office/drawing/2014/main" id="{55FA6BD3-9B1D-9792-E530-3F39864BC9EC}"/>
+              </a:ext>
+            </a:extLst>
+          </p:cNvPr>
+          <p:cNvCxnSpPr>
+            <a:cxnSpLocks/>
+          </p:cNvCxnSpPr>
+          <p:nvPr/>
+        </p:nvCxnSpPr>
+        <p:spPr>
+          <a:xfrm>
+            <a:off x="13500100" y="8467385"/>
+            <a:ext cx="0" cy="1035613"/>
+          </a:xfrm>
+          <a:prstGeom prst="straightConnector1">
+            <a:avLst/>
+          </a:prstGeom>
+          <a:ln w="152400">
+            <a:solidFill>
+              <a:schemeClr val="tx1"/>
+            </a:solidFill>
+            <a:tailEnd type="triangle"/>
+          </a:ln>
+        </p:spPr>
+        <p:style>
+          <a:lnRef idx="1">
+            <a:schemeClr val="accent1"/>
+          </a:lnRef>
+          <a:fillRef idx="0">
+            <a:schemeClr val="accent1"/>
+          </a:fillRef>
+          <a:effectRef idx="0">
+            <a:schemeClr val="accent1"/>
+          </a:effectRef>
+          <a:fontRef idx="minor">
+            <a:schemeClr val="tx1"/>
+          </a:fontRef>
+        </p:style>
+      </p:cxnSp>
+      <p:cxnSp>
+        <p:nvCxnSpPr>
+          <p:cNvPr id="7" name="Gerade Verbindung mit Pfeil 6">
+            <a:extLst>
+              <a:ext uri="{FF2B5EF4-FFF2-40B4-BE49-F238E27FC236}">
+                <a16:creationId xmlns:a16="http://schemas.microsoft.com/office/drawing/2014/main" id="{BF6B70B7-A3EB-4ADF-715B-3F00404CC565}"/>
+              </a:ext>
+            </a:extLst>
+          </p:cNvPr>
+          <p:cNvCxnSpPr>
+            <a:cxnSpLocks/>
+          </p:cNvCxnSpPr>
+          <p:nvPr/>
+        </p:nvCxnSpPr>
+        <p:spPr>
+          <a:xfrm>
+            <a:off x="15962563" y="8467385"/>
+            <a:ext cx="0" cy="1035613"/>
+          </a:xfrm>
+          <a:prstGeom prst="straightConnector1">
+            <a:avLst/>
+          </a:prstGeom>
+          <a:ln w="152400">
+            <a:solidFill>
+              <a:schemeClr val="tx1"/>
+            </a:solidFill>
+            <a:tailEnd type="triangle"/>
+          </a:ln>
+        </p:spPr>
+        <p:style>
+          <a:lnRef idx="1">
+            <a:schemeClr val="accent1"/>
+          </a:lnRef>
+          <a:fillRef idx="0">
+            <a:schemeClr val="accent1"/>
+          </a:fillRef>
+          <a:effectRef idx="0">
+            <a:schemeClr val="accent1"/>
+          </a:effectRef>
+          <a:fontRef idx="minor">
+            <a:schemeClr val="tx1"/>
+          </a:fontRef>
+        </p:style>
+      </p:cxnSp>
+      <p:sp>
+        <p:nvSpPr>
+          <p:cNvPr id="4" name="Rechteck 3">
+            <a:extLst>
+              <a:ext uri="{FF2B5EF4-FFF2-40B4-BE49-F238E27FC236}">
+                <a16:creationId xmlns:a16="http://schemas.microsoft.com/office/drawing/2014/main" id="{54726A0D-8FA1-E68C-9683-C8079C731A5E}"/>
+              </a:ext>
+            </a:extLst>
+          </p:cNvPr>
+          <p:cNvSpPr/>
+          <p:nvPr/>
+        </p:nvSpPr>
+        <p:spPr>
+          <a:xfrm>
+            <a:off x="10281103" y="5358781"/>
+            <a:ext cx="2529497" cy="1336244"/>
+          </a:xfrm>
+          <a:prstGeom prst="rect">
+            <a:avLst/>
+          </a:prstGeom>
+          <a:noFill/>
+          <a:ln>
+            <a:solidFill>
+              <a:schemeClr val="tx1"/>
+            </a:solidFill>
+          </a:ln>
+        </p:spPr>
+        <p:style>
+          <a:lnRef idx="2">
+            <a:schemeClr val="accent1">
+              <a:shade val="50000"/>
+            </a:schemeClr>
+          </a:lnRef>
+          <a:fillRef idx="1">
+            <a:schemeClr val="accent1"/>
+          </a:fillRef>
+          <a:effectRef idx="0">
+            <a:schemeClr val="accent1"/>
+          </a:effectRef>
+          <a:fontRef idx="minor">
+            <a:schemeClr val="lt1"/>
+          </a:fontRef>
+        </p:style>
+        <p:txBody>
+          <a:bodyPr rtlCol="0" anchor="ctr"/>
+          <a:lstStyle/>
+          <a:p>
+            <a:pPr algn="ctr"/>
+            <a:r>
+              <a:rPr lang="en-US" sz="5400" b="1" dirty="0">
+                <a:solidFill>
+                  <a:schemeClr val="tx1"/>
+                </a:solidFill>
+              </a:rPr>
+              <a:t>Norm</a:t>
+            </a:r>
+          </a:p>
+        </p:txBody>
+      </p:sp>
+      <p:sp>
+        <p:nvSpPr>
+          <p:cNvPr id="14" name="Rechteck 13">
+            <a:extLst>
+              <a:ext uri="{FF2B5EF4-FFF2-40B4-BE49-F238E27FC236}">
+                <a16:creationId xmlns:a16="http://schemas.microsoft.com/office/drawing/2014/main" id="{24024FE1-9FBA-1FFB-3031-804CF520EE49}"/>
+              </a:ext>
+            </a:extLst>
+          </p:cNvPr>
+          <p:cNvSpPr/>
+          <p:nvPr/>
+        </p:nvSpPr>
+        <p:spPr>
+          <a:xfrm>
+            <a:off x="13561714" y="5358781"/>
+            <a:ext cx="2529497" cy="1336244"/>
+          </a:xfrm>
+          <a:prstGeom prst="rect">
+            <a:avLst/>
+          </a:prstGeom>
+          <a:noFill/>
+          <a:ln>
+            <a:solidFill>
+              <a:schemeClr val="tx1"/>
+            </a:solidFill>
+          </a:ln>
+        </p:spPr>
+        <p:style>
+          <a:lnRef idx="2">
+            <a:schemeClr val="accent1">
+              <a:shade val="50000"/>
+            </a:schemeClr>
+          </a:lnRef>
+          <a:fillRef idx="1">
+            <a:schemeClr val="accent1"/>
+          </a:fillRef>
+          <a:effectRef idx="0">
+            <a:schemeClr val="accent1"/>
+          </a:effectRef>
+          <a:fontRef idx="minor">
+            <a:schemeClr val="lt1"/>
+          </a:fontRef>
+        </p:style>
+        <p:txBody>
+          <a:bodyPr rtlCol="0" anchor="ctr"/>
+          <a:lstStyle/>
+          <a:p>
+            <a:pPr algn="ctr"/>
+            <a:r>
+              <a:rPr lang="en-US" sz="5400" b="1" dirty="0">
+                <a:solidFill>
+                  <a:schemeClr val="tx1"/>
+                </a:solidFill>
+              </a:rPr>
+              <a:t>Norm</a:t>
+            </a:r>
+          </a:p>
+        </p:txBody>
+      </p:sp>
+      <p:sp>
+        <p:nvSpPr>
+          <p:cNvPr id="20" name="Rechteck 19">
+            <a:extLst>
+              <a:ext uri="{FF2B5EF4-FFF2-40B4-BE49-F238E27FC236}">
+                <a16:creationId xmlns:a16="http://schemas.microsoft.com/office/drawing/2014/main" id="{25273B9C-5BA5-ABE3-4110-386D58FD8A34}"/>
+              </a:ext>
+            </a:extLst>
+          </p:cNvPr>
+          <p:cNvSpPr/>
+          <p:nvPr/>
+        </p:nvSpPr>
+        <p:spPr>
+          <a:xfrm>
+            <a:off x="16842324" y="5353089"/>
+            <a:ext cx="2529497" cy="1336244"/>
+          </a:xfrm>
+          <a:prstGeom prst="rect">
+            <a:avLst/>
+          </a:prstGeom>
+          <a:noFill/>
+          <a:ln>
+            <a:solidFill>
+              <a:schemeClr val="tx1"/>
+            </a:solidFill>
+          </a:ln>
+        </p:spPr>
+        <p:style>
+          <a:lnRef idx="2">
+            <a:schemeClr val="accent1">
+              <a:shade val="50000"/>
+            </a:schemeClr>
+          </a:lnRef>
+          <a:fillRef idx="1">
+            <a:schemeClr val="accent1"/>
+          </a:fillRef>
+          <a:effectRef idx="0">
+            <a:schemeClr val="accent1"/>
+          </a:effectRef>
+          <a:fontRef idx="minor">
+            <a:schemeClr val="lt1"/>
+          </a:fontRef>
+        </p:style>
+        <p:txBody>
+          <a:bodyPr rtlCol="0" anchor="ctr"/>
+          <a:lstStyle/>
+          <a:p>
+            <a:pPr algn="ctr"/>
+            <a:r>
+              <a:rPr lang="en-US" sz="5400" b="1" dirty="0">
+                <a:solidFill>
+                  <a:schemeClr val="tx1"/>
+                </a:solidFill>
+              </a:rPr>
+              <a:t>Norm</a:t>
+            </a:r>
+          </a:p>
+        </p:txBody>
+      </p:sp>
+      <p:cxnSp>
+        <p:nvCxnSpPr>
+          <p:cNvPr id="23" name="Gerade Verbindung mit Pfeil 22">
+            <a:extLst>
+              <a:ext uri="{FF2B5EF4-FFF2-40B4-BE49-F238E27FC236}">
+                <a16:creationId xmlns:a16="http://schemas.microsoft.com/office/drawing/2014/main" id="{033D1F21-9578-601A-0A3A-575EFC83D9B6}"/>
+              </a:ext>
+            </a:extLst>
+          </p:cNvPr>
+          <p:cNvCxnSpPr>
+            <a:cxnSpLocks/>
+            <a:stCxn id="14" idx="2"/>
+            <a:endCxn id="10" idx="0"/>
+          </p:cNvCxnSpPr>
+          <p:nvPr/>
+        </p:nvCxnSpPr>
+        <p:spPr>
+          <a:xfrm flipH="1">
+            <a:off x="14826461" y="6695025"/>
+            <a:ext cx="2" cy="660428"/>
+          </a:xfrm>
+          <a:prstGeom prst="straightConnector1">
+            <a:avLst/>
+          </a:prstGeom>
+          <a:ln w="152400">
+            <a:solidFill>
+              <a:schemeClr val="tx1"/>
+            </a:solidFill>
+            <a:tailEnd type="triangle"/>
+          </a:ln>
+        </p:spPr>
+        <p:style>
+          <a:lnRef idx="1">
+            <a:schemeClr val="accent1"/>
+          </a:lnRef>
+          <a:fillRef idx="0">
+            <a:schemeClr val="accent1"/>
+          </a:fillRef>
+          <a:effectRef idx="0">
+            <a:schemeClr val="accent1"/>
+          </a:effectRef>
+          <a:fontRef idx="minor">
+            <a:schemeClr val="tx1"/>
+          </a:fontRef>
+        </p:style>
+      </p:cxnSp>
+      <p:sp>
+        <p:nvSpPr>
+          <p:cNvPr id="10" name="Rechteck 9">
+            <a:extLst>
+              <a:ext uri="{FF2B5EF4-FFF2-40B4-BE49-F238E27FC236}">
+                <a16:creationId xmlns:a16="http://schemas.microsoft.com/office/drawing/2014/main" id="{ACBB428D-16CB-7D55-4618-99F0737267EA}"/>
+              </a:ext>
+            </a:extLst>
+          </p:cNvPr>
+          <p:cNvSpPr/>
+          <p:nvPr/>
+        </p:nvSpPr>
+        <p:spPr>
+          <a:xfrm>
+            <a:off x="11310375" y="7355453"/>
+            <a:ext cx="7032172" cy="1336244"/>
+          </a:xfrm>
+          <a:prstGeom prst="rect">
+            <a:avLst/>
+          </a:prstGeom>
+          <a:solidFill>
+            <a:schemeClr val="bg1"/>
+          </a:solidFill>
+          <a:ln>
+            <a:solidFill>
+              <a:schemeClr val="tx1"/>
+            </a:solidFill>
+          </a:ln>
+        </p:spPr>
+        <p:style>
+          <a:lnRef idx="2">
+            <a:schemeClr val="accent1">
+              <a:shade val="50000"/>
+            </a:schemeClr>
+          </a:lnRef>
+          <a:fillRef idx="1">
+            <a:schemeClr val="accent1"/>
+          </a:fillRef>
+          <a:effectRef idx="0">
+            <a:schemeClr val="accent1"/>
+          </a:effectRef>
+          <a:fontRef idx="minor">
+            <a:schemeClr val="lt1"/>
+          </a:fontRef>
+        </p:style>
+        <p:txBody>
+          <a:bodyPr rtlCol="0" anchor="ctr"/>
+          <a:lstStyle/>
+          <a:p>
+            <a:pPr algn="ctr"/>
+            <a:r>
+              <a:rPr lang="en-US" sz="5400" b="1" dirty="0">
+                <a:solidFill>
+                  <a:schemeClr val="tx1"/>
+                </a:solidFill>
+              </a:rPr>
+              <a:t>Pooling Over Time</a:t>
+            </a:r>
+          </a:p>
+        </p:txBody>
+      </p:sp>
+      <p:cxnSp>
+        <p:nvCxnSpPr>
+          <p:cNvPr id="34" name="Verbinder: gewinkelt 33">
+            <a:extLst>
+              <a:ext uri="{FF2B5EF4-FFF2-40B4-BE49-F238E27FC236}">
+                <a16:creationId xmlns:a16="http://schemas.microsoft.com/office/drawing/2014/main" id="{3DB9E89F-CEED-BA75-1BC2-D22E4F83F365}"/>
+              </a:ext>
+            </a:extLst>
+          </p:cNvPr>
+          <p:cNvCxnSpPr>
+            <a:cxnSpLocks/>
+            <a:stCxn id="4" idx="1"/>
+            <a:endCxn id="10" idx="1"/>
+          </p:cNvCxnSpPr>
+          <p:nvPr/>
+        </p:nvCxnSpPr>
+        <p:spPr>
+          <a:xfrm rot="10800000" flipH="1" flipV="1">
+            <a:off x="10281103" y="6026903"/>
+            <a:ext cx="1029272" cy="1996672"/>
+          </a:xfrm>
+          <a:prstGeom prst="bentConnector3">
+            <a:avLst>
+              <a:gd name="adj1" fmla="val -22210"/>
+            </a:avLst>
+          </a:prstGeom>
+          <a:ln w="152400">
+            <a:solidFill>
+              <a:schemeClr val="tx1"/>
+            </a:solidFill>
+            <a:tailEnd type="triangle"/>
+          </a:ln>
+        </p:spPr>
+        <p:style>
+          <a:lnRef idx="1">
+            <a:schemeClr val="accent1"/>
+          </a:lnRef>
+          <a:fillRef idx="0">
+            <a:schemeClr val="accent1"/>
+          </a:fillRef>
+          <a:effectRef idx="0">
+            <a:schemeClr val="accent1"/>
+          </a:effectRef>
+          <a:fontRef idx="minor">
+            <a:schemeClr val="tx1"/>
+          </a:fontRef>
+        </p:style>
+      </p:cxnSp>
+      <p:cxnSp>
+        <p:nvCxnSpPr>
+          <p:cNvPr id="37" name="Verbinder: gewinkelt 36">
+            <a:extLst>
+              <a:ext uri="{FF2B5EF4-FFF2-40B4-BE49-F238E27FC236}">
+                <a16:creationId xmlns:a16="http://schemas.microsoft.com/office/drawing/2014/main" id="{E5B801E3-A669-ADA6-2A9B-8E34F0CE1742}"/>
+              </a:ext>
+            </a:extLst>
+          </p:cNvPr>
+          <p:cNvCxnSpPr>
+            <a:cxnSpLocks/>
+            <a:stCxn id="20" idx="3"/>
+            <a:endCxn id="10" idx="3"/>
+          </p:cNvCxnSpPr>
+          <p:nvPr/>
+        </p:nvCxnSpPr>
+        <p:spPr>
+          <a:xfrm flipH="1">
+            <a:off x="18342547" y="6021211"/>
+            <a:ext cx="1029274" cy="2002364"/>
+          </a:xfrm>
+          <a:prstGeom prst="bentConnector3">
+            <a:avLst>
+              <a:gd name="adj1" fmla="val -22210"/>
+            </a:avLst>
+          </a:prstGeom>
+          <a:ln w="152400">
+            <a:solidFill>
+              <a:schemeClr val="tx1"/>
+            </a:solidFill>
+            <a:tailEnd type="triangle"/>
+          </a:ln>
+        </p:spPr>
+        <p:style>
+          <a:lnRef idx="1">
+            <a:schemeClr val="accent1"/>
+          </a:lnRef>
+          <a:fillRef idx="0">
+            <a:schemeClr val="accent1"/>
+          </a:fillRef>
+          <a:effectRef idx="0">
+            <a:schemeClr val="accent1"/>
+          </a:effectRef>
+          <a:fontRef idx="minor">
+            <a:schemeClr val="tx1"/>
+          </a:fontRef>
+        </p:style>
+      </p:cxnSp>
+      <p:sp>
+        <p:nvSpPr>
           <p:cNvPr id="8" name="Rechteck 7">
             <a:extLst>
               <a:ext uri="{FF2B5EF4-FFF2-40B4-BE49-F238E27FC236}">
@@ -22091,7 +23209,9 @@
           <a:prstGeom prst="rect">
             <a:avLst/>
           </a:prstGeom>
-          <a:noFill/>
+          <a:solidFill>
+            <a:schemeClr val="bg1"/>
+          </a:solidFill>
           <a:ln>
             <a:solidFill>
               <a:schemeClr val="tx1"/>
@@ -22132,425 +23252,6 @@
       </p:sp>
       <p:sp>
         <p:nvSpPr>
-          <p:cNvPr id="10" name="Rechteck 9">
-            <a:extLst>
-              <a:ext uri="{FF2B5EF4-FFF2-40B4-BE49-F238E27FC236}">
-                <a16:creationId xmlns:a16="http://schemas.microsoft.com/office/drawing/2014/main" id="{ACBB428D-16CB-7D55-4618-99F0737267EA}"/>
-              </a:ext>
-            </a:extLst>
-          </p:cNvPr>
-          <p:cNvSpPr/>
-          <p:nvPr/>
-        </p:nvSpPr>
-        <p:spPr>
-          <a:xfrm>
-            <a:off x="11310376" y="7131141"/>
-            <a:ext cx="7032172" cy="1336244"/>
-          </a:xfrm>
-          <a:prstGeom prst="rect">
-            <a:avLst/>
-          </a:prstGeom>
-          <a:noFill/>
-          <a:ln>
-            <a:solidFill>
-              <a:schemeClr val="tx1"/>
-            </a:solidFill>
-          </a:ln>
-        </p:spPr>
-        <p:style>
-          <a:lnRef idx="2">
-            <a:schemeClr val="accent1">
-              <a:shade val="50000"/>
-            </a:schemeClr>
-          </a:lnRef>
-          <a:fillRef idx="1">
-            <a:schemeClr val="accent1"/>
-          </a:fillRef>
-          <a:effectRef idx="0">
-            <a:schemeClr val="accent1"/>
-          </a:effectRef>
-          <a:fontRef idx="minor">
-            <a:schemeClr val="lt1"/>
-          </a:fontRef>
-        </p:style>
-        <p:txBody>
-          <a:bodyPr rtlCol="0" anchor="ctr"/>
-          <a:lstStyle/>
-          <a:p>
-            <a:pPr algn="ctr"/>
-            <a:r>
-              <a:rPr lang="en-US" sz="5400" b="1" dirty="0">
-                <a:solidFill>
-                  <a:schemeClr val="tx1"/>
-                </a:solidFill>
-              </a:rPr>
-              <a:t>Pooling Over Time</a:t>
-            </a:r>
-          </a:p>
-        </p:txBody>
-      </p:sp>
-      <p:sp>
-        <p:nvSpPr>
-          <p:cNvPr id="12" name="Rechteck 11">
-            <a:extLst>
-              <a:ext uri="{FF2B5EF4-FFF2-40B4-BE49-F238E27FC236}">
-                <a16:creationId xmlns:a16="http://schemas.microsoft.com/office/drawing/2014/main" id="{F47730CF-82A1-3D97-9B33-B9659A484F6A}"/>
-              </a:ext>
-            </a:extLst>
-          </p:cNvPr>
-          <p:cNvSpPr/>
-          <p:nvPr/>
-        </p:nvSpPr>
-        <p:spPr>
-          <a:xfrm>
-            <a:off x="11310376" y="9502998"/>
-            <a:ext cx="7032172" cy="1336244"/>
-          </a:xfrm>
-          <a:prstGeom prst="rect">
-            <a:avLst/>
-          </a:prstGeom>
-          <a:noFill/>
-          <a:ln>
-            <a:solidFill>
-              <a:schemeClr val="tx1"/>
-            </a:solidFill>
-          </a:ln>
-        </p:spPr>
-        <p:style>
-          <a:lnRef idx="2">
-            <a:schemeClr val="accent1">
-              <a:shade val="50000"/>
-            </a:schemeClr>
-          </a:lnRef>
-          <a:fillRef idx="1">
-            <a:schemeClr val="accent1"/>
-          </a:fillRef>
-          <a:effectRef idx="0">
-            <a:schemeClr val="accent1"/>
-          </a:effectRef>
-          <a:fontRef idx="minor">
-            <a:schemeClr val="lt1"/>
-          </a:fontRef>
-        </p:style>
-        <p:txBody>
-          <a:bodyPr rtlCol="0" anchor="ctr"/>
-          <a:lstStyle/>
-          <a:p>
-            <a:pPr algn="ctr"/>
-            <a:r>
-              <a:rPr lang="en-US" sz="5400" b="1" dirty="0">
-                <a:solidFill>
-                  <a:schemeClr val="tx1"/>
-                </a:solidFill>
-              </a:rPr>
-              <a:t>Concatenate</a:t>
-            </a:r>
-          </a:p>
-        </p:txBody>
-      </p:sp>
-      <p:sp>
-        <p:nvSpPr>
-          <p:cNvPr id="13" name="Rechteck 12">
-            <a:extLst>
-              <a:ext uri="{FF2B5EF4-FFF2-40B4-BE49-F238E27FC236}">
-                <a16:creationId xmlns:a16="http://schemas.microsoft.com/office/drawing/2014/main" id="{D4C75B1B-1F8B-B9E0-F491-2B722CA074B3}"/>
-              </a:ext>
-            </a:extLst>
-          </p:cNvPr>
-          <p:cNvSpPr/>
-          <p:nvPr/>
-        </p:nvSpPr>
-        <p:spPr>
-          <a:xfrm>
-            <a:off x="11310376" y="11874855"/>
-            <a:ext cx="7032172" cy="1336244"/>
-          </a:xfrm>
-          <a:prstGeom prst="rect">
-            <a:avLst/>
-          </a:prstGeom>
-          <a:noFill/>
-          <a:ln>
-            <a:solidFill>
-              <a:schemeClr val="tx1"/>
-            </a:solidFill>
-          </a:ln>
-        </p:spPr>
-        <p:style>
-          <a:lnRef idx="2">
-            <a:schemeClr val="accent1">
-              <a:shade val="50000"/>
-            </a:schemeClr>
-          </a:lnRef>
-          <a:fillRef idx="1">
-            <a:schemeClr val="accent1"/>
-          </a:fillRef>
-          <a:effectRef idx="0">
-            <a:schemeClr val="accent1"/>
-          </a:effectRef>
-          <a:fontRef idx="minor">
-            <a:schemeClr val="lt1"/>
-          </a:fontRef>
-        </p:style>
-        <p:txBody>
-          <a:bodyPr rtlCol="0" anchor="ctr"/>
-          <a:lstStyle/>
-          <a:p>
-            <a:pPr algn="ctr"/>
-            <a:r>
-              <a:rPr lang="en-US" sz="5400" b="1" dirty="0">
-                <a:solidFill>
-                  <a:schemeClr val="tx1"/>
-                </a:solidFill>
-              </a:rPr>
-              <a:t>Attention</a:t>
-            </a:r>
-          </a:p>
-        </p:txBody>
-      </p:sp>
-      <p:cxnSp>
-        <p:nvCxnSpPr>
-          <p:cNvPr id="15" name="Gerade Verbindung mit Pfeil 14">
-            <a:extLst>
-              <a:ext uri="{FF2B5EF4-FFF2-40B4-BE49-F238E27FC236}">
-                <a16:creationId xmlns:a16="http://schemas.microsoft.com/office/drawing/2014/main" id="{50107676-436C-4215-F408-F6C3368E5710}"/>
-              </a:ext>
-            </a:extLst>
-          </p:cNvPr>
-          <p:cNvCxnSpPr>
-            <a:cxnSpLocks/>
-            <a:stCxn id="10" idx="2"/>
-            <a:endCxn id="12" idx="0"/>
-          </p:cNvCxnSpPr>
-          <p:nvPr/>
-        </p:nvCxnSpPr>
-        <p:spPr>
-          <a:xfrm>
-            <a:off x="14826462" y="8467385"/>
-            <a:ext cx="0" cy="1035613"/>
-          </a:xfrm>
-          <a:prstGeom prst="straightConnector1">
-            <a:avLst/>
-          </a:prstGeom>
-          <a:ln w="152400">
-            <a:solidFill>
-              <a:schemeClr val="tx1"/>
-            </a:solidFill>
-            <a:tailEnd type="triangle"/>
-          </a:ln>
-        </p:spPr>
-        <p:style>
-          <a:lnRef idx="1">
-            <a:schemeClr val="accent1"/>
-          </a:lnRef>
-          <a:fillRef idx="0">
-            <a:schemeClr val="accent1"/>
-          </a:fillRef>
-          <a:effectRef idx="0">
-            <a:schemeClr val="accent1"/>
-          </a:effectRef>
-          <a:fontRef idx="minor">
-            <a:schemeClr val="tx1"/>
-          </a:fontRef>
-        </p:style>
-      </p:cxnSp>
-      <p:cxnSp>
-        <p:nvCxnSpPr>
-          <p:cNvPr id="16" name="Gerade Verbindung mit Pfeil 15">
-            <a:extLst>
-              <a:ext uri="{FF2B5EF4-FFF2-40B4-BE49-F238E27FC236}">
-                <a16:creationId xmlns:a16="http://schemas.microsoft.com/office/drawing/2014/main" id="{D25DF7DE-0945-7F80-3BD2-EF97A89D52B5}"/>
-              </a:ext>
-            </a:extLst>
-          </p:cNvPr>
-          <p:cNvCxnSpPr>
-            <a:stCxn id="12" idx="2"/>
-            <a:endCxn id="13" idx="0"/>
-          </p:cNvCxnSpPr>
-          <p:nvPr/>
-        </p:nvCxnSpPr>
-        <p:spPr>
-          <a:xfrm>
-            <a:off x="14826462" y="10839242"/>
-            <a:ext cx="0" cy="1035613"/>
-          </a:xfrm>
-          <a:prstGeom prst="straightConnector1">
-            <a:avLst/>
-          </a:prstGeom>
-          <a:ln w="152400">
-            <a:solidFill>
-              <a:schemeClr val="tx1"/>
-            </a:solidFill>
-            <a:tailEnd type="triangle"/>
-          </a:ln>
-        </p:spPr>
-        <p:style>
-          <a:lnRef idx="1">
-            <a:schemeClr val="accent1"/>
-          </a:lnRef>
-          <a:fillRef idx="0">
-            <a:schemeClr val="accent1"/>
-          </a:fillRef>
-          <a:effectRef idx="0">
-            <a:schemeClr val="accent1"/>
-          </a:effectRef>
-          <a:fontRef idx="minor">
-            <a:schemeClr val="tx1"/>
-          </a:fontRef>
-        </p:style>
-      </p:cxnSp>
-      <p:sp>
-        <p:nvSpPr>
-          <p:cNvPr id="25" name="Rechteck 24">
-            <a:extLst>
-              <a:ext uri="{FF2B5EF4-FFF2-40B4-BE49-F238E27FC236}">
-                <a16:creationId xmlns:a16="http://schemas.microsoft.com/office/drawing/2014/main" id="{A5104653-98BF-F557-E467-1C72EFE55C4E}"/>
-              </a:ext>
-            </a:extLst>
-          </p:cNvPr>
-          <p:cNvSpPr/>
-          <p:nvPr/>
-        </p:nvSpPr>
-        <p:spPr>
-          <a:xfrm>
-            <a:off x="11310376" y="14223615"/>
-            <a:ext cx="7032172" cy="1336244"/>
-          </a:xfrm>
-          <a:prstGeom prst="rect">
-            <a:avLst/>
-          </a:prstGeom>
-          <a:noFill/>
-          <a:ln>
-            <a:solidFill>
-              <a:schemeClr val="tx1"/>
-            </a:solidFill>
-          </a:ln>
-        </p:spPr>
-        <p:style>
-          <a:lnRef idx="2">
-            <a:schemeClr val="accent1">
-              <a:shade val="50000"/>
-            </a:schemeClr>
-          </a:lnRef>
-          <a:fillRef idx="1">
-            <a:schemeClr val="accent1"/>
-          </a:fillRef>
-          <a:effectRef idx="0">
-            <a:schemeClr val="accent1"/>
-          </a:effectRef>
-          <a:fontRef idx="minor">
-            <a:schemeClr val="lt1"/>
-          </a:fontRef>
-        </p:style>
-        <p:txBody>
-          <a:bodyPr rtlCol="0" anchor="ctr"/>
-          <a:lstStyle/>
-          <a:p>
-            <a:pPr algn="ctr"/>
-            <a:r>
-              <a:rPr lang="en-US" sz="5400" b="1" dirty="0">
-                <a:solidFill>
-                  <a:schemeClr val="tx1"/>
-                </a:solidFill>
-              </a:rPr>
-              <a:t>Weighted Sum</a:t>
-            </a:r>
-          </a:p>
-        </p:txBody>
-      </p:sp>
-      <p:cxnSp>
-        <p:nvCxnSpPr>
-          <p:cNvPr id="31" name="Gerade Verbindung mit Pfeil 30">
-            <a:extLst>
-              <a:ext uri="{FF2B5EF4-FFF2-40B4-BE49-F238E27FC236}">
-                <a16:creationId xmlns:a16="http://schemas.microsoft.com/office/drawing/2014/main" id="{A52E6239-BD7B-5F43-FEAF-30D59FC180C0}"/>
-              </a:ext>
-            </a:extLst>
-          </p:cNvPr>
-          <p:cNvCxnSpPr>
-            <a:cxnSpLocks/>
-            <a:stCxn id="13" idx="2"/>
-            <a:endCxn id="25" idx="0"/>
-          </p:cNvCxnSpPr>
-          <p:nvPr/>
-        </p:nvCxnSpPr>
-        <p:spPr>
-          <a:xfrm>
-            <a:off x="14826462" y="13211099"/>
-            <a:ext cx="0" cy="1012516"/>
-          </a:xfrm>
-          <a:prstGeom prst="straightConnector1">
-            <a:avLst/>
-          </a:prstGeom>
-          <a:ln w="152400">
-            <a:solidFill>
-              <a:schemeClr val="tx1"/>
-            </a:solidFill>
-            <a:tailEnd type="triangle"/>
-          </a:ln>
-        </p:spPr>
-        <p:style>
-          <a:lnRef idx="1">
-            <a:schemeClr val="accent1"/>
-          </a:lnRef>
-          <a:fillRef idx="0">
-            <a:schemeClr val="accent1"/>
-          </a:fillRef>
-          <a:effectRef idx="0">
-            <a:schemeClr val="accent1"/>
-          </a:effectRef>
-          <a:fontRef idx="minor">
-            <a:schemeClr val="tx1"/>
-          </a:fontRef>
-        </p:style>
-      </p:cxnSp>
-      <p:cxnSp>
-        <p:nvCxnSpPr>
-          <p:cNvPr id="33" name="Gerade Verbindung mit Pfeil 32">
-            <a:extLst>
-              <a:ext uri="{FF2B5EF4-FFF2-40B4-BE49-F238E27FC236}">
-                <a16:creationId xmlns:a16="http://schemas.microsoft.com/office/drawing/2014/main" id="{860387E1-A9AD-5883-8F74-656E01C3F623}"/>
-              </a:ext>
-            </a:extLst>
-          </p:cNvPr>
-          <p:cNvCxnSpPr>
-            <a:cxnSpLocks/>
-            <a:stCxn id="25" idx="2"/>
-            <a:endCxn id="92" idx="0"/>
-          </p:cNvCxnSpPr>
-          <p:nvPr/>
-        </p:nvCxnSpPr>
-        <p:spPr>
-          <a:xfrm>
-            <a:off x="14826462" y="15559859"/>
-            <a:ext cx="0" cy="1012516"/>
-          </a:xfrm>
-          <a:prstGeom prst="straightConnector1">
-            <a:avLst/>
-          </a:prstGeom>
-          <a:ln w="152400">
-            <a:solidFill>
-              <a:schemeClr val="tx1"/>
-            </a:solidFill>
-            <a:tailEnd type="triangle"/>
-          </a:ln>
-        </p:spPr>
-        <p:style>
-          <a:lnRef idx="1">
-            <a:schemeClr val="accent1"/>
-          </a:lnRef>
-          <a:fillRef idx="0">
-            <a:schemeClr val="accent1"/>
-          </a:fillRef>
-          <a:effectRef idx="0">
-            <a:schemeClr val="accent1"/>
-          </a:effectRef>
-          <a:fontRef idx="minor">
-            <a:schemeClr val="tx1"/>
-          </a:fontRef>
-        </p:style>
-      </p:cxnSp>
-      <p:sp>
-        <p:nvSpPr>
           <p:cNvPr id="52" name="Rechteck 51">
             <a:extLst>
               <a:ext uri="{FF2B5EF4-FFF2-40B4-BE49-F238E27FC236}">
@@ -22569,7 +23270,9 @@
           <a:prstGeom prst="rect">
             <a:avLst/>
           </a:prstGeom>
-          <a:noFill/>
+          <a:solidFill>
+            <a:schemeClr val="bg1"/>
+          </a:solidFill>
           <a:ln>
             <a:solidFill>
               <a:schemeClr val="tx1"/>
@@ -22628,7 +23331,9 @@
           <a:prstGeom prst="rect">
             <a:avLst/>
           </a:prstGeom>
-          <a:noFill/>
+          <a:solidFill>
+            <a:schemeClr val="bg1"/>
+          </a:solidFill>
           <a:ln>
             <a:solidFill>
               <a:schemeClr val="tx1"/>
@@ -22667,381 +23372,6 @@
           </a:p>
         </p:txBody>
       </p:sp>
-      <p:sp>
-        <p:nvSpPr>
-          <p:cNvPr id="92" name="Rechteck 91">
-            <a:extLst>
-              <a:ext uri="{FF2B5EF4-FFF2-40B4-BE49-F238E27FC236}">
-                <a16:creationId xmlns:a16="http://schemas.microsoft.com/office/drawing/2014/main" id="{D1637578-6A3F-1845-69CD-F6CC168DE4F2}"/>
-              </a:ext>
-            </a:extLst>
-          </p:cNvPr>
-          <p:cNvSpPr/>
-          <p:nvPr/>
-        </p:nvSpPr>
-        <p:spPr>
-          <a:xfrm>
-            <a:off x="11310376" y="16572375"/>
-            <a:ext cx="7032172" cy="1336244"/>
-          </a:xfrm>
-          <a:prstGeom prst="rect">
-            <a:avLst/>
-          </a:prstGeom>
-          <a:noFill/>
-          <a:ln>
-            <a:solidFill>
-              <a:schemeClr val="tx1"/>
-            </a:solidFill>
-          </a:ln>
-        </p:spPr>
-        <p:style>
-          <a:lnRef idx="2">
-            <a:schemeClr val="accent1">
-              <a:shade val="50000"/>
-            </a:schemeClr>
-          </a:lnRef>
-          <a:fillRef idx="1">
-            <a:schemeClr val="accent1"/>
-          </a:fillRef>
-          <a:effectRef idx="0">
-            <a:schemeClr val="accent1"/>
-          </a:effectRef>
-          <a:fontRef idx="minor">
-            <a:schemeClr val="lt1"/>
-          </a:fontRef>
-        </p:style>
-        <p:txBody>
-          <a:bodyPr rtlCol="0" anchor="ctr"/>
-          <a:lstStyle/>
-          <a:p>
-            <a:pPr algn="ctr"/>
-            <a:r>
-              <a:rPr lang="en-US" sz="5400" b="1" dirty="0">
-                <a:solidFill>
-                  <a:schemeClr val="tx1"/>
-                </a:solidFill>
-              </a:rPr>
-              <a:t>Pooling Over Features</a:t>
-            </a:r>
-          </a:p>
-        </p:txBody>
-      </p:sp>
-      <p:cxnSp>
-        <p:nvCxnSpPr>
-          <p:cNvPr id="94" name="Gerade Verbindung mit Pfeil 93">
-            <a:extLst>
-              <a:ext uri="{FF2B5EF4-FFF2-40B4-BE49-F238E27FC236}">
-                <a16:creationId xmlns:a16="http://schemas.microsoft.com/office/drawing/2014/main" id="{3B0B94B7-11D7-7BB8-5181-750275689757}"/>
-              </a:ext>
-            </a:extLst>
-          </p:cNvPr>
-          <p:cNvCxnSpPr>
-            <a:cxnSpLocks/>
-            <a:stCxn id="92" idx="2"/>
-          </p:cNvCxnSpPr>
-          <p:nvPr/>
-        </p:nvCxnSpPr>
-        <p:spPr>
-          <a:xfrm>
-            <a:off x="14826462" y="17908619"/>
-            <a:ext cx="0" cy="2149187"/>
-          </a:xfrm>
-          <a:prstGeom prst="straightConnector1">
-            <a:avLst/>
-          </a:prstGeom>
-          <a:ln w="152400">
-            <a:solidFill>
-              <a:schemeClr val="tx1"/>
-            </a:solidFill>
-            <a:tailEnd type="triangle"/>
-          </a:ln>
-        </p:spPr>
-        <p:style>
-          <a:lnRef idx="1">
-            <a:schemeClr val="accent1"/>
-          </a:lnRef>
-          <a:fillRef idx="0">
-            <a:schemeClr val="accent1"/>
-          </a:fillRef>
-          <a:effectRef idx="0">
-            <a:schemeClr val="accent1"/>
-          </a:effectRef>
-          <a:fontRef idx="minor">
-            <a:schemeClr val="tx1"/>
-          </a:fontRef>
-        </p:style>
-      </p:cxnSp>
-      <p:cxnSp>
-        <p:nvCxnSpPr>
-          <p:cNvPr id="103" name="Gerade Verbindung mit Pfeil 102">
-            <a:extLst>
-              <a:ext uri="{FF2B5EF4-FFF2-40B4-BE49-F238E27FC236}">
-                <a16:creationId xmlns:a16="http://schemas.microsoft.com/office/drawing/2014/main" id="{BA0C9B52-0437-3515-F1F1-753F5AB11E90}"/>
-              </a:ext>
-            </a:extLst>
-          </p:cNvPr>
-          <p:cNvCxnSpPr>
-            <a:cxnSpLocks/>
-          </p:cNvCxnSpPr>
-          <p:nvPr/>
-        </p:nvCxnSpPr>
-        <p:spPr>
-          <a:xfrm>
-            <a:off x="6795669" y="4039048"/>
-            <a:ext cx="7032172" cy="3092093"/>
-          </a:xfrm>
-          <a:prstGeom prst="straightConnector1">
-            <a:avLst/>
-          </a:prstGeom>
-          <a:ln w="152400">
-            <a:solidFill>
-              <a:schemeClr val="tx1"/>
-            </a:solidFill>
-            <a:tailEnd type="triangle"/>
-          </a:ln>
-        </p:spPr>
-        <p:style>
-          <a:lnRef idx="1">
-            <a:schemeClr val="accent1"/>
-          </a:lnRef>
-          <a:fillRef idx="0">
-            <a:schemeClr val="accent1"/>
-          </a:fillRef>
-          <a:effectRef idx="0">
-            <a:schemeClr val="accent1"/>
-          </a:effectRef>
-          <a:fontRef idx="minor">
-            <a:schemeClr val="tx1"/>
-          </a:fontRef>
-        </p:style>
-      </p:cxnSp>
-      <p:cxnSp>
-        <p:nvCxnSpPr>
-          <p:cNvPr id="106" name="Gerade Verbindung mit Pfeil 105">
-            <a:extLst>
-              <a:ext uri="{FF2B5EF4-FFF2-40B4-BE49-F238E27FC236}">
-                <a16:creationId xmlns:a16="http://schemas.microsoft.com/office/drawing/2014/main" id="{977FE689-4625-6BDD-315A-7A54E706E45F}"/>
-              </a:ext>
-            </a:extLst>
-          </p:cNvPr>
-          <p:cNvCxnSpPr>
-            <a:cxnSpLocks/>
-            <a:stCxn id="52" idx="2"/>
-            <a:endCxn id="10" idx="0"/>
-          </p:cNvCxnSpPr>
-          <p:nvPr/>
-        </p:nvCxnSpPr>
-        <p:spPr>
-          <a:xfrm>
-            <a:off x="14826462" y="4039048"/>
-            <a:ext cx="0" cy="3092093"/>
-          </a:xfrm>
-          <a:prstGeom prst="straightConnector1">
-            <a:avLst/>
-          </a:prstGeom>
-          <a:ln w="152400">
-            <a:solidFill>
-              <a:schemeClr val="tx1"/>
-            </a:solidFill>
-            <a:tailEnd type="triangle"/>
-          </a:ln>
-        </p:spPr>
-        <p:style>
-          <a:lnRef idx="1">
-            <a:schemeClr val="accent1"/>
-          </a:lnRef>
-          <a:fillRef idx="0">
-            <a:schemeClr val="accent1"/>
-          </a:fillRef>
-          <a:effectRef idx="0">
-            <a:schemeClr val="accent1"/>
-          </a:effectRef>
-          <a:fontRef idx="minor">
-            <a:schemeClr val="tx1"/>
-          </a:fontRef>
-        </p:style>
-      </p:cxnSp>
-      <p:cxnSp>
-        <p:nvCxnSpPr>
-          <p:cNvPr id="109" name="Gerade Verbindung mit Pfeil 108">
-            <a:extLst>
-              <a:ext uri="{FF2B5EF4-FFF2-40B4-BE49-F238E27FC236}">
-                <a16:creationId xmlns:a16="http://schemas.microsoft.com/office/drawing/2014/main" id="{45A40FCE-2138-2EA6-9AB2-5142C5CED0B5}"/>
-              </a:ext>
-            </a:extLst>
-          </p:cNvPr>
-          <p:cNvCxnSpPr>
-            <a:cxnSpLocks/>
-            <a:stCxn id="88" idx="2"/>
-          </p:cNvCxnSpPr>
-          <p:nvPr/>
-        </p:nvCxnSpPr>
-        <p:spPr>
-          <a:xfrm flipH="1">
-            <a:off x="15588462" y="4039048"/>
-            <a:ext cx="7350172" cy="3092093"/>
-          </a:xfrm>
-          <a:prstGeom prst="straightConnector1">
-            <a:avLst/>
-          </a:prstGeom>
-          <a:ln w="152400">
-            <a:solidFill>
-              <a:schemeClr val="tx1"/>
-            </a:solidFill>
-            <a:tailEnd type="triangle"/>
-          </a:ln>
-        </p:spPr>
-        <p:style>
-          <a:lnRef idx="1">
-            <a:schemeClr val="accent1"/>
-          </a:lnRef>
-          <a:fillRef idx="0">
-            <a:schemeClr val="accent1"/>
-          </a:fillRef>
-          <a:effectRef idx="0">
-            <a:schemeClr val="accent1"/>
-          </a:effectRef>
-          <a:fontRef idx="minor">
-            <a:schemeClr val="tx1"/>
-          </a:fontRef>
-        </p:style>
-      </p:cxnSp>
-      <p:cxnSp>
-        <p:nvCxnSpPr>
-          <p:cNvPr id="119" name="Verbinder: gewinkelt 118">
-            <a:extLst>
-              <a:ext uri="{FF2B5EF4-FFF2-40B4-BE49-F238E27FC236}">
-                <a16:creationId xmlns:a16="http://schemas.microsoft.com/office/drawing/2014/main" id="{526EE649-B4DD-A68B-0A2D-7050C12126B9}"/>
-              </a:ext>
-            </a:extLst>
-          </p:cNvPr>
-          <p:cNvCxnSpPr>
-            <a:cxnSpLocks/>
-            <a:stCxn id="12" idx="1"/>
-            <a:endCxn id="25" idx="1"/>
-          </p:cNvCxnSpPr>
-          <p:nvPr/>
-        </p:nvCxnSpPr>
-        <p:spPr>
-          <a:xfrm rot="10800000" flipV="1">
-            <a:off x="11310376" y="10171119"/>
-            <a:ext cx="12700" cy="4720617"/>
-          </a:xfrm>
-          <a:prstGeom prst="bentConnector3">
-            <a:avLst>
-              <a:gd name="adj1" fmla="val 9232260"/>
-            </a:avLst>
-          </a:prstGeom>
-          <a:ln w="152400">
-            <a:solidFill>
-              <a:schemeClr val="tx1"/>
-            </a:solidFill>
-            <a:tailEnd type="triangle"/>
-          </a:ln>
-        </p:spPr>
-        <p:style>
-          <a:lnRef idx="1">
-            <a:schemeClr val="accent1"/>
-          </a:lnRef>
-          <a:fillRef idx="0">
-            <a:schemeClr val="accent1"/>
-          </a:fillRef>
-          <a:effectRef idx="0">
-            <a:schemeClr val="accent1"/>
-          </a:effectRef>
-          <a:fontRef idx="minor">
-            <a:schemeClr val="tx1"/>
-          </a:fontRef>
-        </p:style>
-      </p:cxnSp>
-      <p:cxnSp>
-        <p:nvCxnSpPr>
-          <p:cNvPr id="3" name="Gerade Verbindung mit Pfeil 2">
-            <a:extLst>
-              <a:ext uri="{FF2B5EF4-FFF2-40B4-BE49-F238E27FC236}">
-                <a16:creationId xmlns:a16="http://schemas.microsoft.com/office/drawing/2014/main" id="{55FA6BD3-9B1D-9792-E530-3F39864BC9EC}"/>
-              </a:ext>
-            </a:extLst>
-          </p:cNvPr>
-          <p:cNvCxnSpPr>
-            <a:cxnSpLocks/>
-          </p:cNvCxnSpPr>
-          <p:nvPr/>
-        </p:nvCxnSpPr>
-        <p:spPr>
-          <a:xfrm>
-            <a:off x="13500100" y="8467385"/>
-            <a:ext cx="0" cy="1035613"/>
-          </a:xfrm>
-          <a:prstGeom prst="straightConnector1">
-            <a:avLst/>
-          </a:prstGeom>
-          <a:ln w="152400">
-            <a:solidFill>
-              <a:schemeClr val="tx1"/>
-            </a:solidFill>
-            <a:tailEnd type="triangle"/>
-          </a:ln>
-        </p:spPr>
-        <p:style>
-          <a:lnRef idx="1">
-            <a:schemeClr val="accent1"/>
-          </a:lnRef>
-          <a:fillRef idx="0">
-            <a:schemeClr val="accent1"/>
-          </a:fillRef>
-          <a:effectRef idx="0">
-            <a:schemeClr val="accent1"/>
-          </a:effectRef>
-          <a:fontRef idx="minor">
-            <a:schemeClr val="tx1"/>
-          </a:fontRef>
-        </p:style>
-      </p:cxnSp>
-      <p:cxnSp>
-        <p:nvCxnSpPr>
-          <p:cNvPr id="7" name="Gerade Verbindung mit Pfeil 6">
-            <a:extLst>
-              <a:ext uri="{FF2B5EF4-FFF2-40B4-BE49-F238E27FC236}">
-                <a16:creationId xmlns:a16="http://schemas.microsoft.com/office/drawing/2014/main" id="{BF6B70B7-A3EB-4ADF-715B-3F00404CC565}"/>
-              </a:ext>
-            </a:extLst>
-          </p:cNvPr>
-          <p:cNvCxnSpPr>
-            <a:cxnSpLocks/>
-          </p:cNvCxnSpPr>
-          <p:nvPr/>
-        </p:nvCxnSpPr>
-        <p:spPr>
-          <a:xfrm>
-            <a:off x="15962563" y="8467385"/>
-            <a:ext cx="0" cy="1035613"/>
-          </a:xfrm>
-          <a:prstGeom prst="straightConnector1">
-            <a:avLst/>
-          </a:prstGeom>
-          <a:ln w="152400">
-            <a:solidFill>
-              <a:schemeClr val="tx1"/>
-            </a:solidFill>
-            <a:tailEnd type="triangle"/>
-          </a:ln>
-        </p:spPr>
-        <p:style>
-          <a:lnRef idx="1">
-            <a:schemeClr val="accent1"/>
-          </a:lnRef>
-          <a:fillRef idx="0">
-            <a:schemeClr val="accent1"/>
-          </a:fillRef>
-          <a:effectRef idx="0">
-            <a:schemeClr val="accent1"/>
-          </a:effectRef>
-          <a:fontRef idx="minor">
-            <a:schemeClr val="tx1"/>
-          </a:fontRef>
-        </p:style>
-      </p:cxnSp>
     </p:spTree>
     <p:extLst>
       <p:ext uri="{BB962C8B-B14F-4D97-AF65-F5344CB8AC3E}">

</xml_diff>